<commit_message>
prepared for review 2
</commit_message>
<xml_diff>
--- a/presentation.pptx
+++ b/presentation.pptx
@@ -11,6 +11,8 @@
     <p:sldId id="259" r:id="rId5"/>
     <p:sldId id="260" r:id="rId6"/>
     <p:sldId id="261" r:id="rId7"/>
+    <p:sldId id="262" r:id="rId8"/>
+    <p:sldId id="263" r:id="rId9"/>
   </p:sldIdLst>
   <p:sldSz cx="12192000" cy="6858000"/>
   <p:notesSz cx="6858000" cy="9144000"/>
@@ -264,7 +266,7 @@
           <a:p>
             <a:fld id="{2D33603C-5355-4424-862B-2C955D3F174E}" type="datetimeFigureOut">
               <a:rPr lang="ru-RU" smtClean="0"/>
-              <a:t>09.12.2021</a:t>
+              <a:t>10.12.2021</a:t>
             </a:fld>
             <a:endParaRPr lang="ru-RU"/>
           </a:p>
@@ -462,7 +464,7 @@
           <a:p>
             <a:fld id="{2D33603C-5355-4424-862B-2C955D3F174E}" type="datetimeFigureOut">
               <a:rPr lang="ru-RU" smtClean="0"/>
-              <a:t>09.12.2021</a:t>
+              <a:t>10.12.2021</a:t>
             </a:fld>
             <a:endParaRPr lang="ru-RU"/>
           </a:p>
@@ -670,7 +672,7 @@
           <a:p>
             <a:fld id="{2D33603C-5355-4424-862B-2C955D3F174E}" type="datetimeFigureOut">
               <a:rPr lang="ru-RU" smtClean="0"/>
-              <a:t>09.12.2021</a:t>
+              <a:t>10.12.2021</a:t>
             </a:fld>
             <a:endParaRPr lang="ru-RU"/>
           </a:p>
@@ -868,7 +870,7 @@
           <a:p>
             <a:fld id="{2D33603C-5355-4424-862B-2C955D3F174E}" type="datetimeFigureOut">
               <a:rPr lang="ru-RU" smtClean="0"/>
-              <a:t>09.12.2021</a:t>
+              <a:t>10.12.2021</a:t>
             </a:fld>
             <a:endParaRPr lang="ru-RU"/>
           </a:p>
@@ -1143,7 +1145,7 @@
           <a:p>
             <a:fld id="{2D33603C-5355-4424-862B-2C955D3F174E}" type="datetimeFigureOut">
               <a:rPr lang="ru-RU" smtClean="0"/>
-              <a:t>09.12.2021</a:t>
+              <a:t>10.12.2021</a:t>
             </a:fld>
             <a:endParaRPr lang="ru-RU"/>
           </a:p>
@@ -1408,7 +1410,7 @@
           <a:p>
             <a:fld id="{2D33603C-5355-4424-862B-2C955D3F174E}" type="datetimeFigureOut">
               <a:rPr lang="ru-RU" smtClean="0"/>
-              <a:t>09.12.2021</a:t>
+              <a:t>10.12.2021</a:t>
             </a:fld>
             <a:endParaRPr lang="ru-RU"/>
           </a:p>
@@ -1820,7 +1822,7 @@
           <a:p>
             <a:fld id="{2D33603C-5355-4424-862B-2C955D3F174E}" type="datetimeFigureOut">
               <a:rPr lang="ru-RU" smtClean="0"/>
-              <a:t>09.12.2021</a:t>
+              <a:t>10.12.2021</a:t>
             </a:fld>
             <a:endParaRPr lang="ru-RU"/>
           </a:p>
@@ -1961,7 +1963,7 @@
           <a:p>
             <a:fld id="{2D33603C-5355-4424-862B-2C955D3F174E}" type="datetimeFigureOut">
               <a:rPr lang="ru-RU" smtClean="0"/>
-              <a:t>09.12.2021</a:t>
+              <a:t>10.12.2021</a:t>
             </a:fld>
             <a:endParaRPr lang="ru-RU"/>
           </a:p>
@@ -2074,7 +2076,7 @@
           <a:p>
             <a:fld id="{2D33603C-5355-4424-862B-2C955D3F174E}" type="datetimeFigureOut">
               <a:rPr lang="ru-RU" smtClean="0"/>
-              <a:t>09.12.2021</a:t>
+              <a:t>10.12.2021</a:t>
             </a:fld>
             <a:endParaRPr lang="ru-RU"/>
           </a:p>
@@ -2385,7 +2387,7 @@
           <a:p>
             <a:fld id="{2D33603C-5355-4424-862B-2C955D3F174E}" type="datetimeFigureOut">
               <a:rPr lang="ru-RU" smtClean="0"/>
-              <a:t>09.12.2021</a:t>
+              <a:t>10.12.2021</a:t>
             </a:fld>
             <a:endParaRPr lang="ru-RU"/>
           </a:p>
@@ -2673,7 +2675,7 @@
           <a:p>
             <a:fld id="{2D33603C-5355-4424-862B-2C955D3F174E}" type="datetimeFigureOut">
               <a:rPr lang="ru-RU" smtClean="0"/>
-              <a:t>09.12.2021</a:t>
+              <a:t>10.12.2021</a:t>
             </a:fld>
             <a:endParaRPr lang="ru-RU"/>
           </a:p>
@@ -2914,7 +2916,7 @@
           <a:p>
             <a:fld id="{2D33603C-5355-4424-862B-2C955D3F174E}" type="datetimeFigureOut">
               <a:rPr lang="ru-RU" smtClean="0"/>
-              <a:t>09.12.2021</a:t>
+              <a:t>10.12.2021</a:t>
             </a:fld>
             <a:endParaRPr lang="ru-RU"/>
           </a:p>
@@ -4108,6 +4110,2183 @@
 </p:sld>
 </file>
 
+<file path=ppt/slides/slide7.xml><?xml version="1.0" encoding="utf-8"?>
+<p:sld xmlns:a="http://schemas.openxmlformats.org/drawingml/2006/main" xmlns:r="http://schemas.openxmlformats.org/officeDocument/2006/relationships" xmlns:p="http://schemas.openxmlformats.org/presentationml/2006/main">
+  <p:cSld>
+    <p:spTree>
+      <p:nvGrpSpPr>
+        <p:cNvPr id="1" name=""/>
+        <p:cNvGrpSpPr/>
+        <p:nvPr/>
+      </p:nvGrpSpPr>
+      <p:grpSpPr>
+        <a:xfrm>
+          <a:off x="0" y="0"/>
+          <a:ext cx="0" cy="0"/>
+          <a:chOff x="0" y="0"/>
+          <a:chExt cx="0" cy="0"/>
+        </a:xfrm>
+      </p:grpSpPr>
+      <p:sp>
+        <p:nvSpPr>
+          <p:cNvPr id="2" name="Заголовок 1">
+            <a:extLst>
+              <a:ext uri="{FF2B5EF4-FFF2-40B4-BE49-F238E27FC236}">
+                <a16:creationId xmlns:a16="http://schemas.microsoft.com/office/drawing/2014/main" id="{605CDDFD-8AC7-483D-A0A4-E3A64B12C06A}"/>
+              </a:ext>
+            </a:extLst>
+          </p:cNvPr>
+          <p:cNvSpPr>
+            <a:spLocks noGrp="1"/>
+          </p:cNvSpPr>
+          <p:nvPr>
+            <p:ph type="title"/>
+          </p:nvPr>
+        </p:nvSpPr>
+        <p:spPr/>
+        <p:txBody>
+          <a:bodyPr/>
+          <a:lstStyle/>
+          <a:p>
+            <a:r>
+              <a:rPr lang="ru-RU" dirty="0"/>
+              <a:t>Математическая формализация</a:t>
+            </a:r>
+          </a:p>
+        </p:txBody>
+      </p:sp>
+      <mc:AlternateContent xmlns:mc="http://schemas.openxmlformats.org/markup-compatibility/2006">
+        <mc:Choice xmlns:a14="http://schemas.microsoft.com/office/drawing/2010/main" Requires="a14">
+          <p:sp>
+            <p:nvSpPr>
+              <p:cNvPr id="3" name="Объект 2">
+                <a:extLst>
+                  <a:ext uri="{FF2B5EF4-FFF2-40B4-BE49-F238E27FC236}">
+                    <a16:creationId xmlns:a16="http://schemas.microsoft.com/office/drawing/2014/main" id="{083E4820-30C1-455B-8872-DA0931F91228}"/>
+                  </a:ext>
+                </a:extLst>
+              </p:cNvPr>
+              <p:cNvSpPr>
+                <a:spLocks noGrp="1"/>
+              </p:cNvSpPr>
+              <p:nvPr>
+                <p:ph idx="1"/>
+              </p:nvPr>
+            </p:nvSpPr>
+            <p:spPr/>
+            <p:txBody>
+              <a:bodyPr>
+                <a:normAutofit fontScale="92500" lnSpcReduction="10000"/>
+              </a:bodyPr>
+              <a:lstStyle/>
+              <a:p>
+                <a:pPr>
+                  <a:lnSpc>
+                    <a:spcPct val="100000"/>
+                  </a:lnSpc>
+                </a:pPr>
+                <a:r>
+                  <a:rPr lang="ru-RU" dirty="0"/>
+                  <a:t>Ограничения</a:t>
+                </a:r>
+              </a:p>
+              <a:p>
+                <a:pPr lvl="1">
+                  <a:lnSpc>
+                    <a:spcPct val="100000"/>
+                  </a:lnSpc>
+                </a:pPr>
+                <a:r>
+                  <a:rPr lang="ru-RU" dirty="0"/>
+                  <a:t>Вместимость транспорта </a:t>
+                </a:r>
+                <a14:m>
+                  <m:oMath xmlns:m="http://schemas.openxmlformats.org/officeDocument/2006/math">
+                    <m:sSub>
+                      <m:sSubPr>
+                        <m:ctrlPr>
+                          <a:rPr lang="en-US" sz="2000" b="1" i="1" smtClean="0">
+                            <a:latin typeface="Cambria Math" panose="02040503050406030204" pitchFamily="18" charset="0"/>
+                          </a:rPr>
+                        </m:ctrlPr>
+                      </m:sSubPr>
+                      <m:e>
+                        <m:r>
+                          <a:rPr lang="en-US" sz="2000" b="1" i="1">
+                            <a:latin typeface="Cambria Math" panose="02040503050406030204" pitchFamily="18" charset="0"/>
+                          </a:rPr>
+                          <m:t>𝒗</m:t>
+                        </m:r>
+                      </m:e>
+                      <m:sub>
+                        <m:d>
+                          <m:dPr>
+                            <m:begChr m:val="{"/>
+                            <m:endChr m:val="}"/>
+                            <m:ctrlPr>
+                              <a:rPr lang="en-US" sz="2000" b="1" i="1">
+                                <a:latin typeface="Cambria Math" panose="02040503050406030204" pitchFamily="18" charset="0"/>
+                              </a:rPr>
+                            </m:ctrlPr>
+                          </m:dPr>
+                          <m:e>
+                            <m:r>
+                              <a:rPr lang="en-US" sz="2000" b="1" i="1">
+                                <a:latin typeface="Cambria Math" panose="02040503050406030204" pitchFamily="18" charset="0"/>
+                              </a:rPr>
+                              <m:t>𝒊𝒋𝒌</m:t>
+                            </m:r>
+                          </m:e>
+                        </m:d>
+                      </m:sub>
+                    </m:sSub>
+                    <m:r>
+                      <a:rPr lang="en-US" sz="2000" b="1" i="1">
+                        <a:latin typeface="Cambria Math" panose="02040503050406030204" pitchFamily="18" charset="0"/>
+                      </a:rPr>
+                      <m:t>⋅</m:t>
+                    </m:r>
+                    <m:r>
+                      <a:rPr lang="en-US" sz="2000" b="1" i="1">
+                        <a:latin typeface="Cambria Math" panose="02040503050406030204" pitchFamily="18" charset="0"/>
+                      </a:rPr>
+                      <m:t>𝑽𝒐𝒍</m:t>
+                    </m:r>
+                    <m:r>
+                      <a:rPr lang="en-US" sz="2000" b="1" i="1">
+                        <a:latin typeface="Cambria Math" panose="02040503050406030204" pitchFamily="18" charset="0"/>
+                      </a:rPr>
+                      <m:t> ≤</m:t>
+                    </m:r>
+                    <m:sSub>
+                      <m:sSubPr>
+                        <m:ctrlPr>
+                          <a:rPr lang="en-US" sz="2000" b="1" i="1">
+                            <a:latin typeface="Cambria Math" panose="02040503050406030204" pitchFamily="18" charset="0"/>
+                          </a:rPr>
+                        </m:ctrlPr>
+                      </m:sSubPr>
+                      <m:e>
+                        <m:r>
+                          <a:rPr lang="en-US" sz="2000" b="1" i="1">
+                            <a:latin typeface="Cambria Math" panose="02040503050406030204" pitchFamily="18" charset="0"/>
+                          </a:rPr>
+                          <m:t>𝒄</m:t>
+                        </m:r>
+                      </m:e>
+                      <m:sub>
+                        <m:r>
+                          <a:rPr lang="en-US" sz="2000" b="1" i="1">
+                            <a:latin typeface="Cambria Math" panose="02040503050406030204" pitchFamily="18" charset="0"/>
+                          </a:rPr>
+                          <m:t>𝒌</m:t>
+                        </m:r>
+                      </m:sub>
+                    </m:sSub>
+                    <m:r>
+                      <a:rPr lang="en-US" sz="2000" b="1" i="1">
+                        <a:latin typeface="Cambria Math" panose="02040503050406030204" pitchFamily="18" charset="0"/>
+                      </a:rPr>
+                      <m:t>, ∀</m:t>
+                    </m:r>
+                    <m:r>
+                      <a:rPr lang="en-US" sz="2000" b="1" i="1">
+                        <a:latin typeface="Cambria Math" panose="02040503050406030204" pitchFamily="18" charset="0"/>
+                      </a:rPr>
+                      <m:t>𝒊</m:t>
+                    </m:r>
+                    <m:r>
+                      <a:rPr lang="en-US" sz="2000" b="1" i="1">
+                        <a:latin typeface="Cambria Math" panose="02040503050406030204" pitchFamily="18" charset="0"/>
+                      </a:rPr>
+                      <m:t>, </m:t>
+                    </m:r>
+                    <m:r>
+                      <a:rPr lang="en-US" sz="2000" b="1" i="1">
+                        <a:latin typeface="Cambria Math" panose="02040503050406030204" pitchFamily="18" charset="0"/>
+                      </a:rPr>
+                      <m:t>𝒋</m:t>
+                    </m:r>
+                    <m:r>
+                      <a:rPr lang="en-US" sz="2000" b="1" i="1">
+                        <a:latin typeface="Cambria Math" panose="02040503050406030204" pitchFamily="18" charset="0"/>
+                      </a:rPr>
+                      <m:t> ∈</m:t>
+                    </m:r>
+                    <m:bar>
+                      <m:barPr>
+                        <m:pos m:val="top"/>
+                        <m:ctrlPr>
+                          <a:rPr lang="en-US" sz="2000" b="1" i="1">
+                            <a:latin typeface="Cambria Math" panose="02040503050406030204" pitchFamily="18" charset="0"/>
+                          </a:rPr>
+                        </m:ctrlPr>
+                      </m:barPr>
+                      <m:e>
+                        <m:d>
+                          <m:dPr>
+                            <m:begChr m:val="{"/>
+                            <m:endChr m:val="}"/>
+                            <m:ctrlPr>
+                              <a:rPr lang="en-US" sz="2000" b="1" i="1">
+                                <a:latin typeface="Cambria Math" panose="02040503050406030204" pitchFamily="18" charset="0"/>
+                              </a:rPr>
+                            </m:ctrlPr>
+                          </m:dPr>
+                          <m:e>
+                            <m:r>
+                              <a:rPr lang="en-US" sz="2000" b="1" i="1">
+                                <a:latin typeface="Cambria Math" panose="02040503050406030204" pitchFamily="18" charset="0"/>
+                              </a:rPr>
+                              <m:t>𝟏</m:t>
+                            </m:r>
+                            <m:r>
+                              <a:rPr lang="en-US" sz="2000" b="1" i="1">
+                                <a:latin typeface="Cambria Math" panose="02040503050406030204" pitchFamily="18" charset="0"/>
+                              </a:rPr>
+                              <m:t>, </m:t>
+                            </m:r>
+                            <m:sSub>
+                              <m:sSubPr>
+                                <m:ctrlPr>
+                                  <a:rPr lang="en-US" sz="2000" b="1" i="1">
+                                    <a:latin typeface="Cambria Math" panose="02040503050406030204" pitchFamily="18" charset="0"/>
+                                  </a:rPr>
+                                </m:ctrlPr>
+                              </m:sSubPr>
+                              <m:e>
+                                <m:r>
+                                  <a:rPr lang="en-US" sz="2000" b="1" i="1">
+                                    <a:latin typeface="Cambria Math" panose="02040503050406030204" pitchFamily="18" charset="0"/>
+                                  </a:rPr>
+                                  <m:t>𝑵</m:t>
+                                </m:r>
+                              </m:e>
+                              <m:sub>
+                                <m:r>
+                                  <a:rPr lang="en-US" sz="2000" b="1" i="1">
+                                    <a:latin typeface="Cambria Math" panose="02040503050406030204" pitchFamily="18" charset="0"/>
+                                  </a:rPr>
+                                  <m:t>𝒃</m:t>
+                                </m:r>
+                              </m:sub>
+                            </m:sSub>
+                            <m:r>
+                              <a:rPr lang="en-US" sz="2000" b="1" i="1">
+                                <a:latin typeface="Cambria Math" panose="02040503050406030204" pitchFamily="18" charset="0"/>
+                              </a:rPr>
+                              <m:t>+</m:t>
+                            </m:r>
+                            <m:sSub>
+                              <m:sSubPr>
+                                <m:ctrlPr>
+                                  <a:rPr lang="en-US" sz="2000" b="1" i="1">
+                                    <a:latin typeface="Cambria Math" panose="02040503050406030204" pitchFamily="18" charset="0"/>
+                                  </a:rPr>
+                                </m:ctrlPr>
+                              </m:sSubPr>
+                              <m:e>
+                                <m:r>
+                                  <a:rPr lang="en-US" sz="2000" b="1" i="1">
+                                    <a:latin typeface="Cambria Math" panose="02040503050406030204" pitchFamily="18" charset="0"/>
+                                  </a:rPr>
+                                  <m:t>𝑵</m:t>
+                                </m:r>
+                              </m:e>
+                              <m:sub>
+                                <m:r>
+                                  <a:rPr lang="en-US" sz="2000" b="1" i="1">
+                                    <a:latin typeface="Cambria Math" panose="02040503050406030204" pitchFamily="18" charset="0"/>
+                                  </a:rPr>
+                                  <m:t>𝒂</m:t>
+                                </m:r>
+                              </m:sub>
+                            </m:sSub>
+                          </m:e>
+                        </m:d>
+                      </m:e>
+                    </m:bar>
+                    <m:r>
+                      <a:rPr lang="en-US" sz="2000" b="1" i="1">
+                        <a:latin typeface="Cambria Math" panose="02040503050406030204" pitchFamily="18" charset="0"/>
+                      </a:rPr>
+                      <m:t>, </m:t>
+                    </m:r>
+                    <m:r>
+                      <a:rPr lang="ru-RU" sz="2000" b="1" i="1" smtClean="0">
+                        <a:latin typeface="Cambria Math" panose="02040503050406030204" pitchFamily="18" charset="0"/>
+                      </a:rPr>
+                      <m:t> </m:t>
+                    </m:r>
+                    <m:r>
+                      <a:rPr lang="en-US" sz="2000" b="1" i="1">
+                        <a:latin typeface="Cambria Math" panose="02040503050406030204" pitchFamily="18" charset="0"/>
+                      </a:rPr>
+                      <m:t>𝒌</m:t>
+                    </m:r>
+                    <m:r>
+                      <a:rPr lang="en-US" sz="2000" b="1" i="1">
+                        <a:latin typeface="Cambria Math" panose="02040503050406030204" pitchFamily="18" charset="0"/>
+                      </a:rPr>
+                      <m:t> ∈</m:t>
+                    </m:r>
+                    <m:bar>
+                      <m:barPr>
+                        <m:pos m:val="top"/>
+                        <m:ctrlPr>
+                          <a:rPr lang="en-US" sz="2000" b="1" i="1">
+                            <a:latin typeface="Cambria Math" panose="02040503050406030204" pitchFamily="18" charset="0"/>
+                          </a:rPr>
+                        </m:ctrlPr>
+                      </m:barPr>
+                      <m:e>
+                        <m:d>
+                          <m:dPr>
+                            <m:begChr m:val="{"/>
+                            <m:endChr m:val="}"/>
+                            <m:ctrlPr>
+                              <a:rPr lang="en-US" sz="2000" b="1" i="1">
+                                <a:latin typeface="Cambria Math" panose="02040503050406030204" pitchFamily="18" charset="0"/>
+                              </a:rPr>
+                            </m:ctrlPr>
+                          </m:dPr>
+                          <m:e>
+                            <m:r>
+                              <a:rPr lang="en-US" sz="2000" b="1" i="1">
+                                <a:latin typeface="Cambria Math" panose="02040503050406030204" pitchFamily="18" charset="0"/>
+                              </a:rPr>
+                              <m:t>𝟏</m:t>
+                            </m:r>
+                            <m:r>
+                              <a:rPr lang="en-US" sz="2000" b="1" i="1">
+                                <a:latin typeface="Cambria Math" panose="02040503050406030204" pitchFamily="18" charset="0"/>
+                              </a:rPr>
+                              <m:t>, </m:t>
+                            </m:r>
+                            <m:sSub>
+                              <m:sSubPr>
+                                <m:ctrlPr>
+                                  <a:rPr lang="en-US" sz="2000" b="1" i="1">
+                                    <a:latin typeface="Cambria Math" panose="02040503050406030204" pitchFamily="18" charset="0"/>
+                                  </a:rPr>
+                                </m:ctrlPr>
+                              </m:sSubPr>
+                              <m:e>
+                                <m:r>
+                                  <a:rPr lang="en-US" sz="2000" b="1" i="1">
+                                    <a:latin typeface="Cambria Math" panose="02040503050406030204" pitchFamily="18" charset="0"/>
+                                  </a:rPr>
+                                  <m:t>𝑵</m:t>
+                                </m:r>
+                              </m:e>
+                              <m:sub>
+                                <m:r>
+                                  <a:rPr lang="en-US" sz="2000" b="1" i="1">
+                                    <a:latin typeface="Cambria Math" panose="02040503050406030204" pitchFamily="18" charset="0"/>
+                                  </a:rPr>
+                                  <m:t>𝒕</m:t>
+                                </m:r>
+                              </m:sub>
+                            </m:sSub>
+                          </m:e>
+                        </m:d>
+                      </m:e>
+                    </m:bar>
+                  </m:oMath>
+                </a14:m>
+                <a:endParaRPr lang="ru-RU" sz="2000" b="1" dirty="0"/>
+              </a:p>
+              <a:p>
+                <a:pPr lvl="1">
+                  <a:lnSpc>
+                    <a:spcPct val="100000"/>
+                  </a:lnSpc>
+                </a:pPr>
+                <a:r>
+                  <a:rPr lang="ru-RU" dirty="0" err="1"/>
+                  <a:t>Однонаправленность</a:t>
+                </a:r>
+                <a:r>
+                  <a:rPr lang="ru-RU" dirty="0"/>
+                  <a:t> перемещений </a:t>
+                </a:r>
+                <a14:m>
+                  <m:oMath xmlns:m="http://schemas.openxmlformats.org/officeDocument/2006/math">
+                    <m:sSub>
+                      <m:sSubPr>
+                        <m:ctrlPr>
+                          <a:rPr lang="en-US" sz="2000" b="1" i="1" smtClean="0">
+                            <a:latin typeface="Cambria Math" panose="02040503050406030204" pitchFamily="18" charset="0"/>
+                          </a:rPr>
+                        </m:ctrlPr>
+                      </m:sSubPr>
+                      <m:e>
+                        <m:r>
+                          <a:rPr lang="en-US" sz="2000" b="1" i="1">
+                            <a:latin typeface="Cambria Math" panose="02040503050406030204" pitchFamily="18" charset="0"/>
+                          </a:rPr>
+                          <m:t>𝒗</m:t>
+                        </m:r>
+                      </m:e>
+                      <m:sub>
+                        <m:d>
+                          <m:dPr>
+                            <m:begChr m:val="{"/>
+                            <m:endChr m:val="}"/>
+                            <m:ctrlPr>
+                              <a:rPr lang="en-US" sz="2000" b="1" i="1">
+                                <a:latin typeface="Cambria Math" panose="02040503050406030204" pitchFamily="18" charset="0"/>
+                              </a:rPr>
+                            </m:ctrlPr>
+                          </m:dPr>
+                          <m:e>
+                            <m:r>
+                              <a:rPr lang="en-US" sz="2000" b="1" i="1">
+                                <a:latin typeface="Cambria Math" panose="02040503050406030204" pitchFamily="18" charset="0"/>
+                              </a:rPr>
+                              <m:t>𝒊𝒋𝒌</m:t>
+                            </m:r>
+                          </m:e>
+                        </m:d>
+                      </m:sub>
+                    </m:sSub>
+                    <m:r>
+                      <a:rPr lang="en-US" sz="2000" b="1" i="1">
+                        <a:latin typeface="Cambria Math" panose="02040503050406030204" pitchFamily="18" charset="0"/>
+                      </a:rPr>
+                      <m:t>&gt; </m:t>
+                    </m:r>
+                    <m:r>
+                      <a:rPr lang="en-US" sz="2000" b="1" i="1">
+                        <a:latin typeface="Cambria Math" panose="02040503050406030204" pitchFamily="18" charset="0"/>
+                      </a:rPr>
+                      <m:t>𝟎</m:t>
+                    </m:r>
+                    <m:r>
+                      <a:rPr lang="en-US" sz="2000" b="1" i="1">
+                        <a:latin typeface="Cambria Math" panose="02040503050406030204" pitchFamily="18" charset="0"/>
+                      </a:rPr>
+                      <m:t> ⇒ </m:t>
+                    </m:r>
+                    <m:sSub>
+                      <m:sSubPr>
+                        <m:ctrlPr>
+                          <a:rPr lang="en-US" sz="2000" b="1" i="1">
+                            <a:latin typeface="Cambria Math" panose="02040503050406030204" pitchFamily="18" charset="0"/>
+                          </a:rPr>
+                        </m:ctrlPr>
+                      </m:sSubPr>
+                      <m:e>
+                        <m:r>
+                          <a:rPr lang="en-US" sz="2000" b="1" i="1">
+                            <a:latin typeface="Cambria Math" panose="02040503050406030204" pitchFamily="18" charset="0"/>
+                          </a:rPr>
+                          <m:t>𝒗</m:t>
+                        </m:r>
+                      </m:e>
+                      <m:sub>
+                        <m:d>
+                          <m:dPr>
+                            <m:begChr m:val="{"/>
+                            <m:endChr m:val="}"/>
+                            <m:ctrlPr>
+                              <a:rPr lang="en-US" sz="2000" b="1" i="1">
+                                <a:latin typeface="Cambria Math" panose="02040503050406030204" pitchFamily="18" charset="0"/>
+                              </a:rPr>
+                            </m:ctrlPr>
+                          </m:dPr>
+                          <m:e>
+                            <m:r>
+                              <a:rPr lang="en-US" sz="2000" b="1" i="1">
+                                <a:latin typeface="Cambria Math" panose="02040503050406030204" pitchFamily="18" charset="0"/>
+                              </a:rPr>
+                              <m:t>𝒋𝒊𝒌</m:t>
+                            </m:r>
+                          </m:e>
+                        </m:d>
+                      </m:sub>
+                    </m:sSub>
+                    <m:r>
+                      <a:rPr lang="en-US" sz="2000" b="1" i="1">
+                        <a:latin typeface="Cambria Math" panose="02040503050406030204" pitchFamily="18" charset="0"/>
+                      </a:rPr>
+                      <m:t>= </m:t>
+                    </m:r>
+                    <m:r>
+                      <a:rPr lang="en-US" sz="2000" b="1" i="1">
+                        <a:latin typeface="Cambria Math" panose="02040503050406030204" pitchFamily="18" charset="0"/>
+                      </a:rPr>
+                      <m:t>𝟎</m:t>
+                    </m:r>
+                  </m:oMath>
+                </a14:m>
+                <a:endParaRPr lang="ru-RU" sz="2000" b="1" dirty="0"/>
+              </a:p>
+              <a:p>
+                <a:pPr lvl="1">
+                  <a:lnSpc>
+                    <a:spcPct val="100000"/>
+                  </a:lnSpc>
+                </a:pPr>
+                <a:r>
+                  <a:rPr lang="ru-RU" dirty="0"/>
+                  <a:t>Удовлетворение запросов </a:t>
+                </a:r>
+                <a14:m>
+                  <m:oMath xmlns:m="http://schemas.openxmlformats.org/officeDocument/2006/math">
+                    <m:sSub>
+                      <m:sSubPr>
+                        <m:ctrlPr>
+                          <a:rPr lang="en-US" sz="2000" b="1" i="1" smtClean="0">
+                            <a:latin typeface="Cambria Math" panose="02040503050406030204" pitchFamily="18" charset="0"/>
+                          </a:rPr>
+                        </m:ctrlPr>
+                      </m:sSubPr>
+                      <m:e>
+                        <m:r>
+                          <a:rPr lang="en-US" sz="2000" b="1" i="1">
+                            <a:latin typeface="Cambria Math" panose="02040503050406030204" pitchFamily="18" charset="0"/>
+                          </a:rPr>
+                          <m:t>𝒂</m:t>
+                        </m:r>
+                      </m:e>
+                      <m:sub>
+                        <m:r>
+                          <a:rPr lang="en-US" sz="2000" b="1" i="1">
+                            <a:latin typeface="Cambria Math" panose="02040503050406030204" pitchFamily="18" charset="0"/>
+                          </a:rPr>
+                          <m:t>𝒊</m:t>
+                        </m:r>
+                      </m:sub>
+                    </m:sSub>
+                    <m:r>
+                      <a:rPr lang="en-US" sz="2000" b="1" i="1">
+                        <a:latin typeface="Cambria Math" panose="02040503050406030204" pitchFamily="18" charset="0"/>
+                      </a:rPr>
+                      <m:t>+ </m:t>
+                    </m:r>
+                    <m:nary>
+                      <m:naryPr>
+                        <m:chr m:val="∑"/>
+                        <m:ctrlPr>
+                          <a:rPr lang="en-US" sz="2000" b="1" i="1">
+                            <a:latin typeface="Cambria Math" panose="02040503050406030204" pitchFamily="18" charset="0"/>
+                          </a:rPr>
+                        </m:ctrlPr>
+                      </m:naryPr>
+                      <m:sub>
+                        <m:d>
+                          <m:dPr>
+                            <m:begChr m:val="{"/>
+                            <m:endChr m:val="}"/>
+                            <m:ctrlPr>
+                              <a:rPr lang="en-US" sz="2000" b="1" i="1">
+                                <a:latin typeface="Cambria Math" panose="02040503050406030204" pitchFamily="18" charset="0"/>
+                              </a:rPr>
+                            </m:ctrlPr>
+                          </m:dPr>
+                          <m:e>
+                            <m:r>
+                              <a:rPr lang="en-US" sz="2000" b="1" i="1">
+                                <a:latin typeface="Cambria Math" panose="02040503050406030204" pitchFamily="18" charset="0"/>
+                              </a:rPr>
+                              <m:t>𝒋</m:t>
+                            </m:r>
+                            <m:r>
+                              <a:rPr lang="en-US" sz="2000" b="1" i="1">
+                                <a:latin typeface="Cambria Math" panose="02040503050406030204" pitchFamily="18" charset="0"/>
+                              </a:rPr>
+                              <m:t>=</m:t>
+                            </m:r>
+                            <m:r>
+                              <a:rPr lang="en-US" sz="2000" b="1" i="1">
+                                <a:latin typeface="Cambria Math" panose="02040503050406030204" pitchFamily="18" charset="0"/>
+                              </a:rPr>
+                              <m:t>𝟏</m:t>
+                            </m:r>
+                          </m:e>
+                        </m:d>
+                      </m:sub>
+                      <m:sup>
+                        <m:sSub>
+                          <m:sSubPr>
+                            <m:ctrlPr>
+                              <a:rPr lang="en-US" sz="2000" b="1" i="1">
+                                <a:latin typeface="Cambria Math" panose="02040503050406030204" pitchFamily="18" charset="0"/>
+                              </a:rPr>
+                            </m:ctrlPr>
+                          </m:sSubPr>
+                          <m:e>
+                            <m:r>
+                              <a:rPr lang="en-US" sz="2000" b="1" i="1">
+                                <a:latin typeface="Cambria Math" panose="02040503050406030204" pitchFamily="18" charset="0"/>
+                              </a:rPr>
+                              <m:t>𝑵</m:t>
+                            </m:r>
+                          </m:e>
+                          <m:sub>
+                            <m:r>
+                              <a:rPr lang="en-US" sz="2000" b="1" i="1">
+                                <a:latin typeface="Cambria Math" panose="02040503050406030204" pitchFamily="18" charset="0"/>
+                              </a:rPr>
+                              <m:t>𝒃</m:t>
+                            </m:r>
+                          </m:sub>
+                        </m:sSub>
+                        <m:r>
+                          <a:rPr lang="en-US" sz="2000" b="1" i="1">
+                            <a:latin typeface="Cambria Math" panose="02040503050406030204" pitchFamily="18" charset="0"/>
+                          </a:rPr>
+                          <m:t>+</m:t>
+                        </m:r>
+                        <m:sSub>
+                          <m:sSubPr>
+                            <m:ctrlPr>
+                              <a:rPr lang="en-US" sz="2000" b="1" i="1">
+                                <a:latin typeface="Cambria Math" panose="02040503050406030204" pitchFamily="18" charset="0"/>
+                              </a:rPr>
+                            </m:ctrlPr>
+                          </m:sSubPr>
+                          <m:e>
+                            <m:r>
+                              <a:rPr lang="en-US" sz="2000" b="1" i="1">
+                                <a:latin typeface="Cambria Math" panose="02040503050406030204" pitchFamily="18" charset="0"/>
+                              </a:rPr>
+                              <m:t>𝑵</m:t>
+                            </m:r>
+                          </m:e>
+                          <m:sub>
+                            <m:r>
+                              <a:rPr lang="en-US" sz="2000" b="1" i="1">
+                                <a:latin typeface="Cambria Math" panose="02040503050406030204" pitchFamily="18" charset="0"/>
+                              </a:rPr>
+                              <m:t>𝒂</m:t>
+                            </m:r>
+                          </m:sub>
+                        </m:sSub>
+                      </m:sup>
+                      <m:e>
+                        <m:nary>
+                          <m:naryPr>
+                            <m:chr m:val="∑"/>
+                            <m:ctrlPr>
+                              <a:rPr lang="en-US" sz="2000" b="1" i="1">
+                                <a:latin typeface="Cambria Math" panose="02040503050406030204" pitchFamily="18" charset="0"/>
+                              </a:rPr>
+                            </m:ctrlPr>
+                          </m:naryPr>
+                          <m:sub>
+                            <m:d>
+                              <m:dPr>
+                                <m:begChr m:val="{"/>
+                                <m:endChr m:val="}"/>
+                                <m:ctrlPr>
+                                  <a:rPr lang="en-US" sz="2000" b="1" i="1">
+                                    <a:latin typeface="Cambria Math" panose="02040503050406030204" pitchFamily="18" charset="0"/>
+                                  </a:rPr>
+                                </m:ctrlPr>
+                              </m:dPr>
+                              <m:e>
+                                <m:r>
+                                  <a:rPr lang="en-US" sz="2000" b="1" i="1">
+                                    <a:latin typeface="Cambria Math" panose="02040503050406030204" pitchFamily="18" charset="0"/>
+                                  </a:rPr>
+                                  <m:t>𝒌</m:t>
+                                </m:r>
+                                <m:r>
+                                  <a:rPr lang="en-US" sz="2000" b="1" i="1">
+                                    <a:latin typeface="Cambria Math" panose="02040503050406030204" pitchFamily="18" charset="0"/>
+                                  </a:rPr>
+                                  <m:t>=</m:t>
+                                </m:r>
+                                <m:r>
+                                  <a:rPr lang="en-US" sz="2000" b="1" i="1">
+                                    <a:latin typeface="Cambria Math" panose="02040503050406030204" pitchFamily="18" charset="0"/>
+                                  </a:rPr>
+                                  <m:t>𝟏</m:t>
+                                </m:r>
+                              </m:e>
+                            </m:d>
+                          </m:sub>
+                          <m:sup>
+                            <m:sSub>
+                              <m:sSubPr>
+                                <m:ctrlPr>
+                                  <a:rPr lang="en-US" sz="2000" b="1" i="1">
+                                    <a:latin typeface="Cambria Math" panose="02040503050406030204" pitchFamily="18" charset="0"/>
+                                  </a:rPr>
+                                </m:ctrlPr>
+                              </m:sSubPr>
+                              <m:e>
+                                <m:r>
+                                  <a:rPr lang="en-US" sz="2000" b="1" i="1">
+                                    <a:latin typeface="Cambria Math" panose="02040503050406030204" pitchFamily="18" charset="0"/>
+                                  </a:rPr>
+                                  <m:t>𝑵</m:t>
+                                </m:r>
+                              </m:e>
+                              <m:sub>
+                                <m:r>
+                                  <a:rPr lang="en-US" sz="2000" b="1" i="1">
+                                    <a:latin typeface="Cambria Math" panose="02040503050406030204" pitchFamily="18" charset="0"/>
+                                  </a:rPr>
+                                  <m:t>𝒕</m:t>
+                                </m:r>
+                              </m:sub>
+                            </m:sSub>
+                          </m:sup>
+                          <m:e>
+                            <m:r>
+                              <a:rPr lang="en-US" sz="2000" b="1" i="1" smtClean="0">
+                                <a:latin typeface="Cambria Math" panose="02040503050406030204" pitchFamily="18" charset="0"/>
+                              </a:rPr>
+                              <m:t>(</m:t>
+                            </m:r>
+                            <m:sSub>
+                              <m:sSubPr>
+                                <m:ctrlPr>
+                                  <a:rPr lang="en-US" sz="2000" b="1" i="1">
+                                    <a:latin typeface="Cambria Math" panose="02040503050406030204" pitchFamily="18" charset="0"/>
+                                  </a:rPr>
+                                </m:ctrlPr>
+                              </m:sSubPr>
+                              <m:e>
+                                <m:r>
+                                  <a:rPr lang="en-US" sz="2000" b="1" i="1">
+                                    <a:latin typeface="Cambria Math" panose="02040503050406030204" pitchFamily="18" charset="0"/>
+                                  </a:rPr>
+                                  <m:t>𝒗</m:t>
+                                </m:r>
+                              </m:e>
+                              <m:sub>
+                                <m:r>
+                                  <a:rPr lang="en-US" sz="2000" b="1" i="1">
+                                    <a:latin typeface="Cambria Math" panose="02040503050406030204" pitchFamily="18" charset="0"/>
+                                  </a:rPr>
+                                  <m:t>𝒋𝒊𝒌</m:t>
+                                </m:r>
+                              </m:sub>
+                            </m:sSub>
+                            <m:r>
+                              <a:rPr lang="en-US" sz="2000" b="1" i="1">
+                                <a:latin typeface="Cambria Math" panose="02040503050406030204" pitchFamily="18" charset="0"/>
+                              </a:rPr>
+                              <m:t>− </m:t>
+                            </m:r>
+                            <m:sSub>
+                              <m:sSubPr>
+                                <m:ctrlPr>
+                                  <a:rPr lang="en-US" sz="2000" b="1" i="1">
+                                    <a:latin typeface="Cambria Math" panose="02040503050406030204" pitchFamily="18" charset="0"/>
+                                  </a:rPr>
+                                </m:ctrlPr>
+                              </m:sSubPr>
+                              <m:e>
+                                <m:r>
+                                  <a:rPr lang="en-US" sz="2000" b="1" i="1">
+                                    <a:latin typeface="Cambria Math" panose="02040503050406030204" pitchFamily="18" charset="0"/>
+                                  </a:rPr>
+                                  <m:t>𝒗</m:t>
+                                </m:r>
+                              </m:e>
+                              <m:sub>
+                                <m:d>
+                                  <m:dPr>
+                                    <m:begChr m:val="{"/>
+                                    <m:endChr m:val="}"/>
+                                    <m:ctrlPr>
+                                      <a:rPr lang="en-US" sz="2000" b="1" i="1">
+                                        <a:latin typeface="Cambria Math" panose="02040503050406030204" pitchFamily="18" charset="0"/>
+                                      </a:rPr>
+                                    </m:ctrlPr>
+                                  </m:dPr>
+                                  <m:e>
+                                    <m:r>
+                                      <a:rPr lang="en-US" sz="2000" b="1" i="1">
+                                        <a:latin typeface="Cambria Math" panose="02040503050406030204" pitchFamily="18" charset="0"/>
+                                      </a:rPr>
+                                      <m:t>𝒊𝒋𝒌</m:t>
+                                    </m:r>
+                                  </m:e>
+                                </m:d>
+                              </m:sub>
+                            </m:sSub>
+                            <m:r>
+                              <a:rPr lang="en-US" sz="2000" b="1" i="1" smtClean="0">
+                                <a:latin typeface="Cambria Math" panose="02040503050406030204" pitchFamily="18" charset="0"/>
+                              </a:rPr>
+                              <m:t>)</m:t>
+                            </m:r>
+                          </m:e>
+                        </m:nary>
+                      </m:e>
+                    </m:nary>
+                    <m:r>
+                      <a:rPr lang="en-US" sz="2000" b="1" i="1">
+                        <a:latin typeface="Cambria Math" panose="02040503050406030204" pitchFamily="18" charset="0"/>
+                      </a:rPr>
+                      <m:t>≥</m:t>
+                    </m:r>
+                    <m:r>
+                      <a:rPr lang="en-US" sz="2000" b="1" i="1">
+                        <a:latin typeface="Cambria Math" panose="02040503050406030204" pitchFamily="18" charset="0"/>
+                      </a:rPr>
+                      <m:t>𝟎</m:t>
+                    </m:r>
+                  </m:oMath>
+                </a14:m>
+                <a:endParaRPr lang="ru-RU" sz="2000" b="1" dirty="0"/>
+              </a:p>
+              <a:p>
+                <a:pPr lvl="1">
+                  <a:lnSpc>
+                    <a:spcPct val="100000"/>
+                  </a:lnSpc>
+                </a:pPr>
+                <a:r>
+                  <a:rPr lang="ru-RU" dirty="0"/>
+                  <a:t>Транспорт может въехать и выехать из пункта только одним путём </a:t>
+                </a:r>
+                <a:r>
+                  <a:rPr lang="en-US" dirty="0"/>
+                  <a:t> </a:t>
+                </a:r>
+              </a:p>
+              <a:p>
+                <a:pPr marL="457200" lvl="1" indent="0">
+                  <a:lnSpc>
+                    <a:spcPct val="100000"/>
+                  </a:lnSpc>
+                  <a:buNone/>
+                </a:pPr>
+                <a14:m>
+                  <m:oMathPara xmlns:m="http://schemas.openxmlformats.org/officeDocument/2006/math">
+                    <m:oMathParaPr>
+                      <m:jc m:val="centerGroup"/>
+                    </m:oMathParaPr>
+                    <m:oMath xmlns:m="http://schemas.openxmlformats.org/officeDocument/2006/math">
+                      <m:d>
+                        <m:dPr>
+                          <m:begChr m:val="{"/>
+                          <m:endChr m:val=""/>
+                          <m:ctrlPr>
+                            <a:rPr lang="ru-RU" i="1" smtClean="0">
+                              <a:latin typeface="Cambria Math" panose="02040503050406030204" pitchFamily="18" charset="0"/>
+                            </a:rPr>
+                          </m:ctrlPr>
+                        </m:dPr>
+                        <m:e>
+                          <m:eqArr>
+                            <m:eqArrPr>
+                              <m:ctrlPr>
+                                <a:rPr lang="ru-RU" i="1" smtClean="0">
+                                  <a:latin typeface="Cambria Math" panose="02040503050406030204" pitchFamily="18" charset="0"/>
+                                </a:rPr>
+                              </m:ctrlPr>
+                            </m:eqArrPr>
+                            <m:e>
+                              <m:r>
+                                <a:rPr lang="ru-RU" i="1" smtClean="0">
+                                  <a:latin typeface="Cambria Math" panose="02040503050406030204" pitchFamily="18" charset="0"/>
+                                  <a:ea typeface="Cambria Math" panose="02040503050406030204" pitchFamily="18" charset="0"/>
+                                </a:rPr>
+                                <m:t>∄</m:t>
+                              </m:r>
+                              <m:r>
+                                <a:rPr lang="pl-PL" i="1">
+                                  <a:latin typeface="Cambria Math" panose="02040503050406030204" pitchFamily="18" charset="0"/>
+                                  <a:ea typeface="Cambria Math" panose="02040503050406030204" pitchFamily="18" charset="0"/>
+                                </a:rPr>
+                                <m:t>𝑖</m:t>
+                              </m:r>
+                              <m:r>
+                                <a:rPr lang="pl-PL" i="1">
+                                  <a:latin typeface="Cambria Math" panose="02040503050406030204" pitchFamily="18" charset="0"/>
+                                  <a:ea typeface="Cambria Math" panose="02040503050406030204" pitchFamily="18" charset="0"/>
+                                </a:rPr>
+                                <m:t>, </m:t>
+                              </m:r>
+                              <m:r>
+                                <a:rPr lang="pl-PL" i="1">
+                                  <a:latin typeface="Cambria Math" panose="02040503050406030204" pitchFamily="18" charset="0"/>
+                                  <a:ea typeface="Cambria Math" panose="02040503050406030204" pitchFamily="18" charset="0"/>
+                                </a:rPr>
+                                <m:t>𝑘</m:t>
+                              </m:r>
+                              <m:r>
+                                <a:rPr lang="pl-PL" i="1">
+                                  <a:latin typeface="Cambria Math" panose="02040503050406030204" pitchFamily="18" charset="0"/>
+                                  <a:ea typeface="Cambria Math" panose="02040503050406030204" pitchFamily="18" charset="0"/>
+                                </a:rPr>
+                                <m:t>, </m:t>
+                              </m:r>
+                              <m:sSub>
+                                <m:sSubPr>
+                                  <m:ctrlPr>
+                                    <a:rPr lang="pl-PL" i="1">
+                                      <a:latin typeface="Cambria Math" panose="02040503050406030204" pitchFamily="18" charset="0"/>
+                                      <a:ea typeface="Cambria Math" panose="02040503050406030204" pitchFamily="18" charset="0"/>
+                                    </a:rPr>
+                                  </m:ctrlPr>
+                                </m:sSubPr>
+                                <m:e>
+                                  <m:r>
+                                    <a:rPr lang="pl-PL" i="1">
+                                      <a:latin typeface="Cambria Math" panose="02040503050406030204" pitchFamily="18" charset="0"/>
+                                      <a:ea typeface="Cambria Math" panose="02040503050406030204" pitchFamily="18" charset="0"/>
+                                    </a:rPr>
+                                    <m:t>𝑗</m:t>
+                                  </m:r>
+                                </m:e>
+                                <m:sub>
+                                  <m:r>
+                                    <a:rPr lang="pl-PL" i="1">
+                                      <a:latin typeface="Cambria Math" panose="02040503050406030204" pitchFamily="18" charset="0"/>
+                                      <a:ea typeface="Cambria Math" panose="02040503050406030204" pitchFamily="18" charset="0"/>
+                                    </a:rPr>
+                                    <m:t>1</m:t>
+                                  </m:r>
+                                </m:sub>
+                              </m:sSub>
+                              <m:r>
+                                <a:rPr lang="pl-PL" i="1">
+                                  <a:latin typeface="Cambria Math" panose="02040503050406030204" pitchFamily="18" charset="0"/>
+                                  <a:ea typeface="Cambria Math" panose="02040503050406030204" pitchFamily="18" charset="0"/>
+                                </a:rPr>
+                                <m:t>, </m:t>
+                              </m:r>
+                              <m:sSub>
+                                <m:sSubPr>
+                                  <m:ctrlPr>
+                                    <a:rPr lang="pl-PL" i="1">
+                                      <a:latin typeface="Cambria Math" panose="02040503050406030204" pitchFamily="18" charset="0"/>
+                                      <a:ea typeface="Cambria Math" panose="02040503050406030204" pitchFamily="18" charset="0"/>
+                                    </a:rPr>
+                                  </m:ctrlPr>
+                                </m:sSubPr>
+                                <m:e>
+                                  <m:r>
+                                    <a:rPr lang="pl-PL" i="1">
+                                      <a:latin typeface="Cambria Math" panose="02040503050406030204" pitchFamily="18" charset="0"/>
+                                      <a:ea typeface="Cambria Math" panose="02040503050406030204" pitchFamily="18" charset="0"/>
+                                    </a:rPr>
+                                    <m:t>𝑗</m:t>
+                                  </m:r>
+                                </m:e>
+                                <m:sub>
+                                  <m:r>
+                                    <a:rPr lang="pl-PL" i="1">
+                                      <a:latin typeface="Cambria Math" panose="02040503050406030204" pitchFamily="18" charset="0"/>
+                                      <a:ea typeface="Cambria Math" panose="02040503050406030204" pitchFamily="18" charset="0"/>
+                                    </a:rPr>
+                                    <m:t>2</m:t>
+                                  </m:r>
+                                </m:sub>
+                              </m:sSub>
+                              <m:r>
+                                <a:rPr lang="pl-PL" i="1">
+                                  <a:latin typeface="Cambria Math" panose="02040503050406030204" pitchFamily="18" charset="0"/>
+                                  <a:ea typeface="Cambria Math" panose="02040503050406030204" pitchFamily="18" charset="0"/>
+                                </a:rPr>
+                                <m:t>:</m:t>
+                              </m:r>
+                              <m:r>
+                                <a:rPr lang="en-US" b="0" i="1" smtClean="0">
+                                  <a:latin typeface="Cambria Math" panose="02040503050406030204" pitchFamily="18" charset="0"/>
+                                  <a:ea typeface="Cambria Math" panose="02040503050406030204" pitchFamily="18" charset="0"/>
+                                </a:rPr>
+                                <m:t>  </m:t>
+                              </m:r>
+                              <m:sSub>
+                                <m:sSubPr>
+                                  <m:ctrlPr>
+                                    <a:rPr lang="en-US" i="1">
+                                      <a:latin typeface="Cambria Math" panose="02040503050406030204" pitchFamily="18" charset="0"/>
+                                      <a:ea typeface="Cambria Math" panose="02040503050406030204" pitchFamily="18" charset="0"/>
+                                    </a:rPr>
+                                  </m:ctrlPr>
+                                </m:sSubPr>
+                                <m:e>
+                                  <m:r>
+                                    <a:rPr lang="en-US" i="1">
+                                      <a:latin typeface="Cambria Math" panose="02040503050406030204" pitchFamily="18" charset="0"/>
+                                      <a:ea typeface="Cambria Math" panose="02040503050406030204" pitchFamily="18" charset="0"/>
+                                    </a:rPr>
+                                    <m:t>𝑗</m:t>
+                                  </m:r>
+                                </m:e>
+                                <m:sub>
+                                  <m:r>
+                                    <a:rPr lang="en-US" i="1">
+                                      <a:latin typeface="Cambria Math" panose="02040503050406030204" pitchFamily="18" charset="0"/>
+                                      <a:ea typeface="Cambria Math" panose="02040503050406030204" pitchFamily="18" charset="0"/>
+                                    </a:rPr>
+                                    <m:t>1</m:t>
+                                  </m:r>
+                                </m:sub>
+                              </m:sSub>
+                              <m:r>
+                                <a:rPr lang="en-US" i="1" smtClean="0">
+                                  <a:latin typeface="Cambria Math" panose="02040503050406030204" pitchFamily="18" charset="0"/>
+                                  <a:ea typeface="Cambria Math" panose="02040503050406030204" pitchFamily="18" charset="0"/>
+                                </a:rPr>
+                                <m:t>≠</m:t>
+                              </m:r>
+                              <m:r>
+                                <a:rPr lang="en-US" i="1">
+                                  <a:latin typeface="Cambria Math" panose="02040503050406030204" pitchFamily="18" charset="0"/>
+                                  <a:ea typeface="Cambria Math" panose="02040503050406030204" pitchFamily="18" charset="0"/>
+                                </a:rPr>
+                                <m:t> </m:t>
+                              </m:r>
+                              <m:sSub>
+                                <m:sSubPr>
+                                  <m:ctrlPr>
+                                    <a:rPr lang="en-US" i="1">
+                                      <a:latin typeface="Cambria Math" panose="02040503050406030204" pitchFamily="18" charset="0"/>
+                                      <a:ea typeface="Cambria Math" panose="02040503050406030204" pitchFamily="18" charset="0"/>
+                                    </a:rPr>
+                                  </m:ctrlPr>
+                                </m:sSubPr>
+                                <m:e>
+                                  <m:r>
+                                    <a:rPr lang="en-US" i="1">
+                                      <a:latin typeface="Cambria Math" panose="02040503050406030204" pitchFamily="18" charset="0"/>
+                                      <a:ea typeface="Cambria Math" panose="02040503050406030204" pitchFamily="18" charset="0"/>
+                                    </a:rPr>
+                                    <m:t>𝑗</m:t>
+                                  </m:r>
+                                </m:e>
+                                <m:sub>
+                                  <m:r>
+                                    <a:rPr lang="en-US" i="1">
+                                      <a:latin typeface="Cambria Math" panose="02040503050406030204" pitchFamily="18" charset="0"/>
+                                      <a:ea typeface="Cambria Math" panose="02040503050406030204" pitchFamily="18" charset="0"/>
+                                    </a:rPr>
+                                    <m:t>2</m:t>
+                                  </m:r>
+                                </m:sub>
+                              </m:sSub>
+                              <m:r>
+                                <a:rPr lang="en-US" i="1">
+                                  <a:latin typeface="Cambria Math" panose="02040503050406030204" pitchFamily="18" charset="0"/>
+                                  <a:ea typeface="Cambria Math" panose="02040503050406030204" pitchFamily="18" charset="0"/>
+                                </a:rPr>
+                                <m:t>, </m:t>
+                              </m:r>
+                              <m:sSub>
+                                <m:sSubPr>
+                                  <m:ctrlPr>
+                                    <a:rPr lang="en-US" i="1">
+                                      <a:latin typeface="Cambria Math" panose="02040503050406030204" pitchFamily="18" charset="0"/>
+                                      <a:ea typeface="Cambria Math" panose="02040503050406030204" pitchFamily="18" charset="0"/>
+                                    </a:rPr>
+                                  </m:ctrlPr>
+                                </m:sSubPr>
+                                <m:e>
+                                  <m:r>
+                                    <a:rPr lang="en-US" i="1">
+                                      <a:latin typeface="Cambria Math" panose="02040503050406030204" pitchFamily="18" charset="0"/>
+                                      <a:ea typeface="Cambria Math" panose="02040503050406030204" pitchFamily="18" charset="0"/>
+                                    </a:rPr>
+                                    <m:t>𝑣</m:t>
+                                  </m:r>
+                                </m:e>
+                                <m:sub>
+                                  <m:r>
+                                    <a:rPr lang="en-US" i="1">
+                                      <a:latin typeface="Cambria Math" panose="02040503050406030204" pitchFamily="18" charset="0"/>
+                                      <a:ea typeface="Cambria Math" panose="02040503050406030204" pitchFamily="18" charset="0"/>
+                                    </a:rPr>
+                                    <m:t>𝑖</m:t>
+                                  </m:r>
+                                  <m:sSub>
+                                    <m:sSubPr>
+                                      <m:ctrlPr>
+                                        <a:rPr lang="en-US" i="1">
+                                          <a:latin typeface="Cambria Math" panose="02040503050406030204" pitchFamily="18" charset="0"/>
+                                          <a:ea typeface="Cambria Math" panose="02040503050406030204" pitchFamily="18" charset="0"/>
+                                        </a:rPr>
+                                      </m:ctrlPr>
+                                    </m:sSubPr>
+                                    <m:e>
+                                      <m:r>
+                                        <a:rPr lang="en-US" i="1">
+                                          <a:latin typeface="Cambria Math" panose="02040503050406030204" pitchFamily="18" charset="0"/>
+                                          <a:ea typeface="Cambria Math" panose="02040503050406030204" pitchFamily="18" charset="0"/>
+                                        </a:rPr>
+                                        <m:t>𝑗</m:t>
+                                      </m:r>
+                                    </m:e>
+                                    <m:sub>
+                                      <m:r>
+                                        <a:rPr lang="en-US" i="1">
+                                          <a:latin typeface="Cambria Math" panose="02040503050406030204" pitchFamily="18" charset="0"/>
+                                          <a:ea typeface="Cambria Math" panose="02040503050406030204" pitchFamily="18" charset="0"/>
+                                        </a:rPr>
+                                        <m:t>1</m:t>
+                                      </m:r>
+                                    </m:sub>
+                                  </m:sSub>
+                                  <m:r>
+                                    <a:rPr lang="en-US" b="0" i="1" smtClean="0">
+                                      <a:latin typeface="Cambria Math" panose="02040503050406030204" pitchFamily="18" charset="0"/>
+                                      <a:ea typeface="Cambria Math" panose="02040503050406030204" pitchFamily="18" charset="0"/>
+                                    </a:rPr>
+                                    <m:t>𝑘</m:t>
+                                  </m:r>
+                                </m:sub>
+                              </m:sSub>
+                              <m:r>
+                                <a:rPr lang="en-US" i="1">
+                                  <a:latin typeface="Cambria Math" panose="02040503050406030204" pitchFamily="18" charset="0"/>
+                                  <a:ea typeface="Cambria Math" panose="02040503050406030204" pitchFamily="18" charset="0"/>
+                                </a:rPr>
+                                <m:t>&gt; 0, </m:t>
+                              </m:r>
+                              <m:sSub>
+                                <m:sSubPr>
+                                  <m:ctrlPr>
+                                    <a:rPr lang="en-US" i="1">
+                                      <a:latin typeface="Cambria Math" panose="02040503050406030204" pitchFamily="18" charset="0"/>
+                                      <a:ea typeface="Cambria Math" panose="02040503050406030204" pitchFamily="18" charset="0"/>
+                                    </a:rPr>
+                                  </m:ctrlPr>
+                                </m:sSubPr>
+                                <m:e>
+                                  <m:r>
+                                    <a:rPr lang="en-US" i="1">
+                                      <a:latin typeface="Cambria Math" panose="02040503050406030204" pitchFamily="18" charset="0"/>
+                                      <a:ea typeface="Cambria Math" panose="02040503050406030204" pitchFamily="18" charset="0"/>
+                                    </a:rPr>
+                                    <m:t>𝑣</m:t>
+                                  </m:r>
+                                </m:e>
+                                <m:sub>
+                                  <m:r>
+                                    <a:rPr lang="en-US" i="1">
+                                      <a:latin typeface="Cambria Math" panose="02040503050406030204" pitchFamily="18" charset="0"/>
+                                      <a:ea typeface="Cambria Math" panose="02040503050406030204" pitchFamily="18" charset="0"/>
+                                    </a:rPr>
+                                    <m:t>𝑖</m:t>
+                                  </m:r>
+                                  <m:sSub>
+                                    <m:sSubPr>
+                                      <m:ctrlPr>
+                                        <a:rPr lang="en-US" i="1">
+                                          <a:latin typeface="Cambria Math" panose="02040503050406030204" pitchFamily="18" charset="0"/>
+                                          <a:ea typeface="Cambria Math" panose="02040503050406030204" pitchFamily="18" charset="0"/>
+                                        </a:rPr>
+                                      </m:ctrlPr>
+                                    </m:sSubPr>
+                                    <m:e>
+                                      <m:r>
+                                        <a:rPr lang="en-US" i="1">
+                                          <a:latin typeface="Cambria Math" panose="02040503050406030204" pitchFamily="18" charset="0"/>
+                                          <a:ea typeface="Cambria Math" panose="02040503050406030204" pitchFamily="18" charset="0"/>
+                                        </a:rPr>
+                                        <m:t>𝑗</m:t>
+                                      </m:r>
+                                    </m:e>
+                                    <m:sub>
+                                      <m:r>
+                                        <a:rPr lang="en-US" i="1">
+                                          <a:latin typeface="Cambria Math" panose="02040503050406030204" pitchFamily="18" charset="0"/>
+                                          <a:ea typeface="Cambria Math" panose="02040503050406030204" pitchFamily="18" charset="0"/>
+                                        </a:rPr>
+                                        <m:t>2</m:t>
+                                      </m:r>
+                                    </m:sub>
+                                  </m:sSub>
+                                  <m:r>
+                                    <a:rPr lang="en-US" b="0" i="1" smtClean="0">
+                                      <a:latin typeface="Cambria Math" panose="02040503050406030204" pitchFamily="18" charset="0"/>
+                                      <a:ea typeface="Cambria Math" panose="02040503050406030204" pitchFamily="18" charset="0"/>
+                                    </a:rPr>
+                                    <m:t>𝑘</m:t>
+                                  </m:r>
+                                </m:sub>
+                              </m:sSub>
+                              <m:r>
+                                <a:rPr lang="en-US" i="1">
+                                  <a:latin typeface="Cambria Math" panose="02040503050406030204" pitchFamily="18" charset="0"/>
+                                  <a:ea typeface="Cambria Math" panose="02040503050406030204" pitchFamily="18" charset="0"/>
+                                </a:rPr>
+                                <m:t>&gt; 0</m:t>
+                              </m:r>
+                            </m:e>
+                            <m:e>
+                              <m:r>
+                                <a:rPr lang="ru-RU" i="1">
+                                  <a:latin typeface="Cambria Math" panose="02040503050406030204" pitchFamily="18" charset="0"/>
+                                  <a:ea typeface="Cambria Math" panose="02040503050406030204" pitchFamily="18" charset="0"/>
+                                </a:rPr>
+                                <m:t>∄</m:t>
+                              </m:r>
+                              <m:r>
+                                <a:rPr lang="en-US" b="0" i="1" smtClean="0">
+                                  <a:latin typeface="Cambria Math" panose="02040503050406030204" pitchFamily="18" charset="0"/>
+                                  <a:ea typeface="Cambria Math" panose="02040503050406030204" pitchFamily="18" charset="0"/>
+                                </a:rPr>
+                                <m:t>𝑗</m:t>
+                              </m:r>
+                              <m:r>
+                                <a:rPr lang="pl-PL" i="1">
+                                  <a:latin typeface="Cambria Math" panose="02040503050406030204" pitchFamily="18" charset="0"/>
+                                  <a:ea typeface="Cambria Math" panose="02040503050406030204" pitchFamily="18" charset="0"/>
+                                </a:rPr>
+                                <m:t>, </m:t>
+                              </m:r>
+                              <m:r>
+                                <a:rPr lang="pl-PL" i="1">
+                                  <a:latin typeface="Cambria Math" panose="02040503050406030204" pitchFamily="18" charset="0"/>
+                                  <a:ea typeface="Cambria Math" panose="02040503050406030204" pitchFamily="18" charset="0"/>
+                                </a:rPr>
+                                <m:t>𝑘</m:t>
+                              </m:r>
+                              <m:r>
+                                <a:rPr lang="pl-PL" i="1">
+                                  <a:latin typeface="Cambria Math" panose="02040503050406030204" pitchFamily="18" charset="0"/>
+                                  <a:ea typeface="Cambria Math" panose="02040503050406030204" pitchFamily="18" charset="0"/>
+                                </a:rPr>
+                                <m:t>, </m:t>
+                              </m:r>
+                              <m:sSub>
+                                <m:sSubPr>
+                                  <m:ctrlPr>
+                                    <a:rPr lang="pl-PL" i="1">
+                                      <a:latin typeface="Cambria Math" panose="02040503050406030204" pitchFamily="18" charset="0"/>
+                                      <a:ea typeface="Cambria Math" panose="02040503050406030204" pitchFamily="18" charset="0"/>
+                                    </a:rPr>
+                                  </m:ctrlPr>
+                                </m:sSubPr>
+                                <m:e>
+                                  <m:r>
+                                    <a:rPr lang="en-US" b="0" i="1" smtClean="0">
+                                      <a:latin typeface="Cambria Math" panose="02040503050406030204" pitchFamily="18" charset="0"/>
+                                      <a:ea typeface="Cambria Math" panose="02040503050406030204" pitchFamily="18" charset="0"/>
+                                    </a:rPr>
+                                    <m:t>𝑖</m:t>
+                                  </m:r>
+                                </m:e>
+                                <m:sub>
+                                  <m:r>
+                                    <a:rPr lang="pl-PL" i="1">
+                                      <a:latin typeface="Cambria Math" panose="02040503050406030204" pitchFamily="18" charset="0"/>
+                                      <a:ea typeface="Cambria Math" panose="02040503050406030204" pitchFamily="18" charset="0"/>
+                                    </a:rPr>
+                                    <m:t>1</m:t>
+                                  </m:r>
+                                </m:sub>
+                              </m:sSub>
+                              <m:r>
+                                <a:rPr lang="pl-PL" i="1">
+                                  <a:latin typeface="Cambria Math" panose="02040503050406030204" pitchFamily="18" charset="0"/>
+                                  <a:ea typeface="Cambria Math" panose="02040503050406030204" pitchFamily="18" charset="0"/>
+                                </a:rPr>
+                                <m:t>, </m:t>
+                              </m:r>
+                              <m:sSub>
+                                <m:sSubPr>
+                                  <m:ctrlPr>
+                                    <a:rPr lang="pl-PL" i="1">
+                                      <a:latin typeface="Cambria Math" panose="02040503050406030204" pitchFamily="18" charset="0"/>
+                                      <a:ea typeface="Cambria Math" panose="02040503050406030204" pitchFamily="18" charset="0"/>
+                                    </a:rPr>
+                                  </m:ctrlPr>
+                                </m:sSubPr>
+                                <m:e>
+                                  <m:r>
+                                    <a:rPr lang="en-US" b="0" i="1" smtClean="0">
+                                      <a:latin typeface="Cambria Math" panose="02040503050406030204" pitchFamily="18" charset="0"/>
+                                      <a:ea typeface="Cambria Math" panose="02040503050406030204" pitchFamily="18" charset="0"/>
+                                    </a:rPr>
+                                    <m:t>𝑖</m:t>
+                                  </m:r>
+                                </m:e>
+                                <m:sub>
+                                  <m:r>
+                                    <a:rPr lang="pl-PL" i="1">
+                                      <a:latin typeface="Cambria Math" panose="02040503050406030204" pitchFamily="18" charset="0"/>
+                                      <a:ea typeface="Cambria Math" panose="02040503050406030204" pitchFamily="18" charset="0"/>
+                                    </a:rPr>
+                                    <m:t>2</m:t>
+                                  </m:r>
+                                </m:sub>
+                              </m:sSub>
+                              <m:r>
+                                <a:rPr lang="pl-PL" i="1">
+                                  <a:latin typeface="Cambria Math" panose="02040503050406030204" pitchFamily="18" charset="0"/>
+                                  <a:ea typeface="Cambria Math" panose="02040503050406030204" pitchFamily="18" charset="0"/>
+                                </a:rPr>
+                                <m:t>:</m:t>
+                              </m:r>
+                              <m:r>
+                                <a:rPr lang="en-US" b="0" i="1" smtClean="0">
+                                  <a:latin typeface="Cambria Math" panose="02040503050406030204" pitchFamily="18" charset="0"/>
+                                  <a:ea typeface="Cambria Math" panose="02040503050406030204" pitchFamily="18" charset="0"/>
+                                </a:rPr>
+                                <m:t>  </m:t>
+                              </m:r>
+                              <m:sSub>
+                                <m:sSubPr>
+                                  <m:ctrlPr>
+                                    <a:rPr lang="en-US" i="1">
+                                      <a:latin typeface="Cambria Math" panose="02040503050406030204" pitchFamily="18" charset="0"/>
+                                      <a:ea typeface="Cambria Math" panose="02040503050406030204" pitchFamily="18" charset="0"/>
+                                    </a:rPr>
+                                  </m:ctrlPr>
+                                </m:sSubPr>
+                                <m:e>
+                                  <m:r>
+                                    <a:rPr lang="en-US" b="0" i="1" smtClean="0">
+                                      <a:latin typeface="Cambria Math" panose="02040503050406030204" pitchFamily="18" charset="0"/>
+                                      <a:ea typeface="Cambria Math" panose="02040503050406030204" pitchFamily="18" charset="0"/>
+                                    </a:rPr>
+                                    <m:t>𝑖</m:t>
+                                  </m:r>
+                                </m:e>
+                                <m:sub>
+                                  <m:r>
+                                    <a:rPr lang="en-US" i="1">
+                                      <a:latin typeface="Cambria Math" panose="02040503050406030204" pitchFamily="18" charset="0"/>
+                                      <a:ea typeface="Cambria Math" panose="02040503050406030204" pitchFamily="18" charset="0"/>
+                                    </a:rPr>
+                                    <m:t>1</m:t>
+                                  </m:r>
+                                </m:sub>
+                              </m:sSub>
+                              <m:r>
+                                <a:rPr lang="en-US" i="1">
+                                  <a:latin typeface="Cambria Math" panose="02040503050406030204" pitchFamily="18" charset="0"/>
+                                  <a:ea typeface="Cambria Math" panose="02040503050406030204" pitchFamily="18" charset="0"/>
+                                </a:rPr>
+                                <m:t>≠</m:t>
+                              </m:r>
+                              <m:r>
+                                <a:rPr lang="en-US" i="1">
+                                  <a:latin typeface="Cambria Math" panose="02040503050406030204" pitchFamily="18" charset="0"/>
+                                  <a:ea typeface="Cambria Math" panose="02040503050406030204" pitchFamily="18" charset="0"/>
+                                </a:rPr>
+                                <m:t> </m:t>
+                              </m:r>
+                              <m:sSub>
+                                <m:sSubPr>
+                                  <m:ctrlPr>
+                                    <a:rPr lang="en-US" i="1">
+                                      <a:latin typeface="Cambria Math" panose="02040503050406030204" pitchFamily="18" charset="0"/>
+                                      <a:ea typeface="Cambria Math" panose="02040503050406030204" pitchFamily="18" charset="0"/>
+                                    </a:rPr>
+                                  </m:ctrlPr>
+                                </m:sSubPr>
+                                <m:e>
+                                  <m:r>
+                                    <a:rPr lang="en-US" b="0" i="1" smtClean="0">
+                                      <a:latin typeface="Cambria Math" panose="02040503050406030204" pitchFamily="18" charset="0"/>
+                                      <a:ea typeface="Cambria Math" panose="02040503050406030204" pitchFamily="18" charset="0"/>
+                                    </a:rPr>
+                                    <m:t>𝑖</m:t>
+                                  </m:r>
+                                </m:e>
+                                <m:sub>
+                                  <m:r>
+                                    <a:rPr lang="en-US" i="1">
+                                      <a:latin typeface="Cambria Math" panose="02040503050406030204" pitchFamily="18" charset="0"/>
+                                      <a:ea typeface="Cambria Math" panose="02040503050406030204" pitchFamily="18" charset="0"/>
+                                    </a:rPr>
+                                    <m:t>2</m:t>
+                                  </m:r>
+                                </m:sub>
+                              </m:sSub>
+                              <m:r>
+                                <a:rPr lang="en-US" i="1">
+                                  <a:latin typeface="Cambria Math" panose="02040503050406030204" pitchFamily="18" charset="0"/>
+                                  <a:ea typeface="Cambria Math" panose="02040503050406030204" pitchFamily="18" charset="0"/>
+                                </a:rPr>
+                                <m:t>, </m:t>
+                              </m:r>
+                              <m:sSub>
+                                <m:sSubPr>
+                                  <m:ctrlPr>
+                                    <a:rPr lang="en-US" i="1">
+                                      <a:latin typeface="Cambria Math" panose="02040503050406030204" pitchFamily="18" charset="0"/>
+                                      <a:ea typeface="Cambria Math" panose="02040503050406030204" pitchFamily="18" charset="0"/>
+                                    </a:rPr>
+                                  </m:ctrlPr>
+                                </m:sSubPr>
+                                <m:e>
+                                  <m:r>
+                                    <a:rPr lang="en-US" i="1">
+                                      <a:latin typeface="Cambria Math" panose="02040503050406030204" pitchFamily="18" charset="0"/>
+                                      <a:ea typeface="Cambria Math" panose="02040503050406030204" pitchFamily="18" charset="0"/>
+                                    </a:rPr>
+                                    <m:t>𝑣</m:t>
+                                  </m:r>
+                                </m:e>
+                                <m:sub>
+                                  <m:sSub>
+                                    <m:sSubPr>
+                                      <m:ctrlPr>
+                                        <a:rPr lang="en-US" i="1">
+                                          <a:latin typeface="Cambria Math" panose="02040503050406030204" pitchFamily="18" charset="0"/>
+                                          <a:ea typeface="Cambria Math" panose="02040503050406030204" pitchFamily="18" charset="0"/>
+                                        </a:rPr>
+                                      </m:ctrlPr>
+                                    </m:sSubPr>
+                                    <m:e>
+                                      <m:r>
+                                        <a:rPr lang="en-US" b="0" i="1" smtClean="0">
+                                          <a:latin typeface="Cambria Math" panose="02040503050406030204" pitchFamily="18" charset="0"/>
+                                          <a:ea typeface="Cambria Math" panose="02040503050406030204" pitchFamily="18" charset="0"/>
+                                        </a:rPr>
+                                        <m:t>𝑖</m:t>
+                                      </m:r>
+                                    </m:e>
+                                    <m:sub>
+                                      <m:r>
+                                        <a:rPr lang="en-US" i="1">
+                                          <a:latin typeface="Cambria Math" panose="02040503050406030204" pitchFamily="18" charset="0"/>
+                                          <a:ea typeface="Cambria Math" panose="02040503050406030204" pitchFamily="18" charset="0"/>
+                                        </a:rPr>
+                                        <m:t>1</m:t>
+                                      </m:r>
+                                    </m:sub>
+                                  </m:sSub>
+                                  <m:r>
+                                    <a:rPr lang="en-US" b="0" i="1" smtClean="0">
+                                      <a:latin typeface="Cambria Math" panose="02040503050406030204" pitchFamily="18" charset="0"/>
+                                      <a:ea typeface="Cambria Math" panose="02040503050406030204" pitchFamily="18" charset="0"/>
+                                    </a:rPr>
+                                    <m:t>𝑗𝑘</m:t>
+                                  </m:r>
+                                </m:sub>
+                              </m:sSub>
+                              <m:r>
+                                <a:rPr lang="en-US" i="1">
+                                  <a:latin typeface="Cambria Math" panose="02040503050406030204" pitchFamily="18" charset="0"/>
+                                  <a:ea typeface="Cambria Math" panose="02040503050406030204" pitchFamily="18" charset="0"/>
+                                </a:rPr>
+                                <m:t>&gt; 0, </m:t>
+                              </m:r>
+                              <m:sSub>
+                                <m:sSubPr>
+                                  <m:ctrlPr>
+                                    <a:rPr lang="en-US" i="1">
+                                      <a:latin typeface="Cambria Math" panose="02040503050406030204" pitchFamily="18" charset="0"/>
+                                      <a:ea typeface="Cambria Math" panose="02040503050406030204" pitchFamily="18" charset="0"/>
+                                    </a:rPr>
+                                  </m:ctrlPr>
+                                </m:sSubPr>
+                                <m:e>
+                                  <m:r>
+                                    <a:rPr lang="en-US" i="1">
+                                      <a:latin typeface="Cambria Math" panose="02040503050406030204" pitchFamily="18" charset="0"/>
+                                      <a:ea typeface="Cambria Math" panose="02040503050406030204" pitchFamily="18" charset="0"/>
+                                    </a:rPr>
+                                    <m:t>𝑣</m:t>
+                                  </m:r>
+                                </m:e>
+                                <m:sub>
+                                  <m:sSub>
+                                    <m:sSubPr>
+                                      <m:ctrlPr>
+                                        <a:rPr lang="en-US" i="1">
+                                          <a:latin typeface="Cambria Math" panose="02040503050406030204" pitchFamily="18" charset="0"/>
+                                          <a:ea typeface="Cambria Math" panose="02040503050406030204" pitchFamily="18" charset="0"/>
+                                        </a:rPr>
+                                      </m:ctrlPr>
+                                    </m:sSubPr>
+                                    <m:e>
+                                      <m:r>
+                                        <a:rPr lang="en-US" i="1">
+                                          <a:latin typeface="Cambria Math" panose="02040503050406030204" pitchFamily="18" charset="0"/>
+                                          <a:ea typeface="Cambria Math" panose="02040503050406030204" pitchFamily="18" charset="0"/>
+                                        </a:rPr>
+                                        <m:t>𝑖</m:t>
+                                      </m:r>
+                                    </m:e>
+                                    <m:sub>
+                                      <m:r>
+                                        <a:rPr lang="en-US" b="0" i="1" smtClean="0">
+                                          <a:latin typeface="Cambria Math" panose="02040503050406030204" pitchFamily="18" charset="0"/>
+                                          <a:ea typeface="Cambria Math" panose="02040503050406030204" pitchFamily="18" charset="0"/>
+                                        </a:rPr>
+                                        <m:t>2</m:t>
+                                      </m:r>
+                                    </m:sub>
+                                  </m:sSub>
+                                  <m:r>
+                                    <a:rPr lang="en-US" i="1">
+                                      <a:latin typeface="Cambria Math" panose="02040503050406030204" pitchFamily="18" charset="0"/>
+                                      <a:ea typeface="Cambria Math" panose="02040503050406030204" pitchFamily="18" charset="0"/>
+                                    </a:rPr>
+                                    <m:t>𝑗𝑘</m:t>
+                                  </m:r>
+                                </m:sub>
+                              </m:sSub>
+                              <m:r>
+                                <a:rPr lang="en-US" i="1">
+                                  <a:latin typeface="Cambria Math" panose="02040503050406030204" pitchFamily="18" charset="0"/>
+                                  <a:ea typeface="Cambria Math" panose="02040503050406030204" pitchFamily="18" charset="0"/>
+                                </a:rPr>
+                                <m:t>&gt; 0</m:t>
+                              </m:r>
+                            </m:e>
+                          </m:eqArr>
+                        </m:e>
+                      </m:d>
+                    </m:oMath>
+                  </m:oMathPara>
+                </a14:m>
+                <a:endParaRPr lang="ru-RU" dirty="0"/>
+              </a:p>
+              <a:p>
+                <a:pPr>
+                  <a:lnSpc>
+                    <a:spcPct val="100000"/>
+                  </a:lnSpc>
+                </a:pPr>
+                <a:r>
+                  <a:rPr lang="ru-RU" dirty="0"/>
+                  <a:t>Критерий оптимизации</a:t>
+                </a:r>
+                <a:r>
+                  <a:rPr lang="en-US" dirty="0"/>
+                  <a:t> – </a:t>
+                </a:r>
+                <a:r>
+                  <a:rPr lang="ru-RU" dirty="0"/>
+                  <a:t>минимизация стоимости рейсов.</a:t>
+                </a:r>
+                <a:endParaRPr lang="ru-RU" i="1" dirty="0">
+                  <a:latin typeface="Cambria Math" panose="02040503050406030204" pitchFamily="18" charset="0"/>
+                </a:endParaRPr>
+              </a:p>
+              <a:p>
+                <a:pPr marL="0" indent="0">
+                  <a:lnSpc>
+                    <a:spcPct val="100000"/>
+                  </a:lnSpc>
+                  <a:buNone/>
+                </a:pPr>
+                <a14:m>
+                  <m:oMathPara xmlns:m="http://schemas.openxmlformats.org/officeDocument/2006/math">
+                    <m:oMathParaPr>
+                      <m:jc m:val="left"/>
+                    </m:oMathParaPr>
+                    <m:oMath xmlns:m="http://schemas.openxmlformats.org/officeDocument/2006/math">
+                      <m:r>
+                        <a:rPr lang="en-US" sz="2000" b="1" i="1" smtClean="0">
+                          <a:latin typeface="Cambria Math" panose="02040503050406030204" pitchFamily="18" charset="0"/>
+                        </a:rPr>
+                        <m:t>		</m:t>
+                      </m:r>
+                      <m:r>
+                        <a:rPr lang="en-US" sz="2000" b="1" i="1" smtClean="0">
+                          <a:latin typeface="Cambria Math" panose="02040503050406030204" pitchFamily="18" charset="0"/>
+                        </a:rPr>
+                        <m:t>𝑳</m:t>
+                      </m:r>
+                      <m:d>
+                        <m:dPr>
+                          <m:ctrlPr>
+                            <a:rPr lang="en-US" sz="2000" b="1" i="1" smtClean="0">
+                              <a:latin typeface="Cambria Math" panose="02040503050406030204" pitchFamily="18" charset="0"/>
+                            </a:rPr>
+                          </m:ctrlPr>
+                        </m:dPr>
+                        <m:e>
+                          <m:r>
+                            <a:rPr lang="en-US" sz="2000" b="1" i="1" smtClean="0">
+                              <a:latin typeface="Cambria Math" panose="02040503050406030204" pitchFamily="18" charset="0"/>
+                            </a:rPr>
+                            <m:t>𝒗</m:t>
+                          </m:r>
+                        </m:e>
+                      </m:d>
+                      <m:r>
+                        <a:rPr lang="en-US" sz="2000" b="1" i="1" smtClean="0">
+                          <a:latin typeface="Cambria Math" panose="02040503050406030204" pitchFamily="18" charset="0"/>
+                        </a:rPr>
+                        <m:t>= </m:t>
+                      </m:r>
+                      <m:r>
+                        <a:rPr lang="en-US" sz="2000" b="1" i="1" smtClean="0">
+                          <a:latin typeface="Cambria Math" panose="02040503050406030204" pitchFamily="18" charset="0"/>
+                        </a:rPr>
+                        <m:t>𝑪𝒐𝒏</m:t>
+                      </m:r>
+                      <m:r>
+                        <a:rPr lang="en-US" sz="2000" b="1" i="1" smtClean="0">
+                          <a:latin typeface="Cambria Math" panose="02040503050406030204" pitchFamily="18" charset="0"/>
+                        </a:rPr>
+                        <m:t> ⋅</m:t>
+                      </m:r>
+                      <m:nary>
+                        <m:naryPr>
+                          <m:chr m:val="∑"/>
+                          <m:ctrlPr>
+                            <a:rPr lang="en-US" sz="2000" b="1" i="1" smtClean="0">
+                              <a:latin typeface="Cambria Math" panose="02040503050406030204" pitchFamily="18" charset="0"/>
+                            </a:rPr>
+                          </m:ctrlPr>
+                        </m:naryPr>
+                        <m:sub>
+                          <m:r>
+                            <m:rPr>
+                              <m:brk m:alnAt="23"/>
+                            </m:rPr>
+                            <a:rPr lang="en-US" sz="2000" b="1" i="1" smtClean="0">
+                              <a:latin typeface="Cambria Math" panose="02040503050406030204" pitchFamily="18" charset="0"/>
+                            </a:rPr>
+                            <m:t>𝒊</m:t>
+                          </m:r>
+                          <m:r>
+                            <a:rPr lang="en-US" sz="2000" b="1" i="1" smtClean="0">
+                              <a:latin typeface="Cambria Math" panose="02040503050406030204" pitchFamily="18" charset="0"/>
+                            </a:rPr>
+                            <m:t>=</m:t>
+                          </m:r>
+                          <m:r>
+                            <a:rPr lang="en-US" sz="2000" b="1" i="1" smtClean="0">
+                              <a:latin typeface="Cambria Math" panose="02040503050406030204" pitchFamily="18" charset="0"/>
+                            </a:rPr>
+                            <m:t>𝟏</m:t>
+                          </m:r>
+                        </m:sub>
+                        <m:sup>
+                          <m:d>
+                            <m:dPr>
+                              <m:begChr m:val="{"/>
+                              <m:endChr m:val="}"/>
+                              <m:ctrlPr>
+                                <a:rPr lang="en-US" sz="2000" b="1" i="1" smtClean="0">
+                                  <a:latin typeface="Cambria Math" panose="02040503050406030204" pitchFamily="18" charset="0"/>
+                                </a:rPr>
+                              </m:ctrlPr>
+                            </m:dPr>
+                            <m:e>
+                              <m:sSub>
+                                <m:sSubPr>
+                                  <m:ctrlPr>
+                                    <a:rPr lang="en-US" sz="2000" b="1" i="1" smtClean="0">
+                                      <a:latin typeface="Cambria Math" panose="02040503050406030204" pitchFamily="18" charset="0"/>
+                                    </a:rPr>
+                                  </m:ctrlPr>
+                                </m:sSubPr>
+                                <m:e>
+                                  <m:r>
+                                    <a:rPr lang="en-US" sz="2000" b="1" i="1" smtClean="0">
+                                      <a:latin typeface="Cambria Math" panose="02040503050406030204" pitchFamily="18" charset="0"/>
+                                    </a:rPr>
+                                    <m:t>𝑵</m:t>
+                                  </m:r>
+                                </m:e>
+                                <m:sub>
+                                  <m:r>
+                                    <a:rPr lang="en-US" sz="2000" b="1" i="1" smtClean="0">
+                                      <a:latin typeface="Cambria Math" panose="02040503050406030204" pitchFamily="18" charset="0"/>
+                                    </a:rPr>
+                                    <m:t>𝒃</m:t>
+                                  </m:r>
+                                </m:sub>
+                              </m:sSub>
+                              <m:r>
+                                <a:rPr lang="en-US" sz="2000" b="1" i="1" smtClean="0">
+                                  <a:latin typeface="Cambria Math" panose="02040503050406030204" pitchFamily="18" charset="0"/>
+                                </a:rPr>
+                                <m:t>+</m:t>
+                              </m:r>
+                              <m:sSub>
+                                <m:sSubPr>
+                                  <m:ctrlPr>
+                                    <a:rPr lang="en-US" sz="2000" b="1" i="1" smtClean="0">
+                                      <a:latin typeface="Cambria Math" panose="02040503050406030204" pitchFamily="18" charset="0"/>
+                                    </a:rPr>
+                                  </m:ctrlPr>
+                                </m:sSubPr>
+                                <m:e>
+                                  <m:r>
+                                    <a:rPr lang="en-US" sz="2000" b="1" i="1" smtClean="0">
+                                      <a:latin typeface="Cambria Math" panose="02040503050406030204" pitchFamily="18" charset="0"/>
+                                    </a:rPr>
+                                    <m:t>𝑵</m:t>
+                                  </m:r>
+                                </m:e>
+                                <m:sub>
+                                  <m:r>
+                                    <a:rPr lang="en-US" sz="2000" b="1" i="1" smtClean="0">
+                                      <a:latin typeface="Cambria Math" panose="02040503050406030204" pitchFamily="18" charset="0"/>
+                                    </a:rPr>
+                                    <m:t>𝒂</m:t>
+                                  </m:r>
+                                </m:sub>
+                              </m:sSub>
+                            </m:e>
+                          </m:d>
+                        </m:sup>
+                        <m:e>
+                          <m:nary>
+                            <m:naryPr>
+                              <m:chr m:val="∑"/>
+                              <m:ctrlPr>
+                                <a:rPr lang="en-US" sz="2000" b="1" i="1" smtClean="0">
+                                  <a:latin typeface="Cambria Math" panose="02040503050406030204" pitchFamily="18" charset="0"/>
+                                </a:rPr>
+                              </m:ctrlPr>
+                            </m:naryPr>
+                            <m:sub>
+                              <m:r>
+                                <a:rPr lang="en-US" sz="2000" b="1" i="1" smtClean="0">
+                                  <a:latin typeface="Cambria Math" panose="02040503050406030204" pitchFamily="18" charset="0"/>
+                                </a:rPr>
+                                <m:t>𝒋</m:t>
+                              </m:r>
+                              <m:r>
+                                <a:rPr lang="en-US" sz="2000" b="1" i="1" smtClean="0">
+                                  <a:latin typeface="Cambria Math" panose="02040503050406030204" pitchFamily="18" charset="0"/>
+                                </a:rPr>
+                                <m:t>=</m:t>
+                              </m:r>
+                              <m:r>
+                                <a:rPr lang="en-US" sz="2000" b="1" i="1" smtClean="0">
+                                  <a:latin typeface="Cambria Math" panose="02040503050406030204" pitchFamily="18" charset="0"/>
+                                </a:rPr>
+                                <m:t>𝟏</m:t>
+                              </m:r>
+                            </m:sub>
+                            <m:sup>
+                              <m:d>
+                                <m:dPr>
+                                  <m:begChr m:val="{"/>
+                                  <m:endChr m:val="}"/>
+                                  <m:ctrlPr>
+                                    <a:rPr lang="en-US" sz="2000" b="1" i="1">
+                                      <a:latin typeface="Cambria Math" panose="02040503050406030204" pitchFamily="18" charset="0"/>
+                                    </a:rPr>
+                                  </m:ctrlPr>
+                                </m:dPr>
+                                <m:e>
+                                  <m:sSub>
+                                    <m:sSubPr>
+                                      <m:ctrlPr>
+                                        <a:rPr lang="en-US" sz="2000" b="1" i="1">
+                                          <a:latin typeface="Cambria Math" panose="02040503050406030204" pitchFamily="18" charset="0"/>
+                                        </a:rPr>
+                                      </m:ctrlPr>
+                                    </m:sSubPr>
+                                    <m:e>
+                                      <m:r>
+                                        <a:rPr lang="en-US" sz="2000" b="1" i="1">
+                                          <a:latin typeface="Cambria Math" panose="02040503050406030204" pitchFamily="18" charset="0"/>
+                                        </a:rPr>
+                                        <m:t>𝑵</m:t>
+                                      </m:r>
+                                    </m:e>
+                                    <m:sub>
+                                      <m:r>
+                                        <a:rPr lang="en-US" sz="2000" b="1" i="1">
+                                          <a:latin typeface="Cambria Math" panose="02040503050406030204" pitchFamily="18" charset="0"/>
+                                        </a:rPr>
+                                        <m:t>𝒃</m:t>
+                                      </m:r>
+                                    </m:sub>
+                                  </m:sSub>
+                                  <m:r>
+                                    <a:rPr lang="en-US" sz="2000" b="1" i="1">
+                                      <a:latin typeface="Cambria Math" panose="02040503050406030204" pitchFamily="18" charset="0"/>
+                                    </a:rPr>
+                                    <m:t>+</m:t>
+                                  </m:r>
+                                  <m:sSub>
+                                    <m:sSubPr>
+                                      <m:ctrlPr>
+                                        <a:rPr lang="en-US" sz="2000" b="1" i="1">
+                                          <a:latin typeface="Cambria Math" panose="02040503050406030204" pitchFamily="18" charset="0"/>
+                                        </a:rPr>
+                                      </m:ctrlPr>
+                                    </m:sSubPr>
+                                    <m:e>
+                                      <m:r>
+                                        <a:rPr lang="en-US" sz="2000" b="1" i="1">
+                                          <a:latin typeface="Cambria Math" panose="02040503050406030204" pitchFamily="18" charset="0"/>
+                                        </a:rPr>
+                                        <m:t>𝑵</m:t>
+                                      </m:r>
+                                    </m:e>
+                                    <m:sub>
+                                      <m:r>
+                                        <a:rPr lang="en-US" sz="2000" b="1" i="1">
+                                          <a:latin typeface="Cambria Math" panose="02040503050406030204" pitchFamily="18" charset="0"/>
+                                        </a:rPr>
+                                        <m:t>𝒂</m:t>
+                                      </m:r>
+                                    </m:sub>
+                                  </m:sSub>
+                                </m:e>
+                              </m:d>
+                            </m:sup>
+                            <m:e>
+                              <m:sSub>
+                                <m:sSubPr>
+                                  <m:ctrlPr>
+                                    <a:rPr lang="en-US" sz="2000" b="1" i="1" smtClean="0">
+                                      <a:latin typeface="Cambria Math" panose="02040503050406030204" pitchFamily="18" charset="0"/>
+                                    </a:rPr>
+                                  </m:ctrlPr>
+                                </m:sSubPr>
+                                <m:e>
+                                  <m:r>
+                                    <a:rPr lang="en-US" sz="2000" b="1" i="1" smtClean="0">
+                                      <a:latin typeface="Cambria Math" panose="02040503050406030204" pitchFamily="18" charset="0"/>
+                                    </a:rPr>
+                                    <m:t>𝒅</m:t>
+                                  </m:r>
+                                </m:e>
+                                <m:sub>
+                                  <m:r>
+                                    <a:rPr lang="en-US" sz="2000" b="1" i="1" smtClean="0">
+                                      <a:latin typeface="Cambria Math" panose="02040503050406030204" pitchFamily="18" charset="0"/>
+                                    </a:rPr>
+                                    <m:t>𝒊𝒋</m:t>
+                                  </m:r>
+                                </m:sub>
+                              </m:sSub>
+                            </m:e>
+                          </m:nary>
+                        </m:e>
+                      </m:nary>
+                      <m:r>
+                        <a:rPr lang="en-US" sz="2000" b="1" i="1" smtClean="0">
+                          <a:latin typeface="Cambria Math" panose="02040503050406030204" pitchFamily="18" charset="0"/>
+                        </a:rPr>
+                        <m:t>⋅</m:t>
+                      </m:r>
+                      <m:nary>
+                        <m:naryPr>
+                          <m:chr m:val="∑"/>
+                          <m:ctrlPr>
+                            <a:rPr lang="en-US" sz="2000" b="1" i="1" smtClean="0">
+                              <a:latin typeface="Cambria Math" panose="02040503050406030204" pitchFamily="18" charset="0"/>
+                            </a:rPr>
+                          </m:ctrlPr>
+                        </m:naryPr>
+                        <m:sub>
+                          <m:d>
+                            <m:dPr>
+                              <m:begChr m:val="{"/>
+                              <m:endChr m:val="}"/>
+                              <m:ctrlPr>
+                                <a:rPr lang="en-US" sz="2000" b="1" i="1" smtClean="0">
+                                  <a:latin typeface="Cambria Math" panose="02040503050406030204" pitchFamily="18" charset="0"/>
+                                </a:rPr>
+                              </m:ctrlPr>
+                            </m:dPr>
+                            <m:e>
+                              <m:r>
+                                <a:rPr lang="en-US" sz="2000" b="1" i="1" smtClean="0">
+                                  <a:latin typeface="Cambria Math" panose="02040503050406030204" pitchFamily="18" charset="0"/>
+                                </a:rPr>
+                                <m:t>𝒌</m:t>
+                              </m:r>
+                              <m:r>
+                                <a:rPr lang="en-US" sz="2000" b="1" i="1" smtClean="0">
+                                  <a:latin typeface="Cambria Math" panose="02040503050406030204" pitchFamily="18" charset="0"/>
+                                </a:rPr>
+                                <m:t>=</m:t>
+                              </m:r>
+                              <m:r>
+                                <a:rPr lang="en-US" sz="2000" b="1" i="1" smtClean="0">
+                                  <a:latin typeface="Cambria Math" panose="02040503050406030204" pitchFamily="18" charset="0"/>
+                                </a:rPr>
+                                <m:t>𝟏</m:t>
+                              </m:r>
+                            </m:e>
+                          </m:d>
+                        </m:sub>
+                        <m:sup>
+                          <m:sSub>
+                            <m:sSubPr>
+                              <m:ctrlPr>
+                                <a:rPr lang="en-US" sz="2000" b="1" i="1" smtClean="0">
+                                  <a:latin typeface="Cambria Math" panose="02040503050406030204" pitchFamily="18" charset="0"/>
+                                </a:rPr>
+                              </m:ctrlPr>
+                            </m:sSubPr>
+                            <m:e>
+                              <m:r>
+                                <a:rPr lang="en-US" sz="2000" b="1" i="1" smtClean="0">
+                                  <a:latin typeface="Cambria Math" panose="02040503050406030204" pitchFamily="18" charset="0"/>
+                                </a:rPr>
+                                <m:t>𝑵</m:t>
+                              </m:r>
+                            </m:e>
+                            <m:sub>
+                              <m:r>
+                                <a:rPr lang="en-US" sz="2000" b="1" i="1" smtClean="0">
+                                  <a:latin typeface="Cambria Math" panose="02040503050406030204" pitchFamily="18" charset="0"/>
+                                </a:rPr>
+                                <m:t>𝒕</m:t>
+                              </m:r>
+                            </m:sub>
+                          </m:sSub>
+                        </m:sup>
+                        <m:e>
+                          <m:sSub>
+                            <m:sSubPr>
+                              <m:ctrlPr>
+                                <a:rPr lang="en-US" sz="2000" b="1" i="1">
+                                  <a:latin typeface="Cambria Math" panose="02040503050406030204" pitchFamily="18" charset="0"/>
+                                </a:rPr>
+                              </m:ctrlPr>
+                            </m:sSubPr>
+                            <m:e>
+                              <m:r>
+                                <a:rPr lang="en-US" sz="2000" b="1" i="1">
+                                  <a:latin typeface="Cambria Math" panose="02040503050406030204" pitchFamily="18" charset="0"/>
+                                </a:rPr>
+                                <m:t>𝒗</m:t>
+                              </m:r>
+                            </m:e>
+                            <m:sub>
+                              <m:r>
+                                <a:rPr lang="en-US" sz="2000" b="1" i="1">
+                                  <a:latin typeface="Cambria Math" panose="02040503050406030204" pitchFamily="18" charset="0"/>
+                                </a:rPr>
+                                <m:t>𝒊𝒋𝒌</m:t>
+                              </m:r>
+                            </m:sub>
+                          </m:sSub>
+                        </m:e>
+                      </m:nary>
+                      <m:r>
+                        <a:rPr lang="en-US" sz="2000" b="1" i="1" smtClean="0">
+                          <a:latin typeface="Cambria Math" panose="02040503050406030204" pitchFamily="18" charset="0"/>
+                        </a:rPr>
+                        <m:t>→</m:t>
+                      </m:r>
+                      <m:r>
+                        <a:rPr lang="en-US" sz="2000" b="1" i="1" dirty="0" smtClean="0">
+                          <a:latin typeface="Cambria Math" panose="02040503050406030204" pitchFamily="18" charset="0"/>
+                        </a:rPr>
+                        <m:t>𝒎𝒊𝒏</m:t>
+                      </m:r>
+                    </m:oMath>
+                  </m:oMathPara>
+                </a14:m>
+                <a:endParaRPr lang="ru-RU" sz="2000" b="1" dirty="0"/>
+              </a:p>
+              <a:p>
+                <a:pPr marL="0" indent="0">
+                  <a:buNone/>
+                </a:pPr>
+                <a:endParaRPr lang="ru-RU" dirty="0"/>
+              </a:p>
+            </p:txBody>
+          </p:sp>
+        </mc:Choice>
+        <mc:Fallback>
+          <p:sp>
+            <p:nvSpPr>
+              <p:cNvPr id="3" name="Объект 2">
+                <a:extLst>
+                  <a:ext uri="{FF2B5EF4-FFF2-40B4-BE49-F238E27FC236}">
+                    <a16:creationId xmlns:a16="http://schemas.microsoft.com/office/drawing/2014/main" id="{083E4820-30C1-455B-8872-DA0931F91228}"/>
+                  </a:ext>
+                </a:extLst>
+              </p:cNvPr>
+              <p:cNvSpPr>
+                <a:spLocks noGrp="1" noRot="1" noChangeAspect="1" noMove="1" noResize="1" noEditPoints="1" noAdjustHandles="1" noChangeArrowheads="1" noChangeShapeType="1" noTextEdit="1"/>
+              </p:cNvSpPr>
+              <p:nvPr>
+                <p:ph idx="1"/>
+              </p:nvPr>
+            </p:nvSpPr>
+            <p:spPr>
+              <a:blipFill>
+                <a:blip r:embed="rId2"/>
+                <a:stretch>
+                  <a:fillRect l="-928" t="-2101"/>
+                </a:stretch>
+              </a:blipFill>
+            </p:spPr>
+            <p:txBody>
+              <a:bodyPr/>
+              <a:lstStyle/>
+              <a:p>
+                <a:r>
+                  <a:rPr lang="ru-RU">
+                    <a:noFill/>
+                  </a:rPr>
+                  <a:t> </a:t>
+                </a:r>
+              </a:p>
+            </p:txBody>
+          </p:sp>
+        </mc:Fallback>
+      </mc:AlternateContent>
+    </p:spTree>
+    <p:extLst>
+      <p:ext uri="{BB962C8B-B14F-4D97-AF65-F5344CB8AC3E}">
+        <p14:creationId xmlns:p14="http://schemas.microsoft.com/office/powerpoint/2010/main" val="2126049323"/>
+      </p:ext>
+    </p:extLst>
+  </p:cSld>
+  <p:clrMapOvr>
+    <a:masterClrMapping/>
+  </p:clrMapOvr>
+</p:sld>
+</file>
+
+<file path=ppt/slides/slide8.xml><?xml version="1.0" encoding="utf-8"?>
+<p:sld xmlns:a="http://schemas.openxmlformats.org/drawingml/2006/main" xmlns:r="http://schemas.openxmlformats.org/officeDocument/2006/relationships" xmlns:p="http://schemas.openxmlformats.org/presentationml/2006/main">
+  <p:cSld>
+    <p:spTree>
+      <p:nvGrpSpPr>
+        <p:cNvPr id="1" name=""/>
+        <p:cNvGrpSpPr/>
+        <p:nvPr/>
+      </p:nvGrpSpPr>
+      <p:grpSpPr>
+        <a:xfrm>
+          <a:off x="0" y="0"/>
+          <a:ext cx="0" cy="0"/>
+          <a:chOff x="0" y="0"/>
+          <a:chExt cx="0" cy="0"/>
+        </a:xfrm>
+      </p:grpSpPr>
+      <p:sp>
+        <p:nvSpPr>
+          <p:cNvPr id="2" name="Заголовок 1">
+            <a:extLst>
+              <a:ext uri="{FF2B5EF4-FFF2-40B4-BE49-F238E27FC236}">
+                <a16:creationId xmlns:a16="http://schemas.microsoft.com/office/drawing/2014/main" id="{B861179B-5AC0-4064-9585-EEDC5EB58AC3}"/>
+              </a:ext>
+            </a:extLst>
+          </p:cNvPr>
+          <p:cNvSpPr>
+            <a:spLocks noGrp="1"/>
+          </p:cNvSpPr>
+          <p:nvPr>
+            <p:ph type="title"/>
+          </p:nvPr>
+        </p:nvSpPr>
+        <p:spPr/>
+        <p:txBody>
+          <a:bodyPr/>
+          <a:lstStyle/>
+          <a:p>
+            <a:r>
+              <a:rPr lang="ru-RU" dirty="0"/>
+              <a:t>Метода решения</a:t>
+            </a:r>
+          </a:p>
+        </p:txBody>
+      </p:sp>
+      <p:sp>
+        <p:nvSpPr>
+          <p:cNvPr id="3" name="Объект 2">
+            <a:extLst>
+              <a:ext uri="{FF2B5EF4-FFF2-40B4-BE49-F238E27FC236}">
+                <a16:creationId xmlns:a16="http://schemas.microsoft.com/office/drawing/2014/main" id="{65C77B52-4B51-4D90-AC9E-4F5CD97ACB30}"/>
+              </a:ext>
+            </a:extLst>
+          </p:cNvPr>
+          <p:cNvSpPr>
+            <a:spLocks noGrp="1"/>
+          </p:cNvSpPr>
+          <p:nvPr>
+            <p:ph idx="1"/>
+          </p:nvPr>
+        </p:nvSpPr>
+        <p:spPr/>
+        <p:txBody>
+          <a:bodyPr/>
+          <a:lstStyle/>
+          <a:p>
+            <a:r>
+              <a:rPr lang="ru-RU" dirty="0"/>
+              <a:t>Методы решения задачи транспортной задачи</a:t>
+            </a:r>
+            <a:r>
+              <a:rPr lang="en-US" dirty="0"/>
+              <a:t>:</a:t>
+            </a:r>
+            <a:endParaRPr lang="ru-RU" dirty="0"/>
+          </a:p>
+          <a:p>
+            <a:pPr lvl="1"/>
+            <a:r>
+              <a:rPr lang="ru-RU" dirty="0"/>
+              <a:t>Симплекс-метод</a:t>
+            </a:r>
+          </a:p>
+          <a:p>
+            <a:pPr lvl="1"/>
+            <a:r>
+              <a:rPr lang="ru-RU" dirty="0"/>
+              <a:t>Метод потенциалов</a:t>
+            </a:r>
+          </a:p>
+          <a:p>
+            <a:pPr lvl="1"/>
+            <a:r>
+              <a:rPr lang="ru-RU" dirty="0"/>
+              <a:t>…</a:t>
+            </a:r>
+          </a:p>
+          <a:p>
+            <a:pPr lvl="1"/>
+            <a:endParaRPr lang="ru-RU" dirty="0"/>
+          </a:p>
+          <a:p>
+            <a:r>
+              <a:rPr lang="ru-RU" dirty="0"/>
+              <a:t>Выбран метод потенциалов, так как</a:t>
+            </a:r>
+            <a:r>
+              <a:rPr lang="en-US" dirty="0"/>
+              <a:t> </a:t>
+            </a:r>
+            <a:r>
+              <a:rPr lang="ru-RU" dirty="0"/>
+              <a:t>он позволяет</a:t>
+            </a:r>
+            <a:r>
+              <a:rPr lang="en-US" dirty="0"/>
+              <a:t>:</a:t>
+            </a:r>
+            <a:endParaRPr lang="ru-RU" dirty="0"/>
+          </a:p>
+          <a:p>
+            <a:pPr lvl="1"/>
+            <a:r>
+              <a:rPr lang="ru-RU" dirty="0"/>
+              <a:t>Строить транзитные маршруты через пункты потребления</a:t>
+            </a:r>
+          </a:p>
+          <a:p>
+            <a:pPr lvl="1"/>
+            <a:r>
+              <a:rPr lang="ru-RU" dirty="0"/>
+              <a:t>Учитывать ограничения на пропускную способность</a:t>
+            </a:r>
+          </a:p>
+        </p:txBody>
+      </p:sp>
+    </p:spTree>
+    <p:extLst>
+      <p:ext uri="{BB962C8B-B14F-4D97-AF65-F5344CB8AC3E}">
+        <p14:creationId xmlns:p14="http://schemas.microsoft.com/office/powerpoint/2010/main" val="896985544"/>
+      </p:ext>
+    </p:extLst>
+  </p:cSld>
+  <p:clrMapOvr>
+    <a:masterClrMapping/>
+  </p:clrMapOvr>
+</p:sld>
+</file>
+
 <file path=ppt/theme/theme1.xml><?xml version="1.0" encoding="utf-8"?>
 <a:theme xmlns:a="http://schemas.openxmlformats.org/drawingml/2006/main" name="Тема Office">
   <a:themeElements>

</xml_diff>

<commit_message>
Edit: before the first review from the other side
</commit_message>
<xml_diff>
--- a/presentation.pptx
+++ b/presentation.pptx
@@ -4182,8 +4182,8 @@
         </p:blipFill>
         <p:spPr>
           <a:xfrm>
-            <a:off x="838200" y="1690688"/>
-            <a:ext cx="5694680" cy="3225724"/>
+            <a:off x="838200" y="1377298"/>
+            <a:ext cx="6006887" cy="3402572"/>
           </a:xfrm>
         </p:spPr>
       </p:pic>
@@ -4215,8 +4215,8 @@
         </p:blipFill>
         <p:spPr>
           <a:xfrm>
-            <a:off x="6959126" y="519292"/>
-            <a:ext cx="4807726" cy="4397120"/>
+            <a:off x="7677942" y="1357763"/>
+            <a:ext cx="3953476" cy="3615828"/>
           </a:xfrm>
           <a:prstGeom prst="rect">
             <a:avLst/>
@@ -4250,8 +4250,8 @@
         </p:blipFill>
         <p:spPr>
           <a:xfrm>
-            <a:off x="838200" y="5075173"/>
-            <a:ext cx="6781800" cy="1463739"/>
+            <a:off x="838200" y="5167312"/>
+            <a:ext cx="10033000" cy="1463739"/>
           </a:xfrm>
           <a:prstGeom prst="rect">
             <a:avLst/>
@@ -5005,7 +5005,29 @@
             </a:r>
             <a:r>
               <a:rPr lang="ru-RU" dirty="0"/>
-              <a:t> - комплекс подходов, помогающий эффективной интеграции поставщиков, производителей, дистрибьюторов и продавцов.</a:t>
+              <a:t> </a:t>
+            </a:r>
+            <a:r>
+              <a:rPr lang="en-US" dirty="0"/>
+              <a:t>– </a:t>
+            </a:r>
+            <a:r>
+              <a:rPr lang="ru-RU" dirty="0"/>
+              <a:t>комплекс подходов, помогающий эффективной интеграции поставщиков, производителей, дистрибьюторов и продавцов.</a:t>
+            </a:r>
+          </a:p>
+          <a:p>
+            <a:r>
+              <a:rPr lang="en-US" b="1" dirty="0"/>
+              <a:t>TMS</a:t>
+            </a:r>
+            <a:r>
+              <a:rPr lang="en-US" dirty="0"/>
+              <a:t> (transport management system) – </a:t>
+            </a:r>
+            <a:r>
+              <a:rPr lang="ru-RU" dirty="0"/>
+              <a:t> система управления транспортом</a:t>
             </a:r>
           </a:p>
         </p:txBody>
@@ -5085,14 +5107,19 @@
             <p:ph type="title"/>
           </p:nvPr>
         </p:nvSpPr>
-        <p:spPr/>
+        <p:spPr>
+          <a:xfrm>
+            <a:off x="838200" y="365125"/>
+            <a:ext cx="11140440" cy="1325563"/>
+          </a:xfrm>
+        </p:spPr>
         <p:txBody>
           <a:bodyPr/>
           <a:lstStyle/>
           <a:p>
             <a:r>
               <a:rPr lang="ru-RU" dirty="0"/>
-              <a:t>Анализ существующих решений</a:t>
+              <a:t>Анализ существующих программных решений</a:t>
             </a:r>
           </a:p>
         </p:txBody>
@@ -5927,7 +5954,9 @@
         </p:nvSpPr>
         <p:spPr/>
         <p:txBody>
-          <a:bodyPr/>
+          <a:bodyPr>
+            <a:normAutofit lnSpcReduction="10000"/>
+          </a:bodyPr>
           <a:lstStyle/>
           <a:p>
             <a:r>
@@ -6004,7 +6033,16 @@
             <a:pPr lvl="1"/>
             <a:r>
               <a:rPr lang="ru-RU" dirty="0"/>
-              <a:t>Выполнение заказов, ограниченность складов </a:t>
+              <a:t>Обязательность выполнения заказов </a:t>
+            </a:r>
+          </a:p>
+          <a:p>
+            <a:pPr marL="457200" lvl="1" indent="0">
+              <a:buNone/>
+            </a:pPr>
+            <a:r>
+              <a:rPr lang="ru-RU" dirty="0"/>
+              <a:t>	с учётом ограниченности складов </a:t>
             </a:r>
           </a:p>
           <a:p>
@@ -6082,7 +6120,7 @@
         </p:blipFill>
         <p:spPr>
           <a:xfrm>
-            <a:off x="5054070" y="4546158"/>
+            <a:off x="8016545" y="4179791"/>
             <a:ext cx="1763290" cy="707890"/>
           </a:xfrm>
           <a:prstGeom prst="rect">
@@ -6160,7 +6198,7 @@
         </p:blipFill>
         <p:spPr>
           <a:xfrm>
-            <a:off x="6574154" y="5433435"/>
+            <a:off x="8016545" y="5532969"/>
             <a:ext cx="2509521" cy="711462"/>
           </a:xfrm>
           <a:prstGeom prst="rect">

</xml_diff>

<commit_message>
Fix: issues of the presentation and scenario
</commit_message>
<xml_diff>
--- a/presentation.pptx
+++ b/presentation.pptx
@@ -18,9 +18,9 @@
     <p:sldId id="266" r:id="rId9"/>
     <p:sldId id="267" r:id="rId10"/>
     <p:sldId id="268" r:id="rId11"/>
-    <p:sldId id="275" r:id="rId12"/>
-    <p:sldId id="273" r:id="rId13"/>
-    <p:sldId id="274" r:id="rId14"/>
+    <p:sldId id="276" r:id="rId12"/>
+    <p:sldId id="275" r:id="rId13"/>
+    <p:sldId id="273" r:id="rId14"/>
     <p:sldId id="269" r:id="rId15"/>
   </p:sldIdLst>
   <p:sldSz cx="12192000" cy="6858000"/>
@@ -210,7 +210,7 @@
           <a:p>
             <a:fld id="{6EFE7980-753D-4561-B6FA-AF5425BD0CC4}" type="datetimeFigureOut">
               <a:rPr lang="ru-RU" smtClean="0"/>
-              <a:t>29.05.2022</a:t>
+              <a:t>30.05.2022</a:t>
             </a:fld>
             <a:endParaRPr lang="ru-RU"/>
           </a:p>
@@ -624,7 +624,7 @@
           <a:p>
             <a:fld id="{2D595633-FEC6-41B9-B0A1-528C27FD4BC7}" type="datetime1">
               <a:rPr lang="ru-RU" smtClean="0"/>
-              <a:t>29.05.2022</a:t>
+              <a:t>30.05.2022</a:t>
             </a:fld>
             <a:endParaRPr lang="ru-RU"/>
           </a:p>
@@ -822,7 +822,7 @@
           <a:p>
             <a:fld id="{E0B68846-5A7D-494E-A21B-8CE02887DCC5}" type="datetime1">
               <a:rPr lang="ru-RU" smtClean="0"/>
-              <a:t>29.05.2022</a:t>
+              <a:t>30.05.2022</a:t>
             </a:fld>
             <a:endParaRPr lang="ru-RU"/>
           </a:p>
@@ -1030,7 +1030,7 @@
           <a:p>
             <a:fld id="{4781F2F9-03C2-4B05-8C49-879FAD1DC66F}" type="datetime1">
               <a:rPr lang="ru-RU" smtClean="0"/>
-              <a:t>29.05.2022</a:t>
+              <a:t>30.05.2022</a:t>
             </a:fld>
             <a:endParaRPr lang="ru-RU"/>
           </a:p>
@@ -1228,7 +1228,7 @@
           <a:p>
             <a:fld id="{C55CF103-CC98-4CD4-ADC0-0EB50A8E720A}" type="datetime1">
               <a:rPr lang="ru-RU" smtClean="0"/>
-              <a:t>29.05.2022</a:t>
+              <a:t>30.05.2022</a:t>
             </a:fld>
             <a:endParaRPr lang="ru-RU"/>
           </a:p>
@@ -1503,7 +1503,7 @@
           <a:p>
             <a:fld id="{4828CFB2-5362-4BA6-BEE3-BB2642E5F06E}" type="datetime1">
               <a:rPr lang="ru-RU" smtClean="0"/>
-              <a:t>29.05.2022</a:t>
+              <a:t>30.05.2022</a:t>
             </a:fld>
             <a:endParaRPr lang="ru-RU"/>
           </a:p>
@@ -1768,7 +1768,7 @@
           <a:p>
             <a:fld id="{93793127-953A-4FF8-AD25-9A7EAEB5CF5E}" type="datetime1">
               <a:rPr lang="ru-RU" smtClean="0"/>
-              <a:t>29.05.2022</a:t>
+              <a:t>30.05.2022</a:t>
             </a:fld>
             <a:endParaRPr lang="ru-RU"/>
           </a:p>
@@ -2180,7 +2180,7 @@
           <a:p>
             <a:fld id="{7CA2C41C-A390-4D97-B644-81D6A86436D0}" type="datetime1">
               <a:rPr lang="ru-RU" smtClean="0"/>
-              <a:t>29.05.2022</a:t>
+              <a:t>30.05.2022</a:t>
             </a:fld>
             <a:endParaRPr lang="ru-RU"/>
           </a:p>
@@ -2321,7 +2321,7 @@
           <a:p>
             <a:fld id="{01C7CE23-07DC-4D29-AE4F-CF9126D438E0}" type="datetime1">
               <a:rPr lang="ru-RU" smtClean="0"/>
-              <a:t>29.05.2022</a:t>
+              <a:t>30.05.2022</a:t>
             </a:fld>
             <a:endParaRPr lang="ru-RU"/>
           </a:p>
@@ -2434,7 +2434,7 @@
           <a:p>
             <a:fld id="{6416D010-49B1-4964-92ED-287255F37D04}" type="datetime1">
               <a:rPr lang="ru-RU" smtClean="0"/>
-              <a:t>29.05.2022</a:t>
+              <a:t>30.05.2022</a:t>
             </a:fld>
             <a:endParaRPr lang="ru-RU"/>
           </a:p>
@@ -2745,7 +2745,7 @@
           <a:p>
             <a:fld id="{9EB75F55-3DD5-4CE3-9B54-727202BA15E9}" type="datetime1">
               <a:rPr lang="ru-RU" smtClean="0"/>
-              <a:t>29.05.2022</a:t>
+              <a:t>30.05.2022</a:t>
             </a:fld>
             <a:endParaRPr lang="ru-RU"/>
           </a:p>
@@ -3033,7 +3033,7 @@
           <a:p>
             <a:fld id="{C04789F8-F8FE-4256-8AFF-2567DB3965F4}" type="datetime1">
               <a:rPr lang="ru-RU" smtClean="0"/>
-              <a:t>29.05.2022</a:t>
+              <a:t>30.05.2022</a:t>
             </a:fld>
             <a:endParaRPr lang="ru-RU"/>
           </a:p>
@@ -3274,7 +3274,7 @@
           <a:p>
             <a:fld id="{EA3FB417-0F2C-41D5-8173-80D866AD86E5}" type="datetime1">
               <a:rPr lang="ru-RU" smtClean="0"/>
-              <a:t>29.05.2022</a:t>
+              <a:t>30.05.2022</a:t>
             </a:fld>
             <a:endParaRPr lang="ru-RU"/>
           </a:p>
@@ -3710,7 +3710,7 @@
         </p:nvSpPr>
         <p:spPr>
           <a:xfrm>
-            <a:off x="1082040" y="1645286"/>
+            <a:off x="1082040" y="791846"/>
             <a:ext cx="10027920" cy="3053397"/>
           </a:xfrm>
         </p:spPr>
@@ -3745,7 +3745,7 @@
         </p:nvSpPr>
         <p:spPr>
           <a:xfrm>
-            <a:off x="828040" y="4891901"/>
+            <a:off x="828040" y="4038461"/>
             <a:ext cx="10535920" cy="1655762"/>
           </a:xfrm>
         </p:spPr>
@@ -3796,7 +3796,7 @@
         </p:nvSpPr>
         <p:spPr>
           <a:xfrm>
-            <a:off x="1524000" y="1138218"/>
+            <a:off x="1524000" y="284778"/>
             <a:ext cx="9144000" cy="461665"/>
           </a:xfrm>
           <a:prstGeom prst="rect">
@@ -3824,42 +3824,207 @@
       </p:sp>
       <p:sp>
         <p:nvSpPr>
-          <p:cNvPr id="5" name="Прямоугольник 4">
-            <a:extLst>
-              <a:ext uri="{FF2B5EF4-FFF2-40B4-BE49-F238E27FC236}">
-                <a16:creationId xmlns:a16="http://schemas.microsoft.com/office/drawing/2014/main" id="{5C98651C-63A7-2177-4CDD-B1814E82A66D}"/>
-              </a:ext>
-            </a:extLst>
-          </p:cNvPr>
-          <p:cNvSpPr/>
+          <p:cNvPr id="6" name="Подзаголовок 2">
+            <a:extLst>
+              <a:ext uri="{FF2B5EF4-FFF2-40B4-BE49-F238E27FC236}">
+                <a16:creationId xmlns:a16="http://schemas.microsoft.com/office/drawing/2014/main" id="{59BC09B9-2B22-C054-9C41-A03605C15877}"/>
+              </a:ext>
+            </a:extLst>
+          </p:cNvPr>
+          <p:cNvSpPr txBox="1">
+            <a:spLocks/>
+          </p:cNvSpPr>
           <p:nvPr/>
         </p:nvSpPr>
         <p:spPr>
           <a:xfrm>
-            <a:off x="0" y="195016"/>
-            <a:ext cx="12192000" cy="584775"/>
+            <a:off x="828040" y="5887440"/>
+            <a:ext cx="10535920" cy="827881"/>
           </a:xfrm>
           <a:prstGeom prst="rect">
             <a:avLst/>
           </a:prstGeom>
         </p:spPr>
         <p:txBody>
-          <a:bodyPr wrap="square">
-            <a:spAutoFit/>
+          <a:bodyPr vert="horz" lIns="91440" tIns="45720" rIns="91440" bIns="45720" rtlCol="0" anchor="ctr">
+            <a:normAutofit/>
           </a:bodyPr>
-          <a:lstStyle/>
-          <a:p>
-            <a:pPr algn="ctr"/>
-            <a:r>
-              <a:rPr lang="ru-RU" sz="1600" dirty="0"/>
-              <a:t>Московский государственный технический университет имени Н.Э. Баумана </a:t>
-            </a:r>
-            <a:br>
-              <a:rPr lang="ru-RU" sz="1600" dirty="0"/>
-            </a:br>
-            <a:r>
-              <a:rPr lang="ru-RU" sz="1600" dirty="0"/>
-              <a:t>(национальный исследовательский университет)</a:t>
+          <a:lstStyle>
+            <a:lvl1pPr marL="0" indent="0" algn="ctr" defTabSz="914400" rtl="0" eaLnBrk="1" latinLnBrk="0" hangingPunct="1">
+              <a:lnSpc>
+                <a:spcPct val="90000"/>
+              </a:lnSpc>
+              <a:spcBef>
+                <a:spcPts val="1000"/>
+              </a:spcBef>
+              <a:buFont typeface="Arial" panose="020B0604020202020204" pitchFamily="34" charset="0"/>
+              <a:buNone/>
+              <a:defRPr sz="2400" kern="1200">
+                <a:solidFill>
+                  <a:schemeClr val="tx1"/>
+                </a:solidFill>
+                <a:latin typeface="+mn-lt"/>
+                <a:ea typeface="+mn-ea"/>
+                <a:cs typeface="+mn-cs"/>
+              </a:defRPr>
+            </a:lvl1pPr>
+            <a:lvl2pPr marL="457200" indent="0" algn="ctr" defTabSz="914400" rtl="0" eaLnBrk="1" latinLnBrk="0" hangingPunct="1">
+              <a:lnSpc>
+                <a:spcPct val="90000"/>
+              </a:lnSpc>
+              <a:spcBef>
+                <a:spcPts val="500"/>
+              </a:spcBef>
+              <a:buFont typeface="Arial" panose="020B0604020202020204" pitchFamily="34" charset="0"/>
+              <a:buNone/>
+              <a:defRPr sz="2000" kern="1200">
+                <a:solidFill>
+                  <a:schemeClr val="tx1"/>
+                </a:solidFill>
+                <a:latin typeface="+mn-lt"/>
+                <a:ea typeface="+mn-ea"/>
+                <a:cs typeface="+mn-cs"/>
+              </a:defRPr>
+            </a:lvl2pPr>
+            <a:lvl3pPr marL="914400" indent="0" algn="ctr" defTabSz="914400" rtl="0" eaLnBrk="1" latinLnBrk="0" hangingPunct="1">
+              <a:lnSpc>
+                <a:spcPct val="90000"/>
+              </a:lnSpc>
+              <a:spcBef>
+                <a:spcPts val="500"/>
+              </a:spcBef>
+              <a:buFont typeface="Arial" panose="020B0604020202020204" pitchFamily="34" charset="0"/>
+              <a:buNone/>
+              <a:defRPr sz="1800" kern="1200">
+                <a:solidFill>
+                  <a:schemeClr val="tx1"/>
+                </a:solidFill>
+                <a:latin typeface="+mn-lt"/>
+                <a:ea typeface="+mn-ea"/>
+                <a:cs typeface="+mn-cs"/>
+              </a:defRPr>
+            </a:lvl3pPr>
+            <a:lvl4pPr marL="1371600" indent="0" algn="ctr" defTabSz="914400" rtl="0" eaLnBrk="1" latinLnBrk="0" hangingPunct="1">
+              <a:lnSpc>
+                <a:spcPct val="90000"/>
+              </a:lnSpc>
+              <a:spcBef>
+                <a:spcPts val="500"/>
+              </a:spcBef>
+              <a:buFont typeface="Arial" panose="020B0604020202020204" pitchFamily="34" charset="0"/>
+              <a:buNone/>
+              <a:defRPr sz="1600" kern="1200">
+                <a:solidFill>
+                  <a:schemeClr val="tx1"/>
+                </a:solidFill>
+                <a:latin typeface="+mn-lt"/>
+                <a:ea typeface="+mn-ea"/>
+                <a:cs typeface="+mn-cs"/>
+              </a:defRPr>
+            </a:lvl4pPr>
+            <a:lvl5pPr marL="1828800" indent="0" algn="ctr" defTabSz="914400" rtl="0" eaLnBrk="1" latinLnBrk="0" hangingPunct="1">
+              <a:lnSpc>
+                <a:spcPct val="90000"/>
+              </a:lnSpc>
+              <a:spcBef>
+                <a:spcPts val="500"/>
+              </a:spcBef>
+              <a:buFont typeface="Arial" panose="020B0604020202020204" pitchFamily="34" charset="0"/>
+              <a:buNone/>
+              <a:defRPr sz="1600" kern="1200">
+                <a:solidFill>
+                  <a:schemeClr val="tx1"/>
+                </a:solidFill>
+                <a:latin typeface="+mn-lt"/>
+                <a:ea typeface="+mn-ea"/>
+                <a:cs typeface="+mn-cs"/>
+              </a:defRPr>
+            </a:lvl5pPr>
+            <a:lvl6pPr marL="2286000" indent="0" algn="ctr" defTabSz="914400" rtl="0" eaLnBrk="1" latinLnBrk="0" hangingPunct="1">
+              <a:lnSpc>
+                <a:spcPct val="90000"/>
+              </a:lnSpc>
+              <a:spcBef>
+                <a:spcPts val="500"/>
+              </a:spcBef>
+              <a:buFont typeface="Arial" panose="020B0604020202020204" pitchFamily="34" charset="0"/>
+              <a:buNone/>
+              <a:defRPr sz="1600" kern="1200">
+                <a:solidFill>
+                  <a:schemeClr val="tx1"/>
+                </a:solidFill>
+                <a:latin typeface="+mn-lt"/>
+                <a:ea typeface="+mn-ea"/>
+                <a:cs typeface="+mn-cs"/>
+              </a:defRPr>
+            </a:lvl6pPr>
+            <a:lvl7pPr marL="2743200" indent="0" algn="ctr" defTabSz="914400" rtl="0" eaLnBrk="1" latinLnBrk="0" hangingPunct="1">
+              <a:lnSpc>
+                <a:spcPct val="90000"/>
+              </a:lnSpc>
+              <a:spcBef>
+                <a:spcPts val="500"/>
+              </a:spcBef>
+              <a:buFont typeface="Arial" panose="020B0604020202020204" pitchFamily="34" charset="0"/>
+              <a:buNone/>
+              <a:defRPr sz="1600" kern="1200">
+                <a:solidFill>
+                  <a:schemeClr val="tx1"/>
+                </a:solidFill>
+                <a:latin typeface="+mn-lt"/>
+                <a:ea typeface="+mn-ea"/>
+                <a:cs typeface="+mn-cs"/>
+              </a:defRPr>
+            </a:lvl7pPr>
+            <a:lvl8pPr marL="3200400" indent="0" algn="ctr" defTabSz="914400" rtl="0" eaLnBrk="1" latinLnBrk="0" hangingPunct="1">
+              <a:lnSpc>
+                <a:spcPct val="90000"/>
+              </a:lnSpc>
+              <a:spcBef>
+                <a:spcPts val="500"/>
+              </a:spcBef>
+              <a:buFont typeface="Arial" panose="020B0604020202020204" pitchFamily="34" charset="0"/>
+              <a:buNone/>
+              <a:defRPr sz="1600" kern="1200">
+                <a:solidFill>
+                  <a:schemeClr val="tx1"/>
+                </a:solidFill>
+                <a:latin typeface="+mn-lt"/>
+                <a:ea typeface="+mn-ea"/>
+                <a:cs typeface="+mn-cs"/>
+              </a:defRPr>
+            </a:lvl8pPr>
+            <a:lvl9pPr marL="3657600" indent="0" algn="ctr" defTabSz="914400" rtl="0" eaLnBrk="1" latinLnBrk="0" hangingPunct="1">
+              <a:lnSpc>
+                <a:spcPct val="90000"/>
+              </a:lnSpc>
+              <a:spcBef>
+                <a:spcPts val="500"/>
+              </a:spcBef>
+              <a:buFont typeface="Arial" panose="020B0604020202020204" pitchFamily="34" charset="0"/>
+              <a:buNone/>
+              <a:defRPr sz="1600" kern="1200">
+                <a:solidFill>
+                  <a:schemeClr val="tx1"/>
+                </a:solidFill>
+                <a:latin typeface="+mn-lt"/>
+                <a:ea typeface="+mn-ea"/>
+                <a:cs typeface="+mn-cs"/>
+              </a:defRPr>
+            </a:lvl9pPr>
+          </a:lstStyle>
+          <a:p>
+            <a:r>
+              <a:rPr lang="ru-RU" dirty="0"/>
+              <a:t>Москва</a:t>
+            </a:r>
+            <a:r>
+              <a:rPr lang="en-US" dirty="0"/>
+              <a:t>, </a:t>
+            </a:r>
+            <a:r>
+              <a:rPr lang="ru-RU" dirty="0"/>
+              <a:t>2022 год</a:t>
             </a:r>
           </a:p>
         </p:txBody>
@@ -3917,7 +4082,7 @@
           <a:p>
             <a:r>
               <a:rPr lang="ru-RU" dirty="0"/>
-              <a:t>Метод интервалов</a:t>
+              <a:t>Составление расписания</a:t>
             </a:r>
           </a:p>
         </p:txBody>
@@ -3949,13 +4114,13 @@
               </a:ext>
             </a:extLst>
           </a:blip>
-          <a:srcRect l="343" t="11355" r="617" b="35175"/>
+          <a:srcRect l="728" t="10872" r="340" b="19383"/>
           <a:stretch/>
         </p:blipFill>
         <p:spPr>
           <a:xfrm>
-            <a:off x="2019300" y="3317875"/>
-            <a:ext cx="8153400" cy="3403600"/>
+            <a:off x="2209800" y="2749954"/>
+            <a:ext cx="7772400" cy="4108046"/>
           </a:xfrm>
         </p:spPr>
       </p:pic>
@@ -3981,10 +4146,10 @@
           <a:lstStyle/>
           <a:p>
             <a:fld id="{E44E20FB-DC41-4FB4-820E-A7F1077F5D74}" type="slidenum">
-              <a:rPr lang="ru-RU" smtClean="0"/>
+              <a:rPr lang="ru-RU" sz="1600" b="1"/>
               <a:t>10</a:t>
             </a:fld>
-            <a:endParaRPr lang="ru-RU"/>
+            <a:endParaRPr lang="ru-RU" sz="1600" b="1" dirty="0"/>
           </a:p>
         </p:txBody>
       </p:sp>
@@ -4002,7 +4167,7 @@
           </p:cNvPicPr>
           <p:nvPr/>
         </p:nvPicPr>
-        <p:blipFill>
+        <p:blipFill rotWithShape="1">
           <a:blip r:embed="rId4">
             <a:extLst>
               <a:ext uri="{28A0092B-C50C-407E-A947-70E740481C1C}">
@@ -4013,14 +4178,13 @@
               </a:ext>
             </a:extLst>
           </a:blip>
-          <a:stretch>
-            <a:fillRect/>
-          </a:stretch>
+          <a:srcRect r="36442"/>
+          <a:stretch/>
         </p:blipFill>
         <p:spPr>
           <a:xfrm>
-            <a:off x="5829061" y="452966"/>
-            <a:ext cx="6224826" cy="1149879"/>
+            <a:off x="7743474" y="136525"/>
+            <a:ext cx="4064986" cy="1181448"/>
           </a:xfrm>
           <a:prstGeom prst="rect">
             <a:avLst/>
@@ -4058,8 +4222,8 @@
         </p:blipFill>
         <p:spPr>
           <a:xfrm>
-            <a:off x="5829062" y="1929342"/>
-            <a:ext cx="6224825" cy="1149879"/>
+            <a:off x="5412740" y="1517968"/>
+            <a:ext cx="6395720" cy="1181448"/>
           </a:xfrm>
           <a:prstGeom prst="rect">
             <a:avLst/>
@@ -4101,7 +4265,7 @@
           <p:cNvPr id="2" name="Заголовок 1">
             <a:extLst>
               <a:ext uri="{FF2B5EF4-FFF2-40B4-BE49-F238E27FC236}">
-                <a16:creationId xmlns:a16="http://schemas.microsoft.com/office/drawing/2014/main" id="{30DDECF4-6CB3-A52B-F6B5-252B5FB0FA24}"/>
+                <a16:creationId xmlns:a16="http://schemas.microsoft.com/office/drawing/2014/main" id="{AD4E57DD-4CA5-5BC8-9D8C-FACA51DD712F}"/>
               </a:ext>
             </a:extLst>
           </p:cNvPr>
@@ -4119,46 +4283,17 @@
           <a:p>
             <a:r>
               <a:rPr lang="ru-RU" dirty="0"/>
-              <a:t>Реализация программы</a:t>
-            </a:r>
-          </a:p>
-        </p:txBody>
-      </p:sp>
-      <p:sp>
-        <p:nvSpPr>
-          <p:cNvPr id="4" name="Номер слайда 3">
-            <a:extLst>
-              <a:ext uri="{FF2B5EF4-FFF2-40B4-BE49-F238E27FC236}">
-                <a16:creationId xmlns:a16="http://schemas.microsoft.com/office/drawing/2014/main" id="{B0DC8631-66C6-3DD4-E800-03BF28DC7DA9}"/>
-              </a:ext>
-            </a:extLst>
-          </p:cNvPr>
-          <p:cNvSpPr>
-            <a:spLocks noGrp="1"/>
-          </p:cNvSpPr>
-          <p:nvPr>
-            <p:ph type="sldNum" sz="quarter" idx="12"/>
-          </p:nvPr>
-        </p:nvSpPr>
-        <p:spPr/>
-        <p:txBody>
-          <a:bodyPr/>
-          <a:lstStyle/>
-          <a:p>
-            <a:fld id="{E44E20FB-DC41-4FB4-820E-A7F1077F5D74}" type="slidenum">
-              <a:rPr lang="ru-RU" smtClean="0"/>
-              <a:t>11</a:t>
-            </a:fld>
-            <a:endParaRPr lang="ru-RU"/>
+              <a:t>Структура программы</a:t>
+            </a:r>
           </a:p>
         </p:txBody>
       </p:sp>
       <p:pic>
         <p:nvPicPr>
-          <p:cNvPr id="14" name="Объект 13">
-            <a:extLst>
-              <a:ext uri="{FF2B5EF4-FFF2-40B4-BE49-F238E27FC236}">
-                <a16:creationId xmlns:a16="http://schemas.microsoft.com/office/drawing/2014/main" id="{A4ED088E-4CAA-3079-F4DA-D1DB840AA8BE}"/>
+          <p:cNvPr id="6" name="Объект 5">
+            <a:extLst>
+              <a:ext uri="{FF2B5EF4-FFF2-40B4-BE49-F238E27FC236}">
+                <a16:creationId xmlns:a16="http://schemas.microsoft.com/office/drawing/2014/main" id="{3EB35B95-00D2-0C3D-52A1-36A2E0053E63}"/>
               </a:ext>
             </a:extLst>
           </p:cNvPr>
@@ -4169,99 +4304,60 @@
             <p:ph idx="1"/>
           </p:nvPr>
         </p:nvPicPr>
-        <p:blipFill rotWithShape="1">
+        <p:blipFill>
           <a:blip r:embed="rId2">
             <a:extLst>
               <a:ext uri="{28A0092B-C50C-407E-A947-70E740481C1C}">
                 <a14:useLocalDpi xmlns:a14="http://schemas.microsoft.com/office/drawing/2010/main" val="0"/>
               </a:ext>
+              <a:ext uri="{96DAC541-7B7A-43D3-8B79-37D633B846F1}">
+                <asvg:svgBlip xmlns:asvg="http://schemas.microsoft.com/office/drawing/2016/SVG/main" r:embed="rId3"/>
+              </a:ext>
             </a:extLst>
           </a:blip>
-          <a:srcRect l="4849" t="9414" r="20478" b="10966"/>
+          <a:srcRect/>
           <a:stretch/>
         </p:blipFill>
         <p:spPr>
           <a:xfrm>
-            <a:off x="838200" y="1377298"/>
-            <a:ext cx="6006887" cy="3402572"/>
+            <a:off x="2132635" y="1315889"/>
+            <a:ext cx="7926729" cy="5176986"/>
           </a:xfrm>
         </p:spPr>
       </p:pic>
-      <p:pic>
-        <p:nvPicPr>
-          <p:cNvPr id="16" name="Рисунок 15">
-            <a:extLst>
-              <a:ext uri="{FF2B5EF4-FFF2-40B4-BE49-F238E27FC236}">
-                <a16:creationId xmlns:a16="http://schemas.microsoft.com/office/drawing/2014/main" id="{FEC3DE25-7966-6D1E-16C5-38B118F0C6FD}"/>
-              </a:ext>
-            </a:extLst>
-          </p:cNvPr>
-          <p:cNvPicPr>
-            <a:picLocks noChangeAspect="1"/>
-          </p:cNvPicPr>
-          <p:nvPr/>
-        </p:nvPicPr>
-        <p:blipFill>
-          <a:blip r:embed="rId3">
-            <a:extLst>
-              <a:ext uri="{28A0092B-C50C-407E-A947-70E740481C1C}">
-                <a14:useLocalDpi xmlns:a14="http://schemas.microsoft.com/office/drawing/2010/main" val="0"/>
-              </a:ext>
-            </a:extLst>
-          </a:blip>
-          <a:stretch>
-            <a:fillRect/>
-          </a:stretch>
-        </p:blipFill>
-        <p:spPr>
-          <a:xfrm>
-            <a:off x="7677942" y="1357763"/>
-            <a:ext cx="3953476" cy="3615828"/>
-          </a:xfrm>
-          <a:prstGeom prst="rect">
-            <a:avLst/>
-          </a:prstGeom>
-        </p:spPr>
-      </p:pic>
-      <p:pic>
-        <p:nvPicPr>
-          <p:cNvPr id="20" name="Рисунок 19">
-            <a:extLst>
-              <a:ext uri="{FF2B5EF4-FFF2-40B4-BE49-F238E27FC236}">
-                <a16:creationId xmlns:a16="http://schemas.microsoft.com/office/drawing/2014/main" id="{0893E869-2B70-D388-5820-EEB5CEE95F14}"/>
-              </a:ext>
-            </a:extLst>
-          </p:cNvPr>
-          <p:cNvPicPr>
-            <a:picLocks noChangeAspect="1"/>
-          </p:cNvPicPr>
-          <p:nvPr/>
-        </p:nvPicPr>
-        <p:blipFill rotWithShape="1">
-          <a:blip r:embed="rId4">
-            <a:extLst>
-              <a:ext uri="{28A0092B-C50C-407E-A947-70E740481C1C}">
-                <a14:useLocalDpi xmlns:a14="http://schemas.microsoft.com/office/drawing/2010/main" val="0"/>
-              </a:ext>
-            </a:extLst>
-          </a:blip>
-          <a:srcRect t="15205" b="10008"/>
-          <a:stretch/>
-        </p:blipFill>
-        <p:spPr>
-          <a:xfrm>
-            <a:off x="838200" y="5167312"/>
-            <a:ext cx="10033000" cy="1463739"/>
-          </a:xfrm>
-          <a:prstGeom prst="rect">
-            <a:avLst/>
-          </a:prstGeom>
-        </p:spPr>
-      </p:pic>
+      <p:sp>
+        <p:nvSpPr>
+          <p:cNvPr id="4" name="Номер слайда 3">
+            <a:extLst>
+              <a:ext uri="{FF2B5EF4-FFF2-40B4-BE49-F238E27FC236}">
+                <a16:creationId xmlns:a16="http://schemas.microsoft.com/office/drawing/2014/main" id="{120EF4AE-5701-18C8-0ECE-D2E3129CE08E}"/>
+              </a:ext>
+            </a:extLst>
+          </p:cNvPr>
+          <p:cNvSpPr>
+            <a:spLocks noGrp="1"/>
+          </p:cNvSpPr>
+          <p:nvPr>
+            <p:ph type="sldNum" sz="quarter" idx="12"/>
+          </p:nvPr>
+        </p:nvSpPr>
+        <p:spPr/>
+        <p:txBody>
+          <a:bodyPr/>
+          <a:lstStyle/>
+          <a:p>
+            <a:fld id="{E44E20FB-DC41-4FB4-820E-A7F1077F5D74}" type="slidenum">
+              <a:rPr lang="ru-RU" sz="1600" b="1"/>
+              <a:t>11</a:t>
+            </a:fld>
+            <a:endParaRPr lang="ru-RU" sz="1600" b="1" dirty="0"/>
+          </a:p>
+        </p:txBody>
+      </p:sp>
     </p:spTree>
     <p:extLst>
       <p:ext uri="{BB962C8B-B14F-4D97-AF65-F5344CB8AC3E}">
-        <p14:creationId xmlns:p14="http://schemas.microsoft.com/office/powerpoint/2010/main" val="3334540345"/>
+        <p14:creationId xmlns:p14="http://schemas.microsoft.com/office/powerpoint/2010/main" val="2733881677"/>
       </p:ext>
     </p:extLst>
   </p:cSld>
@@ -4293,7 +4389,7 @@
           <p:cNvPr id="2" name="Заголовок 1">
             <a:extLst>
               <a:ext uri="{FF2B5EF4-FFF2-40B4-BE49-F238E27FC236}">
-                <a16:creationId xmlns:a16="http://schemas.microsoft.com/office/drawing/2014/main" id="{C8E1BD63-9C3A-4C6C-7C33-FE7E7A04C370}"/>
+                <a16:creationId xmlns:a16="http://schemas.microsoft.com/office/drawing/2014/main" id="{30DDECF4-6CB3-A52B-F6B5-252B5FB0FA24}"/>
               </a:ext>
             </a:extLst>
           </p:cNvPr>
@@ -4304,71 +4400,107 @@
             <p:ph type="title"/>
           </p:nvPr>
         </p:nvSpPr>
+        <p:spPr>
+          <a:xfrm>
+            <a:off x="838200" y="365125"/>
+            <a:ext cx="10515600" cy="1012173"/>
+          </a:xfrm>
+        </p:spPr>
+        <p:txBody>
+          <a:bodyPr/>
+          <a:lstStyle/>
+          <a:p>
+            <a:r>
+              <a:rPr lang="ru-RU" dirty="0"/>
+              <a:t>Примеры результатов работы программы</a:t>
+            </a:r>
+          </a:p>
+        </p:txBody>
+      </p:sp>
+      <p:sp>
+        <p:nvSpPr>
+          <p:cNvPr id="4" name="Номер слайда 3">
+            <a:extLst>
+              <a:ext uri="{FF2B5EF4-FFF2-40B4-BE49-F238E27FC236}">
+                <a16:creationId xmlns:a16="http://schemas.microsoft.com/office/drawing/2014/main" id="{B0DC8631-66C6-3DD4-E800-03BF28DC7DA9}"/>
+              </a:ext>
+            </a:extLst>
+          </p:cNvPr>
+          <p:cNvSpPr>
+            <a:spLocks noGrp="1"/>
+          </p:cNvSpPr>
+          <p:nvPr>
+            <p:ph type="sldNum" sz="quarter" idx="12"/>
+          </p:nvPr>
+        </p:nvSpPr>
         <p:spPr/>
         <p:txBody>
-          <a:bodyPr/>
-          <a:lstStyle/>
-          <a:p>
-            <a:r>
-              <a:rPr lang="ru-RU" dirty="0"/>
-              <a:t>Стоимость до и после оптимизации</a:t>
-            </a:r>
-          </a:p>
-        </p:txBody>
-      </p:sp>
-      <p:sp>
-        <p:nvSpPr>
-          <p:cNvPr id="4" name="Номер слайда 3">
-            <a:extLst>
-              <a:ext uri="{FF2B5EF4-FFF2-40B4-BE49-F238E27FC236}">
-                <a16:creationId xmlns:a16="http://schemas.microsoft.com/office/drawing/2014/main" id="{1B1B77D1-AC4A-D20B-7257-405A39502D09}"/>
-              </a:ext>
-            </a:extLst>
-          </p:cNvPr>
-          <p:cNvSpPr>
-            <a:spLocks noGrp="1"/>
-          </p:cNvSpPr>
-          <p:nvPr>
-            <p:ph type="sldNum" sz="quarter" idx="12"/>
-          </p:nvPr>
-        </p:nvSpPr>
-        <p:spPr/>
-        <p:txBody>
-          <a:bodyPr/>
+          <a:bodyPr vert="horz" lIns="91440" tIns="45720" rIns="91440" bIns="45720" rtlCol="0" anchor="ctr"/>
           <a:lstStyle/>
           <a:p>
             <a:fld id="{E44E20FB-DC41-4FB4-820E-A7F1077F5D74}" type="slidenum">
-              <a:rPr lang="ru-RU" smtClean="0"/>
+              <a:rPr lang="ru-RU" sz="1600" b="1"/>
+              <a:pPr/>
               <a:t>12</a:t>
             </a:fld>
-            <a:endParaRPr lang="ru-RU"/>
+            <a:endParaRPr lang="ru-RU" sz="1600" b="1" dirty="0"/>
           </a:p>
         </p:txBody>
       </p:sp>
       <p:pic>
         <p:nvPicPr>
-          <p:cNvPr id="18" name="Объект 17">
-            <a:extLst>
-              <a:ext uri="{FF2B5EF4-FFF2-40B4-BE49-F238E27FC236}">
-                <a16:creationId xmlns:a16="http://schemas.microsoft.com/office/drawing/2014/main" id="{AC8BA22C-DA02-E5F9-4D08-BE98F081BE3F}"/>
+          <p:cNvPr id="5" name="Рисунок 4">
+            <a:extLst>
+              <a:ext uri="{FF2B5EF4-FFF2-40B4-BE49-F238E27FC236}">
+                <a16:creationId xmlns:a16="http://schemas.microsoft.com/office/drawing/2014/main" id="{ED07E4B4-DBD0-8F2A-CA78-76A3ABE8A3AD}"/>
               </a:ext>
             </a:extLst>
           </p:cNvPr>
           <p:cNvPicPr>
-            <a:picLocks noGrp="1" noChangeAspect="1"/>
+            <a:picLocks noChangeAspect="1"/>
           </p:cNvPicPr>
-          <p:nvPr>
-            <p:ph idx="1"/>
-          </p:nvPr>
+          <p:nvPr/>
+        </p:nvPicPr>
+        <p:blipFill rotWithShape="1">
+          <a:blip r:embed="rId2">
+            <a:extLst>
+              <a:ext uri="{28A0092B-C50C-407E-A947-70E740481C1C}">
+                <a14:useLocalDpi xmlns:a14="http://schemas.microsoft.com/office/drawing/2010/main" val="0"/>
+              </a:ext>
+            </a:extLst>
+          </a:blip>
+          <a:srcRect t="15569" b="10767"/>
+          <a:stretch/>
+        </p:blipFill>
+        <p:spPr>
+          <a:xfrm>
+            <a:off x="838201" y="4779871"/>
+            <a:ext cx="6896100" cy="2039488"/>
+          </a:xfrm>
+          <a:prstGeom prst="rect">
+            <a:avLst/>
+          </a:prstGeom>
+        </p:spPr>
+      </p:pic>
+      <p:pic>
+        <p:nvPicPr>
+          <p:cNvPr id="16" name="Рисунок 15">
+            <a:extLst>
+              <a:ext uri="{FF2B5EF4-FFF2-40B4-BE49-F238E27FC236}">
+                <a16:creationId xmlns:a16="http://schemas.microsoft.com/office/drawing/2014/main" id="{FEC3DE25-7966-6D1E-16C5-38B118F0C6FD}"/>
+              </a:ext>
+            </a:extLst>
+          </p:cNvPr>
+          <p:cNvPicPr>
+            <a:picLocks noChangeAspect="1"/>
+          </p:cNvPicPr>
+          <p:nvPr/>
         </p:nvPicPr>
         <p:blipFill>
-          <a:blip r:embed="rId2">
+          <a:blip r:embed="rId3">
             <a:extLst>
               <a:ext uri="{28A0092B-C50C-407E-A947-70E740481C1C}">
                 <a14:useLocalDpi xmlns:a14="http://schemas.microsoft.com/office/drawing/2010/main" val="0"/>
-              </a:ext>
-              <a:ext uri="{96DAC541-7B7A-43D3-8B79-37D633B846F1}">
-                <asvg:svgBlip xmlns:asvg="http://schemas.microsoft.com/office/drawing/2016/SVG/main" r:embed="rId3"/>
               </a:ext>
             </a:extLst>
           </a:blip>
@@ -4378,15 +4510,48 @@
         </p:blipFill>
         <p:spPr>
           <a:xfrm>
-            <a:off x="838200" y="1847849"/>
-            <a:ext cx="10515599" cy="4568825"/>
+            <a:off x="7801204" y="1281046"/>
+            <a:ext cx="4361991" cy="4449193"/>
           </a:xfrm>
+          <a:prstGeom prst="rect">
+            <a:avLst/>
+          </a:prstGeom>
+        </p:spPr>
+      </p:pic>
+      <p:pic>
+        <p:nvPicPr>
+          <p:cNvPr id="11" name="Рисунок 10">
+            <a:extLst>
+              <a:ext uri="{FF2B5EF4-FFF2-40B4-BE49-F238E27FC236}">
+                <a16:creationId xmlns:a16="http://schemas.microsoft.com/office/drawing/2014/main" id="{74CFE917-8F37-A986-54BC-829C0A1DDDC7}"/>
+              </a:ext>
+            </a:extLst>
+          </p:cNvPr>
+          <p:cNvPicPr>
+            <a:picLocks noChangeAspect="1"/>
+          </p:cNvPicPr>
+          <p:nvPr/>
+        </p:nvPicPr>
+        <p:blipFill>
+          <a:blip r:embed="rId4"/>
+          <a:stretch>
+            <a:fillRect/>
+          </a:stretch>
+        </p:blipFill>
+        <p:spPr>
+          <a:xfrm>
+            <a:off x="838200" y="1281047"/>
+            <a:ext cx="6350000" cy="3372256"/>
+          </a:xfrm>
+          <a:prstGeom prst="rect">
+            <a:avLst/>
+          </a:prstGeom>
         </p:spPr>
       </p:pic>
     </p:spTree>
     <p:extLst>
       <p:ext uri="{BB962C8B-B14F-4D97-AF65-F5344CB8AC3E}">
-        <p14:creationId xmlns:p14="http://schemas.microsoft.com/office/powerpoint/2010/main" val="2719231125"/>
+        <p14:creationId xmlns:p14="http://schemas.microsoft.com/office/powerpoint/2010/main" val="3334540345"/>
       </p:ext>
     </p:extLst>
   </p:cSld>
@@ -4418,7 +4583,7 @@
           <p:cNvPr id="2" name="Заголовок 1">
             <a:extLst>
               <a:ext uri="{FF2B5EF4-FFF2-40B4-BE49-F238E27FC236}">
-                <a16:creationId xmlns:a16="http://schemas.microsoft.com/office/drawing/2014/main" id="{77E05D5E-F340-13C9-216E-567CBB032C7A}"/>
+                <a16:creationId xmlns:a16="http://schemas.microsoft.com/office/drawing/2014/main" id="{C8E1BD63-9C3A-4C6C-7C33-FE7E7A04C370}"/>
               </a:ext>
             </a:extLst>
           </p:cNvPr>
@@ -4436,26 +4601,53 @@
           <a:p>
             <a:r>
               <a:rPr lang="ru-RU" dirty="0"/>
-              <a:t>Временные ограничения программы</a:t>
-            </a:r>
+              <a:t>Результаты экспериментальной проверки работы метода</a:t>
+            </a:r>
+          </a:p>
+        </p:txBody>
+      </p:sp>
+      <p:sp>
+        <p:nvSpPr>
+          <p:cNvPr id="4" name="Номер слайда 3">
+            <a:extLst>
+              <a:ext uri="{FF2B5EF4-FFF2-40B4-BE49-F238E27FC236}">
+                <a16:creationId xmlns:a16="http://schemas.microsoft.com/office/drawing/2014/main" id="{1B1B77D1-AC4A-D20B-7257-405A39502D09}"/>
+              </a:ext>
+            </a:extLst>
+          </p:cNvPr>
+          <p:cNvSpPr>
+            <a:spLocks noGrp="1"/>
+          </p:cNvSpPr>
+          <p:nvPr>
+            <p:ph type="sldNum" sz="quarter" idx="12"/>
+          </p:nvPr>
+        </p:nvSpPr>
+        <p:spPr/>
+        <p:txBody>
+          <a:bodyPr/>
+          <a:lstStyle/>
+          <a:p>
+            <a:fld id="{E44E20FB-DC41-4FB4-820E-A7F1077F5D74}" type="slidenum">
+              <a:rPr lang="ru-RU" sz="1600" b="1"/>
+              <a:t>13</a:t>
+            </a:fld>
+            <a:endParaRPr lang="ru-RU" sz="1600" b="1" dirty="0"/>
           </a:p>
         </p:txBody>
       </p:sp>
       <p:pic>
         <p:nvPicPr>
-          <p:cNvPr id="6" name="Объект 5">
-            <a:extLst>
-              <a:ext uri="{FF2B5EF4-FFF2-40B4-BE49-F238E27FC236}">
-                <a16:creationId xmlns:a16="http://schemas.microsoft.com/office/drawing/2014/main" id="{0B5C43D1-A85F-4BFB-6D2F-B1B5AD269CB4}"/>
+          <p:cNvPr id="27" name="Объект 14">
+            <a:extLst>
+              <a:ext uri="{FF2B5EF4-FFF2-40B4-BE49-F238E27FC236}">
+                <a16:creationId xmlns:a16="http://schemas.microsoft.com/office/drawing/2014/main" id="{F715FBD4-F535-E4D7-4B9D-15E6BAFBF1FC}"/>
               </a:ext>
             </a:extLst>
           </p:cNvPr>
           <p:cNvPicPr>
-            <a:picLocks noGrp="1" noChangeAspect="1"/>
+            <a:picLocks noChangeAspect="1"/>
           </p:cNvPicPr>
-          <p:nvPr>
-            <p:ph idx="1"/>
-          </p:nvPr>
+          <p:nvPr/>
         </p:nvPicPr>
         <p:blipFill>
           <a:blip r:embed="rId2">
@@ -4465,6 +4657,44 @@
               </a:ext>
               <a:ext uri="{96DAC541-7B7A-43D3-8B79-37D633B846F1}">
                 <asvg:svgBlip xmlns:asvg="http://schemas.microsoft.com/office/drawing/2016/SVG/main" r:embed="rId3"/>
+              </a:ext>
+            </a:extLst>
+          </a:blip>
+          <a:srcRect/>
+          <a:stretch/>
+        </p:blipFill>
+        <p:spPr>
+          <a:xfrm>
+            <a:off x="6096000" y="1686178"/>
+            <a:ext cx="5703771" cy="4670172"/>
+          </a:xfrm>
+          <a:prstGeom prst="rect">
+            <a:avLst/>
+          </a:prstGeom>
+        </p:spPr>
+      </p:pic>
+      <p:pic>
+        <p:nvPicPr>
+          <p:cNvPr id="36" name="Рисунок 35">
+            <a:extLst>
+              <a:ext uri="{FF2B5EF4-FFF2-40B4-BE49-F238E27FC236}">
+                <a16:creationId xmlns:a16="http://schemas.microsoft.com/office/drawing/2014/main" id="{32FFCA63-9A10-BF14-E5B5-F58F9537CAD2}"/>
+              </a:ext>
+            </a:extLst>
+          </p:cNvPr>
+          <p:cNvPicPr>
+            <a:picLocks noChangeAspect="1"/>
+          </p:cNvPicPr>
+          <p:nvPr/>
+        </p:nvPicPr>
+        <p:blipFill>
+          <a:blip r:embed="rId4">
+            <a:extLst>
+              <a:ext uri="{28A0092B-C50C-407E-A947-70E740481C1C}">
+                <a14:useLocalDpi xmlns:a14="http://schemas.microsoft.com/office/drawing/2010/main" val="0"/>
+              </a:ext>
+              <a:ext uri="{96DAC541-7B7A-43D3-8B79-37D633B846F1}">
+                <asvg:svgBlip xmlns:asvg="http://schemas.microsoft.com/office/drawing/2016/SVG/main" r:embed="rId5"/>
               </a:ext>
             </a:extLst>
           </a:blip>
@@ -4474,44 +4704,18 @@
         </p:blipFill>
         <p:spPr>
           <a:xfrm>
-            <a:off x="838199" y="1847850"/>
-            <a:ext cx="10515600" cy="4579982"/>
+            <a:off x="188992" y="1691464"/>
+            <a:ext cx="5771517" cy="4670172"/>
           </a:xfrm>
+          <a:prstGeom prst="rect">
+            <a:avLst/>
+          </a:prstGeom>
         </p:spPr>
       </p:pic>
-      <p:sp>
-        <p:nvSpPr>
-          <p:cNvPr id="4" name="Номер слайда 3">
-            <a:extLst>
-              <a:ext uri="{FF2B5EF4-FFF2-40B4-BE49-F238E27FC236}">
-                <a16:creationId xmlns:a16="http://schemas.microsoft.com/office/drawing/2014/main" id="{1BF85665-8A31-48D2-8272-03528A65B7B4}"/>
-              </a:ext>
-            </a:extLst>
-          </p:cNvPr>
-          <p:cNvSpPr>
-            <a:spLocks noGrp="1"/>
-          </p:cNvSpPr>
-          <p:nvPr>
-            <p:ph type="sldNum" sz="quarter" idx="12"/>
-          </p:nvPr>
-        </p:nvSpPr>
-        <p:spPr/>
-        <p:txBody>
-          <a:bodyPr/>
-          <a:lstStyle/>
-          <a:p>
-            <a:fld id="{E44E20FB-DC41-4FB4-820E-A7F1077F5D74}" type="slidenum">
-              <a:rPr lang="ru-RU" smtClean="0"/>
-              <a:t>13</a:t>
-            </a:fld>
-            <a:endParaRPr lang="ru-RU"/>
-          </a:p>
-        </p:txBody>
-      </p:sp>
     </p:spTree>
     <p:extLst>
       <p:ext uri="{BB962C8B-B14F-4D97-AF65-F5344CB8AC3E}">
-        <p14:creationId xmlns:p14="http://schemas.microsoft.com/office/powerpoint/2010/main" val="3522274239"/>
+        <p14:creationId xmlns:p14="http://schemas.microsoft.com/office/powerpoint/2010/main" val="2719231125"/>
       </p:ext>
     </p:extLst>
   </p:cSld>
@@ -4582,10 +4786,15 @@
             <p:ph idx="1"/>
           </p:nvPr>
         </p:nvSpPr>
-        <p:spPr/>
+        <p:spPr>
+          <a:xfrm>
+            <a:off x="838200" y="1825624"/>
+            <a:ext cx="10515600" cy="4530725"/>
+          </a:xfrm>
+        </p:spPr>
         <p:txBody>
           <a:bodyPr>
-            <a:normAutofit fontScale="92500" lnSpcReduction="10000"/>
+            <a:normAutofit fontScale="92500" lnSpcReduction="20000"/>
           </a:bodyPr>
           <a:lstStyle/>
           <a:p>
@@ -4606,7 +4815,7 @@
             </a:r>
             <a:r>
               <a:rPr lang="ru-RU" sz="3000" dirty="0"/>
-              <a:t>разработан собственный метод для оптимизации доставки товаров</a:t>
+              <a:t>разработан метода оптимизации планирования грузоперевозок в транспортной системе</a:t>
             </a:r>
             <a:r>
               <a:rPr lang="en-US" sz="3000" dirty="0"/>
@@ -4618,12 +4827,8 @@
               <a:buNone/>
             </a:pPr>
             <a:r>
-              <a:rPr lang="en-US" sz="3000" dirty="0"/>
-              <a:t>	</a:t>
-            </a:r>
-            <a:r>
               <a:rPr lang="ru-RU" sz="3000" dirty="0"/>
-              <a:t>Были решены следующие задачи</a:t>
+              <a:t>	Решены следующие задачи</a:t>
             </a:r>
             <a:r>
               <a:rPr lang="en-US" sz="3000" dirty="0"/>
@@ -4633,37 +4838,44 @@
           <a:p>
             <a:pPr lvl="1"/>
             <a:r>
-              <a:rPr lang="ru-RU" sz="2600" dirty="0"/>
-              <a:t>проанализирована предметная область, проведён сравнительный анализ с известными решениями, выявлены основные особенности;</a:t>
+              <a:rPr lang="ru-RU" sz="2800" dirty="0"/>
+              <a:t>проведён анализ предметной области;</a:t>
             </a:r>
           </a:p>
           <a:p>
             <a:pPr lvl="1"/>
             <a:r>
-              <a:rPr lang="ru-RU" sz="2600" dirty="0"/>
-              <a:t>установлены цели создания метода, его критерий оптимизации, допущения и ограничения;</a:t>
-            </a:r>
+              <a:rPr lang="ru-RU" sz="2800" dirty="0"/>
+              <a:t>с использованием математической модели формализована постановку задачи, определён критерии оценки оптимальности решений</a:t>
+            </a:r>
+            <a:r>
+              <a:rPr lang="en-US" sz="2800" dirty="0"/>
+              <a:t>;</a:t>
+            </a:r>
+            <a:endParaRPr lang="ru-RU" sz="2800" dirty="0"/>
           </a:p>
           <a:p>
             <a:pPr lvl="1"/>
             <a:r>
-              <a:rPr lang="ru-RU" sz="2600" dirty="0"/>
-              <a:t>описана математическая модель в рамках формализации задачи;</a:t>
-            </a:r>
+              <a:rPr lang="ru-RU" sz="2800" dirty="0"/>
+              <a:t>при разработке метода использованы существующие методы решения транспортных задач;</a:t>
+            </a:r>
+            <a:endParaRPr lang="en-US" sz="2800" dirty="0"/>
           </a:p>
           <a:p>
             <a:pPr lvl="1"/>
             <a:r>
-              <a:rPr lang="ru-RU" sz="2600" dirty="0"/>
-              <a:t>выделен, описан и реализован метод оптимизации грузоперевозок в транспортной системе;</a:t>
+              <a:rPr lang="ru-RU" sz="2800" dirty="0"/>
+              <a:t>разработан и реализован метод;</a:t>
             </a:r>
           </a:p>
           <a:p>
             <a:pPr lvl="1"/>
             <a:r>
-              <a:rPr lang="ru-RU" sz="2600" dirty="0"/>
-              <a:t>проведено исследование алгоритма, работоспособности программы и её ограничений.</a:t>
-            </a:r>
+              <a:rPr lang="ru-RU" sz="2800" dirty="0"/>
+              <a:t>проведена экспериментальная проверка работы реализованного метода.</a:t>
+            </a:r>
+            <a:endParaRPr lang="ru-RU" sz="2600" dirty="0"/>
           </a:p>
         </p:txBody>
       </p:sp>
@@ -4689,10 +4901,10 @@
           <a:lstStyle/>
           <a:p>
             <a:fld id="{E44E20FB-DC41-4FB4-820E-A7F1077F5D74}" type="slidenum">
-              <a:rPr lang="ru-RU" smtClean="0"/>
+              <a:rPr lang="ru-RU" sz="1600" b="1"/>
               <a:t>14</a:t>
             </a:fld>
-            <a:endParaRPr lang="ru-RU"/>
+            <a:endParaRPr lang="ru-RU" sz="1600" b="1" dirty="0"/>
           </a:p>
         </p:txBody>
       </p:sp>
@@ -4786,7 +4998,7 @@
         </p:spPr>
         <p:txBody>
           <a:bodyPr>
-            <a:normAutofit lnSpcReduction="10000"/>
+            <a:normAutofit/>
           </a:bodyPr>
           <a:lstStyle/>
           <a:p>
@@ -4795,11 +5007,19 @@
             </a:pPr>
             <a:r>
               <a:rPr lang="ru-RU" b="1" dirty="0"/>
-              <a:t>Целью</a:t>
+              <a:t>Цель</a:t>
             </a:r>
             <a:r>
               <a:rPr lang="ru-RU" dirty="0"/>
-              <a:t> данной работы является разработка метода оптимизации планирования грузоперевозок в транспортной системе.</a:t>
+              <a:t> данной работы</a:t>
+            </a:r>
+            <a:r>
+              <a:rPr lang="en-US" dirty="0"/>
+              <a:t>:</a:t>
+            </a:r>
+            <a:r>
+              <a:rPr lang="ru-RU" dirty="0"/>
+              <a:t> разработка метода оптимизации планирования грузоперевозок в транспортной системе.</a:t>
             </a:r>
             <a:endParaRPr lang="en-US" dirty="0"/>
           </a:p>
@@ -4832,7 +5052,19 @@
             <a:pPr lvl="1"/>
             <a:r>
               <a:rPr lang="ru-RU" dirty="0"/>
-              <a:t>выбрать базовый метод оптимизации и определить направления его модификации;</a:t>
+              <a:t>формализовать постановку задачи с использованием математической модели</a:t>
+            </a:r>
+            <a:r>
+              <a:rPr lang="en-US" dirty="0"/>
+              <a:t>;</a:t>
+            </a:r>
+            <a:endParaRPr lang="ru-RU" dirty="0"/>
+          </a:p>
+          <a:p>
+            <a:pPr lvl="1"/>
+            <a:r>
+              <a:rPr lang="ru-RU" dirty="0"/>
+              <a:t>изучить существующие методы решения транспортных задач для использования при разработке метода;</a:t>
             </a:r>
             <a:endParaRPr lang="en-US" dirty="0"/>
           </a:p>
@@ -4840,29 +5072,14 @@
             <a:pPr lvl="1"/>
             <a:r>
               <a:rPr lang="ru-RU" dirty="0"/>
-              <a:t>формализовать задание, определить необходимый функционал программы; </a:t>
+              <a:t>разработать и реализовать метод;</a:t>
             </a:r>
           </a:p>
           <a:p>
             <a:pPr lvl="1"/>
             <a:r>
               <a:rPr lang="ru-RU" dirty="0"/>
-              <a:t>определить набор необходимых данных и способ их хранения;</a:t>
-            </a:r>
-            <a:endParaRPr lang="en-US" dirty="0"/>
-          </a:p>
-          <a:p>
-            <a:pPr lvl="1"/>
-            <a:r>
-              <a:rPr lang="ru-RU" dirty="0"/>
-              <a:t>разработать программу и протестировать её;</a:t>
-            </a:r>
-          </a:p>
-          <a:p>
-            <a:pPr lvl="1"/>
-            <a:r>
-              <a:rPr lang="ru-RU" dirty="0"/>
-              <a:t>провести экспериментальную проверку качества работы реализованного метода.</a:t>
+              <a:t>провести экспериментальную проверку работы реализованного метода.</a:t>
             </a:r>
           </a:p>
         </p:txBody>
@@ -4889,10 +5106,10 @@
           <a:lstStyle/>
           <a:p>
             <a:fld id="{E44E20FB-DC41-4FB4-820E-A7F1077F5D74}" type="slidenum">
-              <a:rPr lang="ru-RU" smtClean="0"/>
+              <a:rPr lang="ru-RU" sz="1600" b="1" smtClean="0"/>
               <a:t>2</a:t>
             </a:fld>
-            <a:endParaRPr lang="ru-RU"/>
+            <a:endParaRPr lang="ru-RU" sz="1600" b="1" dirty="0"/>
           </a:p>
         </p:txBody>
       </p:sp>
@@ -5009,11 +5226,11 @@
             </a:r>
             <a:r>
               <a:rPr lang="en-US" dirty="0"/>
-              <a:t>– </a:t>
+              <a:t>(supply chain management) – </a:t>
             </a:r>
             <a:r>
               <a:rPr lang="ru-RU" dirty="0"/>
-              <a:t>комплекс подходов, помогающий эффективной интеграции поставщиков, производителей, дистрибьюторов и продавцов.</a:t>
+              <a:t>комплекс подходов, помогающий эффективной интеграции частей цепочке поставок.</a:t>
             </a:r>
           </a:p>
           <a:p>
@@ -5027,7 +5244,7 @@
             </a:r>
             <a:r>
               <a:rPr lang="ru-RU" dirty="0"/>
-              <a:t> система управления транспортом</a:t>
+              <a:t> система управления транспортом.</a:t>
             </a:r>
           </a:p>
         </p:txBody>
@@ -5054,10 +5271,10 @@
           <a:lstStyle/>
           <a:p>
             <a:fld id="{E44E20FB-DC41-4FB4-820E-A7F1077F5D74}" type="slidenum">
-              <a:rPr lang="ru-RU" smtClean="0"/>
+              <a:rPr lang="ru-RU" sz="1600" b="1" smtClean="0"/>
               <a:t>3</a:t>
             </a:fld>
-            <a:endParaRPr lang="ru-RU"/>
+            <a:endParaRPr lang="ru-RU" sz="1600" b="1" dirty="0"/>
           </a:p>
         </p:txBody>
       </p:sp>
@@ -5119,7 +5336,7 @@
           <a:p>
             <a:r>
               <a:rPr lang="ru-RU" dirty="0"/>
-              <a:t>Анализ существующих программных решений</a:t>
+              <a:t>Сравнение существующих программных решений</a:t>
             </a:r>
           </a:p>
         </p:txBody>
@@ -5140,14 +5357,14 @@
             <p:ph idx="1"/>
             <p:extLst>
               <p:ext uri="{D42A27DB-BD31-4B8C-83A1-F6EECF244321}">
-                <p14:modId xmlns:p14="http://schemas.microsoft.com/office/powerpoint/2010/main" val="1947083651"/>
+                <p14:modId xmlns:p14="http://schemas.microsoft.com/office/powerpoint/2010/main" val="3701629514"/>
               </p:ext>
             </p:extLst>
           </p:nvPr>
         </p:nvGraphicFramePr>
         <p:xfrm>
-          <a:off x="838200" y="1690687"/>
-          <a:ext cx="9819639" cy="4546667"/>
+          <a:off x="838200" y="1859280"/>
+          <a:ext cx="11140440" cy="4414041"/>
         </p:xfrm>
         <a:graphic>
           <a:graphicData uri="http://schemas.openxmlformats.org/drawingml/2006/table">
@@ -5156,28 +5373,28 @@
                 <a:tableStyleId>{073A0DAA-6AF3-43AB-8588-CEC1D06C72B9}</a:tableStyleId>
               </a:tblPr>
               <a:tblGrid>
-                <a:gridCol w="3225907">
+                <a:gridCol w="3530600">
                   <a:extLst>
                     <a:ext uri="{9D8B030D-6E8A-4147-A177-3AD203B41FA5}">
                       <a16:colId xmlns:a16="http://schemas.microsoft.com/office/drawing/2014/main" val="181861236"/>
                     </a:ext>
                   </a:extLst>
                 </a:gridCol>
-                <a:gridCol w="2423524">
+                <a:gridCol w="2878714">
                   <a:extLst>
                     <a:ext uri="{9D8B030D-6E8A-4147-A177-3AD203B41FA5}">
                       <a16:colId xmlns:a16="http://schemas.microsoft.com/office/drawing/2014/main" val="758202606"/>
                     </a:ext>
                   </a:extLst>
                 </a:gridCol>
-                <a:gridCol w="1997770">
+                <a:gridCol w="2266482">
                   <a:extLst>
                     <a:ext uri="{9D8B030D-6E8A-4147-A177-3AD203B41FA5}">
                       <a16:colId xmlns:a16="http://schemas.microsoft.com/office/drawing/2014/main" val="3064534097"/>
                     </a:ext>
                   </a:extLst>
                 </a:gridCol>
-                <a:gridCol w="2172438">
+                <a:gridCol w="2464644">
                   <a:extLst>
                     <a:ext uri="{9D8B030D-6E8A-4147-A177-3AD203B41FA5}">
                       <a16:colId xmlns:a16="http://schemas.microsoft.com/office/drawing/2014/main" val="3337284535"/>
@@ -5185,7 +5402,7 @@
                   </a:extLst>
                 </a:gridCol>
               </a:tblGrid>
-              <a:tr h="687757">
+              <a:tr h="662255">
                 <a:tc>
                   <a:txBody>
                     <a:bodyPr/>
@@ -5269,7 +5486,7 @@
                   </a:ext>
                 </a:extLst>
               </a:tr>
-              <a:tr h="958800">
+              <a:tr h="923247">
                 <a:tc>
                   <a:txBody>
                     <a:bodyPr/>
@@ -5352,7 +5569,7 @@
                   </a:ext>
                 </a:extLst>
               </a:tr>
-              <a:tr h="958800">
+              <a:tr h="923247">
                 <a:tc>
                   <a:txBody>
                     <a:bodyPr/>
@@ -5435,7 +5652,7 @@
                   </a:ext>
                 </a:extLst>
               </a:tr>
-              <a:tr h="982510">
+              <a:tr h="946078">
                 <a:tc>
                   <a:txBody>
                     <a:bodyPr/>
@@ -5518,7 +5735,7 @@
                   </a:ext>
                 </a:extLst>
               </a:tr>
-              <a:tr h="958800">
+              <a:tr h="923247">
                 <a:tc>
                   <a:txBody>
                     <a:bodyPr/>
@@ -5623,14 +5840,15 @@
         </p:nvSpPr>
         <p:spPr/>
         <p:txBody>
-          <a:bodyPr/>
+          <a:bodyPr vert="horz" lIns="91440" tIns="45720" rIns="91440" bIns="45720" rtlCol="0" anchor="ctr"/>
           <a:lstStyle/>
           <a:p>
             <a:fld id="{E44E20FB-DC41-4FB4-820E-A7F1077F5D74}" type="slidenum">
-              <a:rPr lang="ru-RU" smtClean="0"/>
+              <a:rPr lang="ru-RU" sz="1600" b="1"/>
+              <a:pPr/>
               <a:t>4</a:t>
             </a:fld>
-            <a:endParaRPr lang="ru-RU"/>
+            <a:endParaRPr lang="ru-RU" sz="1600" b="1" dirty="0"/>
           </a:p>
         </p:txBody>
       </p:sp>
@@ -5687,129 +5905,313 @@
           <a:p>
             <a:r>
               <a:rPr lang="ru-RU" dirty="0"/>
-              <a:t>Математическая постановка задачи</a:t>
-            </a:r>
-          </a:p>
-        </p:txBody>
-      </p:sp>
-      <p:sp>
-        <p:nvSpPr>
-          <p:cNvPr id="3" name="Объект 2">
-            <a:extLst>
-              <a:ext uri="{FF2B5EF4-FFF2-40B4-BE49-F238E27FC236}">
-                <a16:creationId xmlns:a16="http://schemas.microsoft.com/office/drawing/2014/main" id="{13E6B1EB-D9AE-EC94-48D3-1459C1D2E683}"/>
-              </a:ext>
-            </a:extLst>
-          </p:cNvPr>
-          <p:cNvSpPr>
-            <a:spLocks noGrp="1"/>
-          </p:cNvSpPr>
-          <p:nvPr>
-            <p:ph idx="1"/>
-          </p:nvPr>
-        </p:nvSpPr>
-        <p:spPr>
-          <a:xfrm>
-            <a:off x="838200" y="2141537"/>
-            <a:ext cx="11291888" cy="4351338"/>
-          </a:xfrm>
-        </p:spPr>
-        <p:txBody>
-          <a:bodyPr/>
-          <a:lstStyle/>
-          <a:p>
+              <a:t>Математическая </a:t>
+            </a:r>
+            <a:br>
+              <a:rPr lang="en-US" dirty="0"/>
+            </a:br>
             <a:r>
               <a:rPr lang="ru-RU" dirty="0"/>
-              <a:t>Представление транспортной системы</a:t>
-            </a:r>
-            <a:r>
-              <a:rPr lang="en-US" dirty="0"/>
-              <a:t>: </a:t>
-            </a:r>
-          </a:p>
-          <a:p>
-            <a:pPr marL="0" indent="0">
-              <a:buNone/>
-            </a:pPr>
-            <a:r>
-              <a:rPr lang="ru-RU" dirty="0"/>
-              <a:t>неориентированный связанный взвешенный граф.</a:t>
-            </a:r>
-          </a:p>
-          <a:p>
-            <a:pPr lvl="1"/>
-            <a:r>
-              <a:rPr lang="ru-RU" dirty="0"/>
-              <a:t>Вершины – пункты маршрута (стоянка, склады, потребители)</a:t>
-            </a:r>
-          </a:p>
-          <a:p>
-            <a:pPr lvl="1"/>
-            <a:r>
-              <a:rPr lang="ru-RU" dirty="0"/>
-              <a:t>Рёбра – дороги, вес – расстояние (в км.)</a:t>
-            </a:r>
-          </a:p>
-          <a:p>
-            <a:r>
-              <a:rPr lang="ru-RU" dirty="0"/>
-              <a:t>Задача</a:t>
-            </a:r>
-            <a:r>
-              <a:rPr lang="en-US" dirty="0"/>
-              <a:t>: </a:t>
-            </a:r>
-            <a:r>
-              <a:rPr lang="ru-RU" dirty="0"/>
-              <a:t>поиск множества циклов, в котором выполняется следующее</a:t>
-            </a:r>
-            <a:r>
-              <a:rPr lang="en-US" dirty="0"/>
-              <a:t>:</a:t>
-            </a:r>
-          </a:p>
-          <a:p>
-            <a:pPr lvl="1"/>
-            <a:r>
-              <a:rPr lang="ru-RU" dirty="0"/>
-              <a:t>‌циклы начинающихся на стоянке</a:t>
-            </a:r>
-            <a:r>
-              <a:rPr lang="en-US" dirty="0"/>
-              <a:t>;</a:t>
-            </a:r>
-          </a:p>
-          <a:p>
-            <a:pPr lvl="1"/>
-            <a:r>
-              <a:rPr lang="ru-RU" dirty="0"/>
-              <a:t>каждый цикл выполняет перевозку груза из склада потребителям</a:t>
-            </a:r>
-            <a:r>
-              <a:rPr lang="en-US" dirty="0"/>
-              <a:t>;</a:t>
-            </a:r>
-          </a:p>
-          <a:p>
-            <a:pPr lvl="1"/>
-            <a:r>
-              <a:rPr lang="ru-RU" dirty="0"/>
-              <a:t>соблюдаются ограничения модели</a:t>
-            </a:r>
-            <a:r>
-              <a:rPr lang="en-US" dirty="0"/>
-              <a:t>;</a:t>
-            </a:r>
-          </a:p>
-          <a:p>
-            <a:pPr lvl="1"/>
-            <a:r>
-              <a:rPr lang="ru-RU" dirty="0"/>
-              <a:t>функция оптимума минимальна.</a:t>
-            </a:r>
-          </a:p>
-        </p:txBody>
-      </p:sp>
+              <a:t>постановка задачи</a:t>
+            </a:r>
+          </a:p>
+        </p:txBody>
+      </p:sp>
+      <mc:AlternateContent xmlns:mc="http://schemas.openxmlformats.org/markup-compatibility/2006">
+        <mc:Choice xmlns:a14="http://schemas.microsoft.com/office/drawing/2010/main" Requires="a14">
+          <p:sp>
+            <p:nvSpPr>
+              <p:cNvPr id="3" name="Объект 2">
+                <a:extLst>
+                  <a:ext uri="{FF2B5EF4-FFF2-40B4-BE49-F238E27FC236}">
+                    <a16:creationId xmlns:a16="http://schemas.microsoft.com/office/drawing/2014/main" id="{13E6B1EB-D9AE-EC94-48D3-1459C1D2E683}"/>
+                  </a:ext>
+                </a:extLst>
+              </p:cNvPr>
+              <p:cNvSpPr>
+                <a:spLocks noGrp="1"/>
+              </p:cNvSpPr>
+              <p:nvPr>
+                <p:ph idx="1"/>
+              </p:nvPr>
+            </p:nvSpPr>
+            <p:spPr>
+              <a:xfrm>
+                <a:off x="838200" y="2141537"/>
+                <a:ext cx="11291888" cy="4351338"/>
+              </a:xfrm>
+            </p:spPr>
+            <p:txBody>
+              <a:bodyPr>
+                <a:normAutofit fontScale="85000" lnSpcReduction="20000"/>
+              </a:bodyPr>
+              <a:lstStyle/>
+              <a:p>
+                <a:pPr marL="0" indent="0">
+                  <a:buNone/>
+                </a:pPr>
+                <a:r>
+                  <a:rPr lang="ru-RU" dirty="0"/>
+                  <a:t>Представление транспортной системы</a:t>
+                </a:r>
+                <a:r>
+                  <a:rPr lang="en-US" dirty="0"/>
+                  <a:t>: </a:t>
+                </a:r>
+              </a:p>
+              <a:p>
+                <a:pPr marL="0" indent="0">
+                  <a:buNone/>
+                </a:pPr>
+                <a:r>
+                  <a:rPr lang="ru-RU" dirty="0"/>
+                  <a:t>неориентированный связанный взвешенный граф</a:t>
+                </a:r>
+                <a:r>
+                  <a:rPr lang="en-US" dirty="0"/>
+                  <a:t> </a:t>
+                </a:r>
+                <a14:m>
+                  <m:oMath xmlns:m="http://schemas.openxmlformats.org/officeDocument/2006/math">
+                    <m:r>
+                      <a:rPr lang="en-US" b="0" i="1" smtClean="0">
+                        <a:latin typeface="Cambria Math" panose="02040503050406030204" pitchFamily="18" charset="0"/>
+                      </a:rPr>
+                      <m:t>𝐺</m:t>
+                    </m:r>
+                    <m:r>
+                      <a:rPr lang="en-US" b="0" i="1" smtClean="0">
+                        <a:latin typeface="Cambria Math" panose="02040503050406030204" pitchFamily="18" charset="0"/>
+                      </a:rPr>
+                      <m:t>=(</m:t>
+                    </m:r>
+                    <m:r>
+                      <a:rPr lang="en-US" b="0" i="1" smtClean="0">
+                        <a:latin typeface="Cambria Math" panose="02040503050406030204" pitchFamily="18" charset="0"/>
+                      </a:rPr>
+                      <m:t>𝑃</m:t>
+                    </m:r>
+                    <m:r>
+                      <a:rPr lang="en-US" b="0" i="1" smtClean="0">
+                        <a:latin typeface="Cambria Math" panose="02040503050406030204" pitchFamily="18" charset="0"/>
+                      </a:rPr>
+                      <m:t>, </m:t>
+                    </m:r>
+                    <m:r>
+                      <a:rPr lang="en-US" b="0" i="1" smtClean="0">
+                        <a:latin typeface="Cambria Math" panose="02040503050406030204" pitchFamily="18" charset="0"/>
+                      </a:rPr>
+                      <m:t>𝑑</m:t>
+                    </m:r>
+                    <m:r>
+                      <a:rPr lang="en-US" b="0" i="1" smtClean="0">
+                        <a:latin typeface="Cambria Math" panose="02040503050406030204" pitchFamily="18" charset="0"/>
+                      </a:rPr>
+                      <m:t>)</m:t>
+                    </m:r>
+                  </m:oMath>
+                </a14:m>
+                <a:r>
+                  <a:rPr lang="ru-RU" dirty="0"/>
+                  <a:t>.</a:t>
+                </a:r>
+              </a:p>
+              <a:p>
+                <a:pPr lvl="1"/>
+                <a:r>
+                  <a:rPr lang="ru-RU" sz="2600" dirty="0"/>
+                  <a:t>Вершины – пункты маршрута</a:t>
+                </a:r>
+                <a:r>
+                  <a:rPr lang="en-US" sz="2600" dirty="0"/>
+                  <a:t> </a:t>
+                </a:r>
+                <a14:m>
+                  <m:oMath xmlns:m="http://schemas.openxmlformats.org/officeDocument/2006/math">
+                    <m:r>
+                      <a:rPr lang="en-US" sz="3200" b="0" i="1" smtClean="0">
+                        <a:latin typeface="Cambria Math" panose="02040503050406030204" pitchFamily="18" charset="0"/>
+                      </a:rPr>
+                      <m:t>𝑃</m:t>
+                    </m:r>
+                  </m:oMath>
+                </a14:m>
+                <a:r>
+                  <a:rPr lang="ru-RU" sz="2600" dirty="0"/>
+                  <a:t> (стоянка, склады, потребители)</a:t>
+                </a:r>
+              </a:p>
+              <a:p>
+                <a:pPr lvl="1"/>
+                <a:r>
+                  <a:rPr lang="ru-RU" sz="2600" dirty="0"/>
+                  <a:t>Рёбра – дороги, вес – расстояние</a:t>
+                </a:r>
+                <a:r>
+                  <a:rPr lang="en-US" sz="2600" dirty="0"/>
+                  <a:t> </a:t>
+                </a:r>
+                <a14:m>
+                  <m:oMath xmlns:m="http://schemas.openxmlformats.org/officeDocument/2006/math">
+                    <m:r>
+                      <a:rPr lang="en-US" sz="3200" b="0" i="1" smtClean="0">
+                        <a:latin typeface="Cambria Math" panose="02040503050406030204" pitchFamily="18" charset="0"/>
+                      </a:rPr>
+                      <m:t>𝑑</m:t>
+                    </m:r>
+                  </m:oMath>
+                </a14:m>
+                <a:r>
+                  <a:rPr lang="ru-RU" sz="2600" dirty="0"/>
+                  <a:t> (в км)</a:t>
+                </a:r>
+              </a:p>
+              <a:p>
+                <a:pPr marL="457200" lvl="1" indent="0">
+                  <a:buNone/>
+                </a:pPr>
+                <a:endParaRPr lang="ru-RU" sz="2600" dirty="0"/>
+              </a:p>
+              <a:p>
+                <a:pPr marL="0" indent="0">
+                  <a:buNone/>
+                </a:pPr>
+                <a:r>
+                  <a:rPr lang="ru-RU" dirty="0"/>
+                  <a:t>Задача</a:t>
+                </a:r>
+                <a:r>
+                  <a:rPr lang="en-US" dirty="0"/>
+                  <a:t>: </a:t>
+                </a:r>
+                <a:r>
+                  <a:rPr lang="ru-RU" dirty="0"/>
+                  <a:t>поиск множества маршрутов, для которого выполняется следующее</a:t>
+                </a:r>
+                <a:r>
+                  <a:rPr lang="en-US" dirty="0"/>
+                  <a:t>:</a:t>
+                </a:r>
+              </a:p>
+              <a:p>
+                <a:pPr lvl="1"/>
+                <a:r>
+                  <a:rPr lang="ru-RU" sz="2600" dirty="0"/>
+                  <a:t>соблюдаются ограничения модели</a:t>
+                </a:r>
+                <a:r>
+                  <a:rPr lang="en-US" sz="2600" dirty="0"/>
+                  <a:t>;</a:t>
+                </a:r>
+                <a:endParaRPr lang="ru-RU" sz="2600" dirty="0"/>
+              </a:p>
+              <a:p>
+                <a:pPr lvl="1"/>
+                <a:r>
+                  <a:rPr lang="ru-RU" sz="2600" dirty="0"/>
+                  <a:t>минимальная длительность маршрутов (критерий оптимизации</a:t>
+                </a:r>
+                <a:r>
+                  <a:rPr lang="en-US" sz="2600" dirty="0"/>
+                  <a:t> L(R)</a:t>
+                </a:r>
+                <a:r>
+                  <a:rPr lang="ru-RU" sz="2600" dirty="0"/>
+                  <a:t>)</a:t>
+                </a:r>
+                <a:endParaRPr lang="en-US" sz="2600" dirty="0"/>
+              </a:p>
+              <a:p>
+                <a:pPr marL="0" indent="0">
+                  <a:buNone/>
+                </a:pPr>
+                <a:endParaRPr lang="en-US" dirty="0"/>
+              </a:p>
+              <a:p>
+                <a:pPr marL="0" indent="0">
+                  <a:buNone/>
+                </a:pPr>
+                <a:endParaRPr lang="en-US" dirty="0"/>
+              </a:p>
+              <a:p>
+                <a:pPr marL="0" indent="0">
+                  <a:buNone/>
+                </a:pPr>
+                <a:endParaRPr lang="ru-RU" sz="2400" dirty="0"/>
+              </a:p>
+              <a:p>
+                <a:pPr marL="0" indent="0">
+                  <a:buNone/>
+                </a:pPr>
+                <a:r>
+                  <a:rPr lang="ru-RU" sz="2400" dirty="0"/>
+                  <a:t>где </a:t>
+                </a:r>
+                <a:r>
+                  <a:rPr lang="en-US" sz="2400" dirty="0"/>
+                  <a:t>R – </a:t>
+                </a:r>
+                <a:r>
+                  <a:rPr lang="ru-RU" sz="2400" dirty="0"/>
+                  <a:t>маршруты, </a:t>
+                </a:r>
+                <a:r>
+                  <a:rPr lang="en-US" sz="2400" dirty="0"/>
+                  <a:t>RP – </a:t>
+                </a:r>
+                <a:r>
+                  <a:rPr lang="ru-RU" sz="2400" dirty="0"/>
+                  <a:t>пункты маршрута.</a:t>
+                </a:r>
+                <a:endParaRPr lang="en-US" sz="2400" dirty="0"/>
+              </a:p>
+            </p:txBody>
+          </p:sp>
+        </mc:Choice>
+        <mc:Fallback>
+          <p:sp>
+            <p:nvSpPr>
+              <p:cNvPr id="3" name="Объект 2">
+                <a:extLst>
+                  <a:ext uri="{FF2B5EF4-FFF2-40B4-BE49-F238E27FC236}">
+                    <a16:creationId xmlns:a16="http://schemas.microsoft.com/office/drawing/2014/main" id="{13E6B1EB-D9AE-EC94-48D3-1459C1D2E683}"/>
+                  </a:ext>
+                </a:extLst>
+              </p:cNvPr>
+              <p:cNvSpPr>
+                <a:spLocks noGrp="1" noRot="1" noChangeAspect="1" noMove="1" noResize="1" noEditPoints="1" noAdjustHandles="1" noChangeArrowheads="1" noChangeShapeType="1" noTextEdit="1"/>
+              </p:cNvSpPr>
+              <p:nvPr>
+                <p:ph idx="1"/>
+              </p:nvPr>
+            </p:nvSpPr>
+            <p:spPr>
+              <a:xfrm>
+                <a:off x="838200" y="2141537"/>
+                <a:ext cx="11291888" cy="4351338"/>
+              </a:xfrm>
+              <a:blipFill>
+                <a:blip r:embed="rId2"/>
+                <a:stretch>
+                  <a:fillRect l="-864" t="-3221"/>
+                </a:stretch>
+              </a:blipFill>
+            </p:spPr>
+            <p:txBody>
+              <a:bodyPr/>
+              <a:lstStyle/>
+              <a:p>
+                <a:r>
+                  <a:rPr lang="ru-RU">
+                    <a:noFill/>
+                  </a:rPr>
+                  <a:t> </a:t>
+                </a:r>
+              </a:p>
+            </p:txBody>
+          </p:sp>
+        </mc:Fallback>
+      </mc:AlternateContent>
       <p:sp>
         <p:nvSpPr>
           <p:cNvPr id="4" name="Номер слайда 3">
@@ -5828,14 +6230,15 @@
         </p:nvSpPr>
         <p:spPr/>
         <p:txBody>
-          <a:bodyPr/>
+          <a:bodyPr vert="horz" lIns="91440" tIns="45720" rIns="91440" bIns="45720" rtlCol="0" anchor="ctr"/>
           <a:lstStyle/>
           <a:p>
             <a:fld id="{E44E20FB-DC41-4FB4-820E-A7F1077F5D74}" type="slidenum">
-              <a:rPr lang="ru-RU" smtClean="0"/>
+              <a:rPr lang="ru-RU" sz="1600" b="1"/>
+              <a:pPr/>
               <a:t>5</a:t>
             </a:fld>
-            <a:endParaRPr lang="ru-RU"/>
+            <a:endParaRPr lang="ru-RU" sz="1600" b="1" dirty="0"/>
           </a:p>
         </p:txBody>
       </p:sp>
@@ -5854,13 +6257,13 @@
           <p:nvPr/>
         </p:nvPicPr>
         <p:blipFill>
-          <a:blip r:embed="rId2">
+          <a:blip r:embed="rId3">
             <a:extLst>
               <a:ext uri="{28A0092B-C50C-407E-A947-70E740481C1C}">
                 <a14:useLocalDpi xmlns:a14="http://schemas.microsoft.com/office/drawing/2010/main" val="0"/>
               </a:ext>
               <a:ext uri="{96DAC541-7B7A-43D3-8B79-37D633B846F1}">
-                <asvg:svgBlip xmlns:asvg="http://schemas.microsoft.com/office/drawing/2016/SVG/main" r:embed="rId3"/>
+                <asvg:svgBlip xmlns:asvg="http://schemas.microsoft.com/office/drawing/2016/SVG/main" r:embed="rId4"/>
               </a:ext>
             </a:extLst>
           </a:blip>
@@ -5870,8 +6273,46 @@
         </p:blipFill>
         <p:spPr>
           <a:xfrm>
-            <a:off x="8219975" y="797691"/>
-            <a:ext cx="3910113" cy="1785994"/>
+            <a:off x="7000241" y="136525"/>
+            <a:ext cx="5129848" cy="2343124"/>
+          </a:xfrm>
+          <a:prstGeom prst="rect">
+            <a:avLst/>
+          </a:prstGeom>
+        </p:spPr>
+      </p:pic>
+      <p:pic>
+        <p:nvPicPr>
+          <p:cNvPr id="6" name="Рисунок 5">
+            <a:extLst>
+              <a:ext uri="{FF2B5EF4-FFF2-40B4-BE49-F238E27FC236}">
+                <a16:creationId xmlns:a16="http://schemas.microsoft.com/office/drawing/2014/main" id="{9D583F61-1C91-7C8A-75AA-63C0D2144552}"/>
+              </a:ext>
+            </a:extLst>
+          </p:cNvPr>
+          <p:cNvPicPr>
+            <a:picLocks noChangeAspect="1"/>
+          </p:cNvPicPr>
+          <p:nvPr/>
+        </p:nvPicPr>
+        <p:blipFill>
+          <a:blip r:embed="rId5">
+            <a:extLst>
+              <a:ext uri="{28A0092B-C50C-407E-A947-70E740481C1C}">
+                <a14:useLocalDpi xmlns:a14="http://schemas.microsoft.com/office/drawing/2010/main" val="0"/>
+              </a:ext>
+              <a:ext uri="{96DAC541-7B7A-43D3-8B79-37D633B846F1}">
+                <asvg:svgBlip xmlns:asvg="http://schemas.microsoft.com/office/drawing/2016/SVG/main" r:embed="rId6"/>
+              </a:ext>
+            </a:extLst>
+          </a:blip>
+          <a:srcRect/>
+          <a:stretch/>
+        </p:blipFill>
+        <p:spPr>
+          <a:xfrm>
+            <a:off x="1307622" y="4950088"/>
+            <a:ext cx="5176522" cy="907343"/>
           </a:xfrm>
           <a:prstGeom prst="rect">
             <a:avLst/>
@@ -5952,71 +6393,21 @@
             <p:ph idx="1"/>
           </p:nvPr>
         </p:nvSpPr>
-        <p:spPr/>
+        <p:spPr>
+          <a:xfrm>
+            <a:off x="838200" y="1825625"/>
+            <a:ext cx="5435600" cy="4667250"/>
+          </a:xfrm>
+        </p:spPr>
         <p:txBody>
           <a:bodyPr>
-            <a:normAutofit lnSpcReduction="10000"/>
+            <a:normAutofit/>
           </a:bodyPr>
           <a:lstStyle/>
-          <a:p>
-            <a:r>
-              <a:rPr lang="ru-RU" dirty="0"/>
-              <a:t>Критерий оптимизации – минимальная длительность маршрутов </a:t>
-            </a:r>
-            <a:endParaRPr lang="en-US" dirty="0"/>
-          </a:p>
           <a:p>
             <a:pPr marL="0" indent="0">
               <a:buNone/>
             </a:pPr>
-            <a:endParaRPr lang="en-US" dirty="0"/>
-          </a:p>
-          <a:p>
-            <a:endParaRPr lang="en-US" dirty="0"/>
-          </a:p>
-          <a:p>
-            <a:pPr marL="0" indent="0">
-              <a:buNone/>
-            </a:pPr>
-            <a:r>
-              <a:rPr lang="ru-RU" dirty="0"/>
-              <a:t>Где </a:t>
-            </a:r>
-            <a:r>
-              <a:rPr lang="en-US" dirty="0"/>
-              <a:t>d – </a:t>
-            </a:r>
-            <a:r>
-              <a:rPr lang="ru-RU" dirty="0"/>
-              <a:t>расстояние между пунктами, </a:t>
-            </a:r>
-            <a:r>
-              <a:rPr lang="en-US" dirty="0"/>
-              <a:t>R – </a:t>
-            </a:r>
-            <a:r>
-              <a:rPr lang="ru-RU" dirty="0"/>
-              <a:t>маршрут, </a:t>
-            </a:r>
-            <a:r>
-              <a:rPr lang="en-US" dirty="0"/>
-              <a:t>RP – </a:t>
-            </a:r>
-            <a:r>
-              <a:rPr lang="ru-RU" dirty="0"/>
-              <a:t>пункты маршрута. </a:t>
-            </a:r>
-            <a:r>
-              <a:rPr lang="en-US" dirty="0"/>
-              <a:t>L – </a:t>
-            </a:r>
-            <a:r>
-              <a:rPr lang="ru-RU" dirty="0"/>
-              <a:t>функция оптимизации.</a:t>
-            </a:r>
-            <a:endParaRPr lang="en-US" dirty="0"/>
-          </a:p>
-          <a:p>
             <a:r>
               <a:rPr lang="ru-RU" dirty="0"/>
               <a:t>Ограничения системы</a:t>
@@ -6026,31 +6417,24 @@
             <a:pPr lvl="1"/>
             <a:r>
               <a:rPr lang="ru-RU" dirty="0"/>
-              <a:t>Вместимость транспорта  </a:t>
+              <a:t>маршруты начинаются и заканчиваются на стоянке</a:t>
+            </a:r>
+            <a:r>
+              <a:rPr lang="en-US" dirty="0"/>
+              <a:t>;</a:t>
             </a:r>
           </a:p>
           <a:p>
             <a:pPr lvl="1"/>
             <a:r>
               <a:rPr lang="ru-RU" dirty="0"/>
-              <a:t>Обязательность выполнения заказов </a:t>
-            </a:r>
-          </a:p>
-          <a:p>
-            <a:pPr marL="457200" lvl="1" indent="0">
-              <a:buNone/>
-            </a:pPr>
-            <a:r>
-              <a:rPr lang="ru-RU" dirty="0"/>
-              <a:t>	с учётом ограниченности складов </a:t>
-            </a:r>
-          </a:p>
-          <a:p>
-            <a:pPr lvl="1"/>
-            <a:r>
-              <a:rPr lang="ru-RU" dirty="0"/>
-              <a:t>Невозможность обратных перевозок</a:t>
-            </a:r>
+              <a:t>каждый маршрут выполняет только одну погрузку на складе</a:t>
+            </a:r>
+            <a:r>
+              <a:rPr lang="en-US" dirty="0"/>
+              <a:t>;</a:t>
+            </a:r>
+            <a:endParaRPr lang="ru-RU" dirty="0"/>
           </a:p>
           <a:p>
             <a:pPr marL="457200" lvl="1" indent="0">
@@ -6058,6 +6442,36 @@
             </a:pPr>
             <a:endParaRPr lang="ru-RU" dirty="0"/>
           </a:p>
+          <a:p>
+            <a:pPr lvl="1"/>
+            <a:r>
+              <a:rPr lang="ru-RU" dirty="0"/>
+              <a:t>ограниченность вместимости транспорта</a:t>
+            </a:r>
+            <a:r>
+              <a:rPr lang="en-US" dirty="0"/>
+              <a:t>;</a:t>
+            </a:r>
+            <a:endParaRPr lang="ru-RU" dirty="0"/>
+          </a:p>
+          <a:p>
+            <a:pPr marL="457200" lvl="1" indent="0">
+              <a:buNone/>
+            </a:pPr>
+            <a:endParaRPr lang="ru-RU" dirty="0"/>
+          </a:p>
+          <a:p>
+            <a:pPr lvl="1"/>
+            <a:r>
+              <a:rPr lang="ru-RU" dirty="0"/>
+              <a:t>обязательность выполнения заказов с учётом ограниченности складов</a:t>
+            </a:r>
+            <a:r>
+              <a:rPr lang="en-US" dirty="0"/>
+              <a:t>;</a:t>
+            </a:r>
+            <a:endParaRPr lang="ru-RU" dirty="0"/>
+          </a:p>
         </p:txBody>
       </p:sp>
       <p:sp>
@@ -6082,19 +6496,20 @@
           <a:lstStyle/>
           <a:p>
             <a:fld id="{E44E20FB-DC41-4FB4-820E-A7F1077F5D74}" type="slidenum">
-              <a:rPr lang="ru-RU" smtClean="0"/>
+              <a:rPr lang="ru-RU" sz="1600" b="1"/>
+              <a:pPr/>
               <a:t>6</a:t>
             </a:fld>
-            <a:endParaRPr lang="ru-RU"/>
+            <a:endParaRPr lang="ru-RU" sz="1600" b="1" dirty="0"/>
           </a:p>
         </p:txBody>
       </p:sp>
       <p:pic>
         <p:nvPicPr>
-          <p:cNvPr id="9" name="Рисунок 8">
-            <a:extLst>
-              <a:ext uri="{FF2B5EF4-FFF2-40B4-BE49-F238E27FC236}">
-                <a16:creationId xmlns:a16="http://schemas.microsoft.com/office/drawing/2014/main" id="{2A6D65A1-4E7A-E62D-F2DB-4024F7CBE333}"/>
+          <p:cNvPr id="14" name="Рисунок 13">
+            <a:extLst>
+              <a:ext uri="{FF2B5EF4-FFF2-40B4-BE49-F238E27FC236}">
+                <a16:creationId xmlns:a16="http://schemas.microsoft.com/office/drawing/2014/main" id="{88A80A66-C2DA-1351-B19C-9B4770EA37CC}"/>
               </a:ext>
             </a:extLst>
           </p:cNvPr>
@@ -6120,8 +6535,8 @@
         </p:blipFill>
         <p:spPr>
           <a:xfrm>
-            <a:off x="8016545" y="4179791"/>
-            <a:ext cx="1763290" cy="707890"/>
+            <a:off x="6471920" y="5320904"/>
+            <a:ext cx="3469291" cy="848385"/>
           </a:xfrm>
           <a:prstGeom prst="rect">
             <a:avLst/>
@@ -6130,10 +6545,10 @@
       </p:pic>
       <p:pic>
         <p:nvPicPr>
-          <p:cNvPr id="11" name="Рисунок 10">
-            <a:extLst>
-              <a:ext uri="{FF2B5EF4-FFF2-40B4-BE49-F238E27FC236}">
-                <a16:creationId xmlns:a16="http://schemas.microsoft.com/office/drawing/2014/main" id="{A47BB008-270C-98EB-B73F-A6F37DE478FD}"/>
+          <p:cNvPr id="16" name="Рисунок 15">
+            <a:extLst>
+              <a:ext uri="{FF2B5EF4-FFF2-40B4-BE49-F238E27FC236}">
+                <a16:creationId xmlns:a16="http://schemas.microsoft.com/office/drawing/2014/main" id="{2C289C13-54E4-A39C-63C9-C731F4DC34C4}"/>
               </a:ext>
             </a:extLst>
           </p:cNvPr>
@@ -6159,8 +6574,8 @@
         </p:blipFill>
         <p:spPr>
           <a:xfrm>
-            <a:off x="8016545" y="4943640"/>
-            <a:ext cx="2894765" cy="707890"/>
+            <a:off x="6471920" y="3216656"/>
+            <a:ext cx="5435600" cy="424688"/>
           </a:xfrm>
           <a:prstGeom prst="rect">
             <a:avLst/>
@@ -6169,10 +6584,10 @@
       </p:pic>
       <p:pic>
         <p:nvPicPr>
-          <p:cNvPr id="13" name="Рисунок 12">
-            <a:extLst>
-              <a:ext uri="{FF2B5EF4-FFF2-40B4-BE49-F238E27FC236}">
-                <a16:creationId xmlns:a16="http://schemas.microsoft.com/office/drawing/2014/main" id="{88FC6D14-7CA6-07B7-2B6A-D7F7E633340E}"/>
+          <p:cNvPr id="18" name="Рисунок 17">
+            <a:extLst>
+              <a:ext uri="{FF2B5EF4-FFF2-40B4-BE49-F238E27FC236}">
+                <a16:creationId xmlns:a16="http://schemas.microsoft.com/office/drawing/2014/main" id="{1405427A-631C-0A5D-05E3-B8DA73FD7E1E}"/>
               </a:ext>
             </a:extLst>
           </p:cNvPr>
@@ -6198,8 +6613,8 @@
         </p:blipFill>
         <p:spPr>
           <a:xfrm>
-            <a:off x="8016545" y="5532969"/>
-            <a:ext cx="2509521" cy="711462"/>
+            <a:off x="6471920" y="4121107"/>
+            <a:ext cx="2113250" cy="848385"/>
           </a:xfrm>
           <a:prstGeom prst="rect">
             <a:avLst/>
@@ -6208,10 +6623,10 @@
       </p:pic>
       <p:pic>
         <p:nvPicPr>
-          <p:cNvPr id="6" name="Рисунок 5">
-            <a:extLst>
-              <a:ext uri="{FF2B5EF4-FFF2-40B4-BE49-F238E27FC236}">
-                <a16:creationId xmlns:a16="http://schemas.microsoft.com/office/drawing/2014/main" id="{71C05888-3EBA-0925-0163-4D6A9C9D3B7E}"/>
+          <p:cNvPr id="20" name="Рисунок 19">
+            <a:extLst>
+              <a:ext uri="{FF2B5EF4-FFF2-40B4-BE49-F238E27FC236}">
+                <a16:creationId xmlns:a16="http://schemas.microsoft.com/office/drawing/2014/main" id="{9ACB4109-D9CC-3C00-6239-3988710EC7AE}"/>
               </a:ext>
             </a:extLst>
           </p:cNvPr>
@@ -6237,8 +6652,8 @@
         </p:blipFill>
         <p:spPr>
           <a:xfrm>
-            <a:off x="1000760" y="2425786"/>
-            <a:ext cx="4505960" cy="1003214"/>
+            <a:off x="6471920" y="2367947"/>
+            <a:ext cx="2903715" cy="330803"/>
           </a:xfrm>
           <a:prstGeom prst="rect">
             <a:avLst/>
@@ -6303,12 +6718,42 @@
           </a:p>
         </p:txBody>
       </p:sp>
+      <p:sp>
+        <p:nvSpPr>
+          <p:cNvPr id="4" name="Номер слайда 3">
+            <a:extLst>
+              <a:ext uri="{FF2B5EF4-FFF2-40B4-BE49-F238E27FC236}">
+                <a16:creationId xmlns:a16="http://schemas.microsoft.com/office/drawing/2014/main" id="{F61ADD9D-47C8-F6FB-478D-2451A2E20D82}"/>
+              </a:ext>
+            </a:extLst>
+          </p:cNvPr>
+          <p:cNvSpPr>
+            <a:spLocks noGrp="1"/>
+          </p:cNvSpPr>
+          <p:nvPr>
+            <p:ph type="sldNum" sz="quarter" idx="12"/>
+          </p:nvPr>
+        </p:nvSpPr>
+        <p:spPr/>
+        <p:txBody>
+          <a:bodyPr/>
+          <a:lstStyle/>
+          <a:p>
+            <a:fld id="{E44E20FB-DC41-4FB4-820E-A7F1077F5D74}" type="slidenum">
+              <a:rPr lang="ru-RU" sz="1600" b="1"/>
+              <a:pPr/>
+              <a:t>7</a:t>
+            </a:fld>
+            <a:endParaRPr lang="ru-RU" sz="1600" b="1" dirty="0"/>
+          </a:p>
+        </p:txBody>
+      </p:sp>
       <p:pic>
         <p:nvPicPr>
-          <p:cNvPr id="6" name="Объект 5">
-            <a:extLst>
-              <a:ext uri="{FF2B5EF4-FFF2-40B4-BE49-F238E27FC236}">
-                <a16:creationId xmlns:a16="http://schemas.microsoft.com/office/drawing/2014/main" id="{8885FDAE-B112-17DB-92A6-A186D0910242}"/>
+          <p:cNvPr id="10" name="Объект 9">
+            <a:extLst>
+              <a:ext uri="{FF2B5EF4-FFF2-40B4-BE49-F238E27FC236}">
+                <a16:creationId xmlns:a16="http://schemas.microsoft.com/office/drawing/2014/main" id="{C5FDE30F-38A7-E902-82E4-09148842770F}"/>
               </a:ext>
             </a:extLst>
           </p:cNvPr>
@@ -6330,45 +6775,16 @@
               </a:ext>
             </a:extLst>
           </a:blip>
-          <a:srcRect l="523" t="10814" r="634" b="22174"/>
+          <a:srcRect l="782" t="11514" r="418" b="18672"/>
           <a:stretch/>
         </p:blipFill>
         <p:spPr>
           <a:xfrm>
-            <a:off x="997945" y="1351009"/>
-            <a:ext cx="10196109" cy="5345021"/>
+            <a:off x="1285240" y="1690688"/>
+            <a:ext cx="9621520" cy="5097387"/>
           </a:xfrm>
         </p:spPr>
       </p:pic>
-      <p:sp>
-        <p:nvSpPr>
-          <p:cNvPr id="4" name="Номер слайда 3">
-            <a:extLst>
-              <a:ext uri="{FF2B5EF4-FFF2-40B4-BE49-F238E27FC236}">
-                <a16:creationId xmlns:a16="http://schemas.microsoft.com/office/drawing/2014/main" id="{F61ADD9D-47C8-F6FB-478D-2451A2E20D82}"/>
-              </a:ext>
-            </a:extLst>
-          </p:cNvPr>
-          <p:cNvSpPr>
-            <a:spLocks noGrp="1"/>
-          </p:cNvSpPr>
-          <p:nvPr>
-            <p:ph type="sldNum" sz="quarter" idx="12"/>
-          </p:nvPr>
-        </p:nvSpPr>
-        <p:spPr/>
-        <p:txBody>
-          <a:bodyPr/>
-          <a:lstStyle/>
-          <a:p>
-            <a:fld id="{E44E20FB-DC41-4FB4-820E-A7F1077F5D74}" type="slidenum">
-              <a:rPr lang="ru-RU" smtClean="0"/>
-              <a:t>7</a:t>
-            </a:fld>
-            <a:endParaRPr lang="ru-RU"/>
-          </a:p>
-        </p:txBody>
-      </p:sp>
     </p:spTree>
     <p:extLst>
       <p:ext uri="{BB962C8B-B14F-4D97-AF65-F5344CB8AC3E}">
@@ -6385,6 +6801,11 @@
 <file path=ppt/slides/slide8.xml><?xml version="1.0" encoding="utf-8"?>
 <p:sld xmlns:a="http://schemas.openxmlformats.org/drawingml/2006/main" xmlns:r="http://schemas.openxmlformats.org/officeDocument/2006/relationships" xmlns:p="http://schemas.openxmlformats.org/presentationml/2006/main">
   <p:cSld>
+    <p:bg>
+      <p:bgRef idx="1001">
+        <a:schemeClr val="bg1"/>
+      </p:bgRef>
+    </p:bg>
     <p:spTree>
       <p:nvGrpSpPr>
         <p:cNvPr id="1" name=""/>
@@ -6422,7 +6843,7 @@
           <a:p>
             <a:r>
               <a:rPr lang="ru-RU" dirty="0"/>
-              <a:t>Метод минимального элемента</a:t>
+              <a:t>Составление опорного плана</a:t>
             </a:r>
           </a:p>
         </p:txBody>
@@ -6449,10 +6870,11 @@
           <a:lstStyle/>
           <a:p>
             <a:fld id="{E44E20FB-DC41-4FB4-820E-A7F1077F5D74}" type="slidenum">
-              <a:rPr lang="ru-RU" smtClean="0"/>
+              <a:rPr lang="ru-RU" sz="1600" b="1"/>
+              <a:pPr/>
               <a:t>8</a:t>
             </a:fld>
-            <a:endParaRPr lang="ru-RU"/>
+            <a:endParaRPr lang="ru-RU" sz="1600" b="1" dirty="0"/>
           </a:p>
         </p:txBody>
       </p:sp>
@@ -6471,13 +6893,13 @@
           <p:nvPr/>
         </p:nvPicPr>
         <p:blipFill>
-          <a:blip r:embed="rId2">
+          <a:blip r:embed="rId3">
             <a:extLst>
               <a:ext uri="{28A0092B-C50C-407E-A947-70E740481C1C}">
                 <a14:useLocalDpi xmlns:a14="http://schemas.microsoft.com/office/drawing/2010/main" val="0"/>
               </a:ext>
               <a:ext uri="{96DAC541-7B7A-43D3-8B79-37D633B846F1}">
-                <asvg:svgBlip xmlns:asvg="http://schemas.microsoft.com/office/drawing/2016/SVG/main" r:embed="rId3"/>
+                <asvg:svgBlip xmlns:asvg="http://schemas.microsoft.com/office/drawing/2016/SVG/main" r:embed="rId4"/>
               </a:ext>
             </a:extLst>
           </a:blip>
@@ -6510,24 +6932,23 @@
           <p:nvPr/>
         </p:nvPicPr>
         <p:blipFill>
-          <a:blip r:embed="rId4">
+          <a:blip r:embed="rId5">
             <a:extLst>
               <a:ext uri="{28A0092B-C50C-407E-A947-70E740481C1C}">
                 <a14:useLocalDpi xmlns:a14="http://schemas.microsoft.com/office/drawing/2010/main" val="0"/>
               </a:ext>
               <a:ext uri="{96DAC541-7B7A-43D3-8B79-37D633B846F1}">
-                <asvg:svgBlip xmlns:asvg="http://schemas.microsoft.com/office/drawing/2016/SVG/main" r:embed="rId5"/>
+                <asvg:svgBlip xmlns:asvg="http://schemas.microsoft.com/office/drawing/2016/SVG/main" r:embed="rId6"/>
               </a:ext>
             </a:extLst>
           </a:blip>
-          <a:stretch>
-            <a:fillRect/>
-          </a:stretch>
+          <a:srcRect/>
+          <a:stretch/>
         </p:blipFill>
         <p:spPr>
           <a:xfrm>
             <a:off x="7116043" y="3778332"/>
-            <a:ext cx="5075957" cy="2777959"/>
+            <a:ext cx="5075956" cy="2777959"/>
           </a:xfrm>
           <a:prstGeom prst="rect">
             <a:avLst/>
@@ -6549,23 +6970,23 @@
           <p:nvPr/>
         </p:nvPicPr>
         <p:blipFill rotWithShape="1">
-          <a:blip r:embed="rId6">
+          <a:blip r:embed="rId7">
             <a:extLst>
               <a:ext uri="{28A0092B-C50C-407E-A947-70E740481C1C}">
                 <a14:useLocalDpi xmlns:a14="http://schemas.microsoft.com/office/drawing/2010/main" val="0"/>
               </a:ext>
               <a:ext uri="{96DAC541-7B7A-43D3-8B79-37D633B846F1}">
-                <asvg:svgBlip xmlns:asvg="http://schemas.microsoft.com/office/drawing/2016/SVG/main" r:embed="rId7"/>
+                <asvg:svgBlip xmlns:asvg="http://schemas.microsoft.com/office/drawing/2016/SVG/main" r:embed="rId8"/>
               </a:ext>
             </a:extLst>
           </a:blip>
-          <a:srcRect l="250" t="11271" r="526" b="21429"/>
+          <a:srcRect l="415" t="11661" r="401" b="18903"/>
           <a:stretch/>
         </p:blipFill>
         <p:spPr>
           <a:xfrm>
-            <a:off x="151862" y="1690688"/>
-            <a:ext cx="7477760" cy="3921760"/>
+            <a:off x="182880" y="1503680"/>
+            <a:ext cx="7416800" cy="4257040"/>
           </a:xfrm>
           <a:prstGeom prst="rect">
             <a:avLst/>
@@ -6580,7 +7001,7 @@
     </p:extLst>
   </p:cSld>
   <p:clrMapOvr>
-    <a:masterClrMapping/>
+    <a:overrideClrMapping bg1="lt1" tx1="dk1" bg2="lt2" tx2="dk2" accent1="accent1" accent2="accent2" accent3="accent3" accent4="accent4" accent5="accent5" accent6="accent6" hlink="hlink" folHlink="folHlink"/>
   </p:clrMapOvr>
 </p:sld>
 </file>
@@ -6588,6 +7009,11 @@
 <file path=ppt/slides/slide9.xml><?xml version="1.0" encoding="utf-8"?>
 <p:sld xmlns:a="http://schemas.openxmlformats.org/drawingml/2006/main" xmlns:r="http://schemas.openxmlformats.org/officeDocument/2006/relationships" xmlns:p="http://schemas.openxmlformats.org/presentationml/2006/main">
   <p:cSld>
+    <p:bg>
+      <p:bgRef idx="1001">
+        <a:schemeClr val="bg1"/>
+      </p:bgRef>
+    </p:bg>
     <p:spTree>
       <p:nvGrpSpPr>
         <p:cNvPr id="1" name=""/>
@@ -6625,7 +7051,7 @@
           <a:p>
             <a:r>
               <a:rPr lang="ru-RU" dirty="0"/>
-              <a:t>Метод потенциалов</a:t>
+              <a:t>Оптимизация плана</a:t>
             </a:r>
           </a:p>
         </p:txBody>
@@ -6647,23 +7073,23 @@
           </p:nvPr>
         </p:nvPicPr>
         <p:blipFill rotWithShape="1">
-          <a:blip r:embed="rId2">
+          <a:blip r:embed="rId3">
             <a:extLst>
               <a:ext uri="{28A0092B-C50C-407E-A947-70E740481C1C}">
                 <a14:useLocalDpi xmlns:a14="http://schemas.microsoft.com/office/drawing/2010/main" val="0"/>
               </a:ext>
               <a:ext uri="{96DAC541-7B7A-43D3-8B79-37D633B846F1}">
-                <asvg:svgBlip xmlns:asvg="http://schemas.microsoft.com/office/drawing/2016/SVG/main" r:embed="rId3"/>
+                <asvg:svgBlip xmlns:asvg="http://schemas.microsoft.com/office/drawing/2016/SVG/main" r:embed="rId4"/>
               </a:ext>
             </a:extLst>
           </a:blip>
-          <a:srcRect l="535" t="11514" r="468" b="24743"/>
+          <a:srcRect l="619" t="11284" r="496" b="19288"/>
           <a:stretch/>
         </p:blipFill>
         <p:spPr>
           <a:xfrm>
-            <a:off x="160020" y="2453958"/>
-            <a:ext cx="8209280" cy="4087238"/>
+            <a:off x="243840" y="1955932"/>
+            <a:ext cx="8463280" cy="4455072"/>
           </a:xfrm>
         </p:spPr>
       </p:pic>
@@ -6689,10 +7115,10 @@
           <a:lstStyle/>
           <a:p>
             <a:fld id="{E44E20FB-DC41-4FB4-820E-A7F1077F5D74}" type="slidenum">
-              <a:rPr lang="ru-RU" smtClean="0"/>
+              <a:rPr lang="ru-RU" sz="1600" b="1"/>
               <a:t>9</a:t>
             </a:fld>
-            <a:endParaRPr lang="ru-RU"/>
+            <a:endParaRPr lang="ru-RU" sz="1600" b="1" dirty="0"/>
           </a:p>
         </p:txBody>
       </p:sp>
@@ -6711,13 +7137,13 @@
           <p:nvPr/>
         </p:nvPicPr>
         <p:blipFill>
-          <a:blip r:embed="rId4">
+          <a:blip r:embed="rId5">
             <a:extLst>
               <a:ext uri="{28A0092B-C50C-407E-A947-70E740481C1C}">
                 <a14:useLocalDpi xmlns:a14="http://schemas.microsoft.com/office/drawing/2010/main" val="0"/>
               </a:ext>
               <a:ext uri="{96DAC541-7B7A-43D3-8B79-37D633B846F1}">
-                <asvg:svgBlip xmlns:asvg="http://schemas.microsoft.com/office/drawing/2016/SVG/main" r:embed="rId5"/>
+                <asvg:svgBlip xmlns:asvg="http://schemas.microsoft.com/office/drawing/2016/SVG/main" r:embed="rId6"/>
               </a:ext>
             </a:extLst>
           </a:blip>
@@ -6727,8 +7153,8 @@
         </p:blipFill>
         <p:spPr>
           <a:xfrm>
-            <a:off x="6969760" y="136525"/>
-            <a:ext cx="4978400" cy="2538008"/>
+            <a:off x="7440328" y="1"/>
+            <a:ext cx="4751672" cy="2422422"/>
           </a:xfrm>
           <a:prstGeom prst="rect">
             <a:avLst/>
@@ -6750,13 +7176,13 @@
           <p:nvPr/>
         </p:nvPicPr>
         <p:blipFill>
-          <a:blip r:embed="rId6">
+          <a:blip r:embed="rId7">
             <a:extLst>
               <a:ext uri="{28A0092B-C50C-407E-A947-70E740481C1C}">
                 <a14:useLocalDpi xmlns:a14="http://schemas.microsoft.com/office/drawing/2010/main" val="0"/>
               </a:ext>
               <a:ext uri="{96DAC541-7B7A-43D3-8B79-37D633B846F1}">
-                <asvg:svgBlip xmlns:asvg="http://schemas.microsoft.com/office/drawing/2016/SVG/main" r:embed="rId7"/>
+                <asvg:svgBlip xmlns:asvg="http://schemas.microsoft.com/office/drawing/2016/SVG/main" r:embed="rId8"/>
               </a:ext>
             </a:extLst>
           </a:blip>
@@ -6766,8 +7192,8 @@
         </p:blipFill>
         <p:spPr>
           <a:xfrm>
-            <a:off x="7053580" y="2346325"/>
-            <a:ext cx="4978400" cy="2257363"/>
+            <a:off x="7440326" y="2422424"/>
+            <a:ext cx="4751673" cy="2154558"/>
           </a:xfrm>
           <a:prstGeom prst="rect">
             <a:avLst/>
@@ -6782,7 +7208,7 @@
     </p:extLst>
   </p:cSld>
   <p:clrMapOvr>
-    <a:masterClrMapping/>
+    <a:overrideClrMapping bg1="lt1" tx1="dk1" bg2="lt2" tx2="dk2" accent1="accent1" accent2="accent2" accent3="accent3" accent4="accent4" accent5="accent5" accent6="accent6" hlink="hlink" folHlink="folHlink"/>
   </p:clrMapOvr>
 </p:sld>
 </file>
@@ -7375,4 +7801,90 @@
     </a:ext>
   </a:extLst>
 </a:theme>
+</file>
+
+<file path=ppt/theme/themeOverride1.xml><?xml version="1.0" encoding="utf-8"?>
+<a:themeOverride xmlns:a="http://schemas.openxmlformats.org/drawingml/2006/main">
+  <a:clrScheme name="Другая 4">
+    <a:dk1>
+      <a:srgbClr val="44454A"/>
+    </a:dk1>
+    <a:lt1>
+      <a:srgbClr val="DDE2E3"/>
+    </a:lt1>
+    <a:dk2>
+      <a:srgbClr val="44546A"/>
+    </a:dk2>
+    <a:lt2>
+      <a:srgbClr val="E7E6E6"/>
+    </a:lt2>
+    <a:accent1>
+      <a:srgbClr val="4472C4"/>
+    </a:accent1>
+    <a:accent2>
+      <a:srgbClr val="ED7D31"/>
+    </a:accent2>
+    <a:accent3>
+      <a:srgbClr val="A5A5A5"/>
+    </a:accent3>
+    <a:accent4>
+      <a:srgbClr val="FFC000"/>
+    </a:accent4>
+    <a:accent5>
+      <a:srgbClr val="5B9BD5"/>
+    </a:accent5>
+    <a:accent6>
+      <a:srgbClr val="70AD47"/>
+    </a:accent6>
+    <a:hlink>
+      <a:srgbClr val="0563C1"/>
+    </a:hlink>
+    <a:folHlink>
+      <a:srgbClr val="954F72"/>
+    </a:folHlink>
+  </a:clrScheme>
+</a:themeOverride>
+</file>
+
+<file path=ppt/theme/themeOverride2.xml><?xml version="1.0" encoding="utf-8"?>
+<a:themeOverride xmlns:a="http://schemas.openxmlformats.org/drawingml/2006/main">
+  <a:clrScheme name="Другая 4">
+    <a:dk1>
+      <a:srgbClr val="44454A"/>
+    </a:dk1>
+    <a:lt1>
+      <a:srgbClr val="DDE2E3"/>
+    </a:lt1>
+    <a:dk2>
+      <a:srgbClr val="44546A"/>
+    </a:dk2>
+    <a:lt2>
+      <a:srgbClr val="E7E6E6"/>
+    </a:lt2>
+    <a:accent1>
+      <a:srgbClr val="4472C4"/>
+    </a:accent1>
+    <a:accent2>
+      <a:srgbClr val="ED7D31"/>
+    </a:accent2>
+    <a:accent3>
+      <a:srgbClr val="A5A5A5"/>
+    </a:accent3>
+    <a:accent4>
+      <a:srgbClr val="FFC000"/>
+    </a:accent4>
+    <a:accent5>
+      <a:srgbClr val="5B9BD5"/>
+    </a:accent5>
+    <a:accent6>
+      <a:srgbClr val="70AD47"/>
+    </a:accent6>
+    <a:hlink>
+      <a:srgbClr val="0563C1"/>
+    </a:hlink>
+    <a:folHlink>
+      <a:srgbClr val="954F72"/>
+    </a:folHlink>
+  </a:clrScheme>
+</a:themeOverride>
 </file>
</xml_diff>